<commit_message>
Removed the individual component slides.
</commit_message>
<xml_diff>
--- a/presentation/Mercury-Part1.pptx
+++ b/presentation/Mercury-Part1.pptx
@@ -18,15 +18,10 @@
     <p:sldId id="266" r:id="rId12"/>
     <p:sldId id="267" r:id="rId13"/>
     <p:sldId id="268" r:id="rId14"/>
-    <p:sldId id="269" r:id="rId15"/>
-    <p:sldId id="270" r:id="rId16"/>
-    <p:sldId id="271" r:id="rId17"/>
-    <p:sldId id="272" r:id="rId18"/>
-    <p:sldId id="273" r:id="rId19"/>
-    <p:sldId id="274" r:id="rId20"/>
-    <p:sldId id="275" r:id="rId21"/>
-    <p:sldId id="276" r:id="rId22"/>
-    <p:sldId id="277" r:id="rId23"/>
+    <p:sldId id="274" r:id="rId15"/>
+    <p:sldId id="275" r:id="rId16"/>
+    <p:sldId id="276" r:id="rId17"/>
+    <p:sldId id="277" r:id="rId18"/>
   </p:sldIdLst>
   <p:sldSz cx="12192000" cy="6858000"/>
   <p:notesSz cx="6858000" cy="9144000"/>
@@ -190,7 +185,7 @@
           <a:noFill/>
           <a:extLst>
             <a:ext uri="{909E8E84-426E-40dd-AFC4-6F175D3DCCD1}">
-              <a14:hiddenFill xmlns="" xmlns:a14="http://schemas.microsoft.com/office/drawing/2010/main">
+              <a14:hiddenFill xmlns:a14="http://schemas.microsoft.com/office/drawing/2010/main" xmlns="">
                 <a:solidFill>
                   <a:srgbClr val="FFFFFF"/>
                 </a:solidFill>
@@ -249,7 +244,7 @@
             </a:ln>
             <a:extLst>
               <a:ext uri="{91240B29-F687-4f45-9708-019B960494DF}">
-                <a14:hiddenLine xmlns="" xmlns:a14="http://schemas.microsoft.com/office/drawing/2010/main" w="9525">
+                <a14:hiddenLine xmlns:a14="http://schemas.microsoft.com/office/drawing/2010/main" xmlns="" w="9525">
                   <a:solidFill>
                     <a:srgbClr val="000000"/>
                   </a:solidFill>
@@ -339,7 +334,7 @@
             </a:ln>
             <a:extLst>
               <a:ext uri="{91240B29-F687-4f45-9708-019B960494DF}">
-                <a14:hiddenLine xmlns="" xmlns:a14="http://schemas.microsoft.com/office/drawing/2010/main" w="9525">
+                <a14:hiddenLine xmlns:a14="http://schemas.microsoft.com/office/drawing/2010/main" xmlns="" w="9525">
                   <a:solidFill>
                     <a:srgbClr val="000000"/>
                   </a:solidFill>
@@ -429,7 +424,7 @@
             </a:ln>
             <a:extLst>
               <a:ext uri="{91240B29-F687-4f45-9708-019B960494DF}">
-                <a14:hiddenLine xmlns="" xmlns:a14="http://schemas.microsoft.com/office/drawing/2010/main" w="9525">
+                <a14:hiddenLine xmlns:a14="http://schemas.microsoft.com/office/drawing/2010/main" xmlns="" w="9525">
                   <a:solidFill>
                     <a:srgbClr val="000000"/>
                   </a:solidFill>
@@ -463,7 +458,7 @@
             </a:ln>
             <a:extLst>
               <a:ext uri="{91240B29-F687-4f45-9708-019B960494DF}">
-                <a14:hiddenLine xmlns="" xmlns:a14="http://schemas.microsoft.com/office/drawing/2010/main" w="9525">
+                <a14:hiddenLine xmlns:a14="http://schemas.microsoft.com/office/drawing/2010/main" xmlns="" w="9525">
                   <a:solidFill>
                     <a:srgbClr val="000000"/>
                   </a:solidFill>
@@ -553,7 +548,7 @@
             </a:ln>
             <a:extLst>
               <a:ext uri="{91240B29-F687-4f45-9708-019B960494DF}">
-                <a14:hiddenLine xmlns="" xmlns:a14="http://schemas.microsoft.com/office/drawing/2010/main" w="9525">
+                <a14:hiddenLine xmlns:a14="http://schemas.microsoft.com/office/drawing/2010/main" xmlns="" w="9525">
                   <a:solidFill>
                     <a:srgbClr val="000000"/>
                   </a:solidFill>
@@ -615,7 +610,7 @@
             </a:ln>
             <a:extLst>
               <a:ext uri="{91240B29-F687-4f45-9708-019B960494DF}">
-                <a14:hiddenLine xmlns="" xmlns:a14="http://schemas.microsoft.com/office/drawing/2010/main" w="9525">
+                <a14:hiddenLine xmlns:a14="http://schemas.microsoft.com/office/drawing/2010/main" xmlns="" w="9525">
                   <a:solidFill>
                     <a:srgbClr val="000000"/>
                   </a:solidFill>
@@ -677,7 +672,7 @@
             </a:ln>
             <a:extLst>
               <a:ext uri="{91240B29-F687-4f45-9708-019B960494DF}">
-                <a14:hiddenLine xmlns="" xmlns:a14="http://schemas.microsoft.com/office/drawing/2010/main" w="9525">
+                <a14:hiddenLine xmlns:a14="http://schemas.microsoft.com/office/drawing/2010/main" xmlns="" w="9525">
                   <a:solidFill>
                     <a:srgbClr val="000000"/>
                   </a:solidFill>
@@ -767,7 +762,7 @@
             </a:ln>
             <a:extLst>
               <a:ext uri="{91240B29-F687-4f45-9708-019B960494DF}">
-                <a14:hiddenLine xmlns="" xmlns:a14="http://schemas.microsoft.com/office/drawing/2010/main" w="9525">
+                <a14:hiddenLine xmlns:a14="http://schemas.microsoft.com/office/drawing/2010/main" xmlns="" w="9525">
                   <a:solidFill>
                     <a:srgbClr val="000000"/>
                   </a:solidFill>
@@ -829,7 +824,7 @@
             </a:ln>
             <a:extLst>
               <a:ext uri="{91240B29-F687-4f45-9708-019B960494DF}">
-                <a14:hiddenLine xmlns="" xmlns:a14="http://schemas.microsoft.com/office/drawing/2010/main" w="9525">
+                <a14:hiddenLine xmlns:a14="http://schemas.microsoft.com/office/drawing/2010/main" xmlns="" w="9525">
                   <a:solidFill>
                     <a:srgbClr val="000000"/>
                   </a:solidFill>
@@ -891,7 +886,7 @@
             </a:ln>
             <a:extLst>
               <a:ext uri="{91240B29-F687-4f45-9708-019B960494DF}">
-                <a14:hiddenLine xmlns="" xmlns:a14="http://schemas.microsoft.com/office/drawing/2010/main" w="9525">
+                <a14:hiddenLine xmlns:a14="http://schemas.microsoft.com/office/drawing/2010/main" xmlns="" w="9525">
                   <a:solidFill>
                     <a:srgbClr val="000000"/>
                   </a:solidFill>
@@ -981,7 +976,7 @@
             </a:ln>
             <a:extLst>
               <a:ext uri="{91240B29-F687-4f45-9708-019B960494DF}">
-                <a14:hiddenLine xmlns="" xmlns:a14="http://schemas.microsoft.com/office/drawing/2010/main" w="9525">
+                <a14:hiddenLine xmlns:a14="http://schemas.microsoft.com/office/drawing/2010/main" xmlns="" w="9525">
                   <a:solidFill>
                     <a:srgbClr val="000000"/>
                   </a:solidFill>
@@ -1071,7 +1066,7 @@
             </a:ln>
             <a:extLst>
               <a:ext uri="{91240B29-F687-4f45-9708-019B960494DF}">
-                <a14:hiddenLine xmlns="" xmlns:a14="http://schemas.microsoft.com/office/drawing/2010/main" w="9525">
+                <a14:hiddenLine xmlns:a14="http://schemas.microsoft.com/office/drawing/2010/main" xmlns="" w="9525">
                   <a:solidFill>
                     <a:srgbClr val="000000"/>
                   </a:solidFill>
@@ -1133,7 +1128,7 @@
             </a:ln>
             <a:extLst>
               <a:ext uri="{91240B29-F687-4f45-9708-019B960494DF}">
-                <a14:hiddenLine xmlns="" xmlns:a14="http://schemas.microsoft.com/office/drawing/2010/main" w="9525">
+                <a14:hiddenLine xmlns:a14="http://schemas.microsoft.com/office/drawing/2010/main" xmlns="" w="9525">
                   <a:solidFill>
                     <a:srgbClr val="000000"/>
                   </a:solidFill>
@@ -1243,7 +1238,7 @@
             </a:ln>
             <a:extLst>
               <a:ext uri="{91240B29-F687-4f45-9708-019B960494DF}">
-                <a14:hiddenLine xmlns="" xmlns:a14="http://schemas.microsoft.com/office/drawing/2010/main" w="9525">
+                <a14:hiddenLine xmlns:a14="http://schemas.microsoft.com/office/drawing/2010/main" xmlns="" w="9525">
                   <a:solidFill>
                     <a:srgbClr val="000000"/>
                   </a:solidFill>
@@ -1305,7 +1300,7 @@
             </a:ln>
             <a:extLst>
               <a:ext uri="{91240B29-F687-4f45-9708-019B960494DF}">
-                <a14:hiddenLine xmlns="" xmlns:a14="http://schemas.microsoft.com/office/drawing/2010/main" w="9525">
+                <a14:hiddenLine xmlns:a14="http://schemas.microsoft.com/office/drawing/2010/main" xmlns="" w="9525">
                   <a:solidFill>
                     <a:srgbClr val="000000"/>
                   </a:solidFill>
@@ -1395,7 +1390,7 @@
             </a:ln>
             <a:extLst>
               <a:ext uri="{91240B29-F687-4f45-9708-019B960494DF}">
-                <a14:hiddenLine xmlns="" xmlns:a14="http://schemas.microsoft.com/office/drawing/2010/main" w="9525">
+                <a14:hiddenLine xmlns:a14="http://schemas.microsoft.com/office/drawing/2010/main" xmlns="" w="9525">
                   <a:solidFill>
                     <a:srgbClr val="000000"/>
                   </a:solidFill>
@@ -1485,7 +1480,7 @@
             </a:ln>
             <a:extLst>
               <a:ext uri="{91240B29-F687-4f45-9708-019B960494DF}">
-                <a14:hiddenLine xmlns="" xmlns:a14="http://schemas.microsoft.com/office/drawing/2010/main" w="9525">
+                <a14:hiddenLine xmlns:a14="http://schemas.microsoft.com/office/drawing/2010/main" xmlns="" w="9525">
                   <a:solidFill>
                     <a:srgbClr val="000000"/>
                   </a:solidFill>
@@ -1547,7 +1542,7 @@
             </a:ln>
             <a:extLst>
               <a:ext uri="{91240B29-F687-4f45-9708-019B960494DF}">
-                <a14:hiddenLine xmlns="" xmlns:a14="http://schemas.microsoft.com/office/drawing/2010/main" w="9525">
+                <a14:hiddenLine xmlns:a14="http://schemas.microsoft.com/office/drawing/2010/main" xmlns="" w="9525">
                   <a:solidFill>
                     <a:srgbClr val="000000"/>
                   </a:solidFill>
@@ -1637,7 +1632,7 @@
             </a:ln>
             <a:extLst>
               <a:ext uri="{91240B29-F687-4f45-9708-019B960494DF}">
-                <a14:hiddenLine xmlns="" xmlns:a14="http://schemas.microsoft.com/office/drawing/2010/main" w="9525">
+                <a14:hiddenLine xmlns:a14="http://schemas.microsoft.com/office/drawing/2010/main" xmlns="" w="9525">
                   <a:solidFill>
                     <a:srgbClr val="000000"/>
                   </a:solidFill>
@@ -1727,7 +1722,7 @@
             </a:ln>
             <a:extLst>
               <a:ext uri="{91240B29-F687-4f45-9708-019B960494DF}">
-                <a14:hiddenLine xmlns="" xmlns:a14="http://schemas.microsoft.com/office/drawing/2010/main" w="9525">
+                <a14:hiddenLine xmlns:a14="http://schemas.microsoft.com/office/drawing/2010/main" xmlns="" w="9525">
                   <a:solidFill>
                     <a:srgbClr val="000000"/>
                   </a:solidFill>
@@ -1783,7 +1778,7 @@
             </a:ln>
             <a:extLst>
               <a:ext uri="{91240B29-F687-4f45-9708-019B960494DF}">
-                <a14:hiddenLine xmlns="" xmlns:a14="http://schemas.microsoft.com/office/drawing/2010/main" w="9525">
+                <a14:hiddenLine xmlns:a14="http://schemas.microsoft.com/office/drawing/2010/main" xmlns="" w="9525">
                   <a:solidFill>
                     <a:srgbClr val="000000"/>
                   </a:solidFill>
@@ -1873,7 +1868,7 @@
             </a:ln>
             <a:extLst>
               <a:ext uri="{91240B29-F687-4f45-9708-019B960494DF}">
-                <a14:hiddenLine xmlns="" xmlns:a14="http://schemas.microsoft.com/office/drawing/2010/main" w="9525">
+                <a14:hiddenLine xmlns:a14="http://schemas.microsoft.com/office/drawing/2010/main" xmlns="" w="9525">
                   <a:solidFill>
                     <a:srgbClr val="000000"/>
                   </a:solidFill>
@@ -1929,7 +1924,7 @@
             </a:ln>
             <a:extLst>
               <a:ext uri="{91240B29-F687-4f45-9708-019B960494DF}">
-                <a14:hiddenLine xmlns="" xmlns:a14="http://schemas.microsoft.com/office/drawing/2010/main" w="9525">
+                <a14:hiddenLine xmlns:a14="http://schemas.microsoft.com/office/drawing/2010/main" xmlns="" w="9525">
                   <a:solidFill>
                     <a:srgbClr val="000000"/>
                   </a:solidFill>
@@ -2019,7 +2014,7 @@
             </a:ln>
             <a:extLst>
               <a:ext uri="{91240B29-F687-4f45-9708-019B960494DF}">
-                <a14:hiddenLine xmlns="" xmlns:a14="http://schemas.microsoft.com/office/drawing/2010/main" w="9525">
+                <a14:hiddenLine xmlns:a14="http://schemas.microsoft.com/office/drawing/2010/main" xmlns="" w="9525">
                   <a:solidFill>
                     <a:srgbClr val="000000"/>
                   </a:solidFill>
@@ -2087,7 +2082,7 @@
             </a:ln>
             <a:extLst>
               <a:ext uri="{91240B29-F687-4f45-9708-019B960494DF}">
-                <a14:hiddenLine xmlns="" xmlns:a14="http://schemas.microsoft.com/office/drawing/2010/main" w="9525">
+                <a14:hiddenLine xmlns:a14="http://schemas.microsoft.com/office/drawing/2010/main" xmlns="" w="9525">
                   <a:solidFill>
                     <a:srgbClr val="000000"/>
                   </a:solidFill>
@@ -2177,7 +2172,7 @@
             </a:ln>
             <a:extLst>
               <a:ext uri="{91240B29-F687-4f45-9708-019B960494DF}">
-                <a14:hiddenLine xmlns="" xmlns:a14="http://schemas.microsoft.com/office/drawing/2010/main" w="9525">
+                <a14:hiddenLine xmlns:a14="http://schemas.microsoft.com/office/drawing/2010/main" xmlns="" w="9525">
                   <a:solidFill>
                     <a:srgbClr val="000000"/>
                   </a:solidFill>
@@ -2245,7 +2240,7 @@
             </a:ln>
             <a:extLst>
               <a:ext uri="{91240B29-F687-4f45-9708-019B960494DF}">
-                <a14:hiddenLine xmlns="" xmlns:a14="http://schemas.microsoft.com/office/drawing/2010/main" w="9525">
+                <a14:hiddenLine xmlns:a14="http://schemas.microsoft.com/office/drawing/2010/main" xmlns="" w="9525">
                   <a:solidFill>
                     <a:srgbClr val="000000"/>
                   </a:solidFill>
@@ -2335,7 +2330,7 @@
             </a:ln>
             <a:extLst>
               <a:ext uri="{91240B29-F687-4f45-9708-019B960494DF}">
-                <a14:hiddenLine xmlns="" xmlns:a14="http://schemas.microsoft.com/office/drawing/2010/main" w="9525">
+                <a14:hiddenLine xmlns:a14="http://schemas.microsoft.com/office/drawing/2010/main" xmlns="" w="9525">
                   <a:solidFill>
                     <a:srgbClr val="000000"/>
                   </a:solidFill>
@@ -2369,7 +2364,7 @@
             </a:ln>
             <a:extLst>
               <a:ext uri="{91240B29-F687-4f45-9708-019B960494DF}">
-                <a14:hiddenLine xmlns="" xmlns:a14="http://schemas.microsoft.com/office/drawing/2010/main" w="9525">
+                <a14:hiddenLine xmlns:a14="http://schemas.microsoft.com/office/drawing/2010/main" xmlns="" w="9525">
                   <a:solidFill>
                     <a:srgbClr val="000000"/>
                   </a:solidFill>
@@ -2459,7 +2454,7 @@
             </a:ln>
             <a:extLst>
               <a:ext uri="{91240B29-F687-4f45-9708-019B960494DF}">
-                <a14:hiddenLine xmlns="" xmlns:a14="http://schemas.microsoft.com/office/drawing/2010/main" w="9525">
+                <a14:hiddenLine xmlns:a14="http://schemas.microsoft.com/office/drawing/2010/main" xmlns="" w="9525">
                   <a:solidFill>
                     <a:srgbClr val="000000"/>
                   </a:solidFill>
@@ -2521,7 +2516,7 @@
             </a:ln>
             <a:extLst>
               <a:ext uri="{91240B29-F687-4f45-9708-019B960494DF}">
-                <a14:hiddenLine xmlns="" xmlns:a14="http://schemas.microsoft.com/office/drawing/2010/main" w="9525">
+                <a14:hiddenLine xmlns:a14="http://schemas.microsoft.com/office/drawing/2010/main" xmlns="" w="9525">
                   <a:solidFill>
                     <a:srgbClr val="000000"/>
                   </a:solidFill>
@@ -2583,7 +2578,7 @@
             </a:ln>
             <a:extLst>
               <a:ext uri="{91240B29-F687-4f45-9708-019B960494DF}">
-                <a14:hiddenLine xmlns="" xmlns:a14="http://schemas.microsoft.com/office/drawing/2010/main" w="9525">
+                <a14:hiddenLine xmlns:a14="http://schemas.microsoft.com/office/drawing/2010/main" xmlns="" w="9525">
                   <a:solidFill>
                     <a:srgbClr val="000000"/>
                   </a:solidFill>
@@ -2673,7 +2668,7 @@
             </a:ln>
             <a:extLst>
               <a:ext uri="{91240B29-F687-4f45-9708-019B960494DF}">
-                <a14:hiddenLine xmlns="" xmlns:a14="http://schemas.microsoft.com/office/drawing/2010/main" w="9525">
+                <a14:hiddenLine xmlns:a14="http://schemas.microsoft.com/office/drawing/2010/main" xmlns="" w="9525">
                   <a:solidFill>
                     <a:srgbClr val="000000"/>
                   </a:solidFill>
@@ -2741,7 +2736,7 @@
             </a:ln>
             <a:extLst>
               <a:ext uri="{91240B29-F687-4f45-9708-019B960494DF}">
-                <a14:hiddenLine xmlns="" xmlns:a14="http://schemas.microsoft.com/office/drawing/2010/main" w="9525">
+                <a14:hiddenLine xmlns:a14="http://schemas.microsoft.com/office/drawing/2010/main" xmlns="" w="9525">
                   <a:solidFill>
                     <a:srgbClr val="000000"/>
                   </a:solidFill>
@@ -2803,7 +2798,7 @@
             </a:ln>
             <a:extLst>
               <a:ext uri="{91240B29-F687-4f45-9708-019B960494DF}">
-                <a14:hiddenLine xmlns="" xmlns:a14="http://schemas.microsoft.com/office/drawing/2010/main" w="9525">
+                <a14:hiddenLine xmlns:a14="http://schemas.microsoft.com/office/drawing/2010/main" xmlns="" w="9525">
                   <a:solidFill>
                     <a:srgbClr val="000000"/>
                   </a:solidFill>
@@ -2893,7 +2888,7 @@
             </a:ln>
             <a:extLst>
               <a:ext uri="{91240B29-F687-4f45-9708-019B960494DF}">
-                <a14:hiddenLine xmlns="" xmlns:a14="http://schemas.microsoft.com/office/drawing/2010/main" w="9525">
+                <a14:hiddenLine xmlns:a14="http://schemas.microsoft.com/office/drawing/2010/main" xmlns="" w="9525">
                   <a:solidFill>
                     <a:srgbClr val="000000"/>
                   </a:solidFill>
@@ -2955,7 +2950,7 @@
             </a:ln>
             <a:extLst>
               <a:ext uri="{91240B29-F687-4f45-9708-019B960494DF}">
-                <a14:hiddenLine xmlns="" xmlns:a14="http://schemas.microsoft.com/office/drawing/2010/main" w="9525">
+                <a14:hiddenLine xmlns:a14="http://schemas.microsoft.com/office/drawing/2010/main" xmlns="" w="9525">
                   <a:solidFill>
                     <a:srgbClr val="000000"/>
                   </a:solidFill>
@@ -3045,7 +3040,7 @@
             </a:ln>
             <a:extLst>
               <a:ext uri="{91240B29-F687-4f45-9708-019B960494DF}">
-                <a14:hiddenLine xmlns="" xmlns:a14="http://schemas.microsoft.com/office/drawing/2010/main" w="9525">
+                <a14:hiddenLine xmlns:a14="http://schemas.microsoft.com/office/drawing/2010/main" xmlns="" w="9525">
                   <a:solidFill>
                     <a:srgbClr val="000000"/>
                   </a:solidFill>
@@ -3107,7 +3102,7 @@
             </a:ln>
             <a:extLst>
               <a:ext uri="{91240B29-F687-4f45-9708-019B960494DF}">
-                <a14:hiddenLine xmlns="" xmlns:a14="http://schemas.microsoft.com/office/drawing/2010/main" w="9525">
+                <a14:hiddenLine xmlns:a14="http://schemas.microsoft.com/office/drawing/2010/main" xmlns="" w="9525">
                   <a:solidFill>
                     <a:srgbClr val="000000"/>
                   </a:solidFill>
@@ -3197,7 +3192,7 @@
             </a:ln>
             <a:extLst>
               <a:ext uri="{91240B29-F687-4f45-9708-019B960494DF}">
-                <a14:hiddenLine xmlns="" xmlns:a14="http://schemas.microsoft.com/office/drawing/2010/main" w="9525">
+                <a14:hiddenLine xmlns:a14="http://schemas.microsoft.com/office/drawing/2010/main" xmlns="" w="9525">
                   <a:solidFill>
                     <a:srgbClr val="000000"/>
                   </a:solidFill>
@@ -3231,7 +3226,7 @@
             </a:ln>
             <a:extLst>
               <a:ext uri="{91240B29-F687-4f45-9708-019B960494DF}">
-                <a14:hiddenLine xmlns="" xmlns:a14="http://schemas.microsoft.com/office/drawing/2010/main" w="9525">
+                <a14:hiddenLine xmlns:a14="http://schemas.microsoft.com/office/drawing/2010/main" xmlns="" w="9525">
                   <a:solidFill>
                     <a:srgbClr val="000000"/>
                   </a:solidFill>
@@ -3296,7 +3291,7 @@
             </a:ln>
             <a:extLst>
               <a:ext uri="{91240B29-F687-4f45-9708-019B960494DF}">
-                <a14:hiddenLine xmlns="" xmlns:a14="http://schemas.microsoft.com/office/drawing/2010/main" w="9525">
+                <a14:hiddenLine xmlns:a14="http://schemas.microsoft.com/office/drawing/2010/main" xmlns="" w="9525">
                   <a:solidFill>
                     <a:srgbClr val="000000"/>
                   </a:solidFill>
@@ -3386,7 +3381,7 @@
             </a:ln>
             <a:extLst>
               <a:ext uri="{91240B29-F687-4f45-9708-019B960494DF}">
-                <a14:hiddenLine xmlns="" xmlns:a14="http://schemas.microsoft.com/office/drawing/2010/main" w="9525">
+                <a14:hiddenLine xmlns:a14="http://schemas.microsoft.com/office/drawing/2010/main" xmlns="" w="9525">
                   <a:solidFill>
                     <a:srgbClr val="000000"/>
                   </a:solidFill>
@@ -3448,7 +3443,7 @@
             </a:ln>
             <a:extLst>
               <a:ext uri="{91240B29-F687-4f45-9708-019B960494DF}">
-                <a14:hiddenLine xmlns="" xmlns:a14="http://schemas.microsoft.com/office/drawing/2010/main" w="9525">
+                <a14:hiddenLine xmlns:a14="http://schemas.microsoft.com/office/drawing/2010/main" xmlns="" w="9525">
                   <a:solidFill>
                     <a:srgbClr val="000000"/>
                   </a:solidFill>
@@ -3538,7 +3533,7 @@
             </a:ln>
             <a:extLst>
               <a:ext uri="{91240B29-F687-4f45-9708-019B960494DF}">
-                <a14:hiddenLine xmlns="" xmlns:a14="http://schemas.microsoft.com/office/drawing/2010/main" w="9525">
+                <a14:hiddenLine xmlns:a14="http://schemas.microsoft.com/office/drawing/2010/main" xmlns="" w="9525">
                   <a:solidFill>
                     <a:srgbClr val="000000"/>
                   </a:solidFill>
@@ -3628,7 +3623,7 @@
             </a:ln>
             <a:extLst>
               <a:ext uri="{91240B29-F687-4f45-9708-019B960494DF}">
-                <a14:hiddenLine xmlns="" xmlns:a14="http://schemas.microsoft.com/office/drawing/2010/main" w="9525">
+                <a14:hiddenLine xmlns:a14="http://schemas.microsoft.com/office/drawing/2010/main" xmlns="" w="9525">
                   <a:solidFill>
                     <a:srgbClr val="000000"/>
                   </a:solidFill>
@@ -3693,7 +3688,7 @@
             </a:ln>
             <a:extLst>
               <a:ext uri="{91240B29-F687-4f45-9708-019B960494DF}">
-                <a14:hiddenLine xmlns="" xmlns:a14="http://schemas.microsoft.com/office/drawing/2010/main" w="9525">
+                <a14:hiddenLine xmlns:a14="http://schemas.microsoft.com/office/drawing/2010/main" xmlns="" w="9525">
                   <a:solidFill>
                     <a:srgbClr val="000000"/>
                   </a:solidFill>
@@ -3755,7 +3750,7 @@
             </a:ln>
             <a:extLst>
               <a:ext uri="{91240B29-F687-4f45-9708-019B960494DF}">
-                <a14:hiddenLine xmlns="" xmlns:a14="http://schemas.microsoft.com/office/drawing/2010/main" w="9525">
+                <a14:hiddenLine xmlns:a14="http://schemas.microsoft.com/office/drawing/2010/main" xmlns="" w="9525">
                   <a:solidFill>
                     <a:srgbClr val="000000"/>
                   </a:solidFill>
@@ -3845,7 +3840,7 @@
             </a:ln>
             <a:extLst>
               <a:ext uri="{91240B29-F687-4f45-9708-019B960494DF}">
-                <a14:hiddenLine xmlns="" xmlns:a14="http://schemas.microsoft.com/office/drawing/2010/main" w="9525">
+                <a14:hiddenLine xmlns:a14="http://schemas.microsoft.com/office/drawing/2010/main" xmlns="" w="9525">
                   <a:solidFill>
                     <a:srgbClr val="000000"/>
                   </a:solidFill>
@@ -3935,7 +3930,7 @@
             </a:ln>
             <a:extLst>
               <a:ext uri="{91240B29-F687-4f45-9708-019B960494DF}">
-                <a14:hiddenLine xmlns="" xmlns:a14="http://schemas.microsoft.com/office/drawing/2010/main" w="9525">
+                <a14:hiddenLine xmlns:a14="http://schemas.microsoft.com/office/drawing/2010/main" xmlns="" w="9525">
                   <a:solidFill>
                     <a:srgbClr val="000000"/>
                   </a:solidFill>
@@ -3997,7 +3992,7 @@
             </a:ln>
             <a:extLst>
               <a:ext uri="{91240B29-F687-4f45-9708-019B960494DF}">
-                <a14:hiddenLine xmlns="" xmlns:a14="http://schemas.microsoft.com/office/drawing/2010/main" w="9525">
+                <a14:hiddenLine xmlns:a14="http://schemas.microsoft.com/office/drawing/2010/main" xmlns="" w="9525">
                   <a:solidFill>
                     <a:srgbClr val="000000"/>
                   </a:solidFill>
@@ -4117,7 +4112,7 @@
             </a:ln>
             <a:extLst>
               <a:ext uri="{91240B29-F687-4f45-9708-019B960494DF}">
-                <a14:hiddenLine xmlns="" xmlns:a14="http://schemas.microsoft.com/office/drawing/2010/main" w="9525">
+                <a14:hiddenLine xmlns:a14="http://schemas.microsoft.com/office/drawing/2010/main" xmlns="" w="9525">
                   <a:solidFill>
                     <a:srgbClr val="000000"/>
                   </a:solidFill>
@@ -4185,7 +4180,7 @@
             </a:ln>
             <a:extLst>
               <a:ext uri="{91240B29-F687-4f45-9708-019B960494DF}">
-                <a14:hiddenLine xmlns="" xmlns:a14="http://schemas.microsoft.com/office/drawing/2010/main" w="9525">
+                <a14:hiddenLine xmlns:a14="http://schemas.microsoft.com/office/drawing/2010/main" xmlns="" w="9525">
                   <a:solidFill>
                     <a:srgbClr val="000000"/>
                   </a:solidFill>
@@ -4275,7 +4270,7 @@
             </a:ln>
             <a:extLst>
               <a:ext uri="{91240B29-F687-4f45-9708-019B960494DF}">
-                <a14:hiddenLine xmlns="" xmlns:a14="http://schemas.microsoft.com/office/drawing/2010/main" w="9525">
+                <a14:hiddenLine xmlns:a14="http://schemas.microsoft.com/office/drawing/2010/main" xmlns="" w="9525">
                   <a:solidFill>
                     <a:srgbClr val="000000"/>
                   </a:solidFill>
@@ -4415,7 +4410,7 @@
           <a:p>
             <a:fld id="{48A87A34-81AB-432B-8DAE-1953F412C126}" type="datetimeFigureOut">
               <a:rPr lang="en-US" dirty="0"/>
-              <a:t>11/27/2016</a:t>
+              <a:t>11/28/2016</a:t>
             </a:fld>
             <a:endParaRPr lang="en-US" dirty="0"/>
           </a:p>
@@ -4677,7 +4672,7 @@
           <a:p>
             <a:fld id="{48A87A34-81AB-432B-8DAE-1953F412C126}" type="datetimeFigureOut">
               <a:rPr lang="en-US" dirty="0"/>
-              <a:t>11/27/2016</a:t>
+              <a:t>11/28/2016</a:t>
             </a:fld>
             <a:endParaRPr lang="en-US" dirty="0"/>
           </a:p>
@@ -4868,7 +4863,7 @@
           <a:p>
             <a:fld id="{48A87A34-81AB-432B-8DAE-1953F412C126}" type="datetimeFigureOut">
               <a:rPr lang="en-US" dirty="0"/>
-              <a:t>11/27/2016</a:t>
+              <a:t>11/28/2016</a:t>
             </a:fld>
             <a:endParaRPr lang="en-US" dirty="0"/>
           </a:p>
@@ -5126,7 +5121,7 @@
           <a:p>
             <a:fld id="{48A87A34-81AB-432B-8DAE-1953F412C126}" type="datetimeFigureOut">
               <a:rPr lang="en-US" dirty="0"/>
-              <a:t>11/27/2016</a:t>
+              <a:t>11/28/2016</a:t>
             </a:fld>
             <a:endParaRPr lang="en-US" dirty="0"/>
           </a:p>
@@ -5555,7 +5550,7 @@
           <a:p>
             <a:fld id="{48A87A34-81AB-432B-8DAE-1953F412C126}" type="datetimeFigureOut">
               <a:rPr lang="en-US" dirty="0"/>
-              <a:t>11/27/2016</a:t>
+              <a:t>11/28/2016</a:t>
             </a:fld>
             <a:endParaRPr lang="en-US" dirty="0"/>
           </a:p>
@@ -6096,7 +6091,7 @@
           <a:p>
             <a:fld id="{48A87A34-81AB-432B-8DAE-1953F412C126}" type="datetimeFigureOut">
               <a:rPr lang="en-US" dirty="0"/>
-              <a:t>11/27/2016</a:t>
+              <a:t>11/28/2016</a:t>
             </a:fld>
             <a:endParaRPr lang="en-US" dirty="0"/>
           </a:p>
@@ -6811,7 +6806,7 @@
           <a:p>
             <a:fld id="{48A87A34-81AB-432B-8DAE-1953F412C126}" type="datetimeFigureOut">
               <a:rPr lang="en-US" dirty="0"/>
-              <a:t>11/27/2016</a:t>
+              <a:t>11/28/2016</a:t>
             </a:fld>
             <a:endParaRPr lang="en-US" dirty="0"/>
           </a:p>
@@ -6976,7 +6971,7 @@
           <a:p>
             <a:fld id="{48A87A34-81AB-432B-8DAE-1953F412C126}" type="datetimeFigureOut">
               <a:rPr lang="en-US" dirty="0"/>
-              <a:t>11/27/2016</a:t>
+              <a:t>11/28/2016</a:t>
             </a:fld>
             <a:endParaRPr lang="en-US" dirty="0"/>
           </a:p>
@@ -7151,7 +7146,7 @@
           <a:p>
             <a:fld id="{48A87A34-81AB-432B-8DAE-1953F412C126}" type="datetimeFigureOut">
               <a:rPr lang="en-US" dirty="0"/>
-              <a:t>11/27/2016</a:t>
+              <a:t>11/28/2016</a:t>
             </a:fld>
             <a:endParaRPr lang="en-US" dirty="0"/>
           </a:p>
@@ -7316,7 +7311,7 @@
           <a:p>
             <a:fld id="{48A87A34-81AB-432B-8DAE-1953F412C126}" type="datetimeFigureOut">
               <a:rPr lang="en-US" dirty="0"/>
-              <a:t>11/27/2016</a:t>
+              <a:t>11/28/2016</a:t>
             </a:fld>
             <a:endParaRPr lang="en-US" dirty="0"/>
           </a:p>
@@ -7561,7 +7556,7 @@
           <a:p>
             <a:fld id="{48A87A34-81AB-432B-8DAE-1953F412C126}" type="datetimeFigureOut">
               <a:rPr lang="en-US" dirty="0"/>
-              <a:t>11/27/2016</a:t>
+              <a:t>11/28/2016</a:t>
             </a:fld>
             <a:endParaRPr lang="en-US" dirty="0"/>
           </a:p>
@@ -7788,7 +7783,7 @@
           <a:p>
             <a:fld id="{48A87A34-81AB-432B-8DAE-1953F412C126}" type="datetimeFigureOut">
               <a:rPr lang="en-US" dirty="0"/>
-              <a:t>11/27/2016</a:t>
+              <a:t>11/28/2016</a:t>
             </a:fld>
             <a:endParaRPr lang="en-US" dirty="0"/>
           </a:p>
@@ -8164,7 +8159,7 @@
           <a:p>
             <a:fld id="{48A87A34-81AB-432B-8DAE-1953F412C126}" type="datetimeFigureOut">
               <a:rPr lang="en-US" dirty="0"/>
-              <a:t>11/27/2016</a:t>
+              <a:t>11/28/2016</a:t>
             </a:fld>
             <a:endParaRPr lang="en-US" dirty="0"/>
           </a:p>
@@ -8277,7 +8272,7 @@
           <a:p>
             <a:fld id="{48A87A34-81AB-432B-8DAE-1953F412C126}" type="datetimeFigureOut">
               <a:rPr lang="en-US" dirty="0"/>
-              <a:t>11/27/2016</a:t>
+              <a:t>11/28/2016</a:t>
             </a:fld>
             <a:endParaRPr lang="en-US" dirty="0"/>
           </a:p>
@@ -8367,7 +8362,7 @@
           <a:p>
             <a:fld id="{48A87A34-81AB-432B-8DAE-1953F412C126}" type="datetimeFigureOut">
               <a:rPr lang="en-US" dirty="0"/>
-              <a:t>11/27/2016</a:t>
+              <a:t>11/28/2016</a:t>
             </a:fld>
             <a:endParaRPr lang="en-US" dirty="0"/>
           </a:p>
@@ -8611,7 +8606,7 @@
           <a:p>
             <a:fld id="{48A87A34-81AB-432B-8DAE-1953F412C126}" type="datetimeFigureOut">
               <a:rPr lang="en-US" dirty="0"/>
-              <a:t>11/27/2016</a:t>
+              <a:t>11/28/2016</a:t>
             </a:fld>
             <a:endParaRPr lang="en-US" dirty="0"/>
           </a:p>
@@ -8886,7 +8881,7 @@
           <a:p>
             <a:fld id="{48A87A34-81AB-432B-8DAE-1953F412C126}" type="datetimeFigureOut">
               <a:rPr lang="en-US" dirty="0"/>
-              <a:t>11/27/2016</a:t>
+              <a:t>11/28/2016</a:t>
             </a:fld>
             <a:endParaRPr lang="en-US" dirty="0"/>
           </a:p>
@@ -9004,7 +8999,7 @@
           <a:noFill/>
           <a:extLst>
             <a:ext uri="{909E8E84-426E-40dd-AFC4-6F175D3DCCD1}">
-              <a14:hiddenFill xmlns="" xmlns:a14="http://schemas.microsoft.com/office/drawing/2010/main">
+              <a14:hiddenFill xmlns:a14="http://schemas.microsoft.com/office/drawing/2010/main" xmlns="">
                 <a:solidFill>
                   <a:srgbClr val="FFFFFF"/>
                 </a:solidFill>
@@ -9078,7 +9073,7 @@
               </a:ln>
               <a:extLst>
                 <a:ext uri="{91240B29-F687-4f45-9708-019B960494DF}">
-                  <a14:hiddenLine xmlns="" xmlns:a14="http://schemas.microsoft.com/office/drawing/2010/main" w="9525">
+                  <a14:hiddenLine xmlns:a14="http://schemas.microsoft.com/office/drawing/2010/main" xmlns="" w="9525">
                     <a:solidFill>
                       <a:srgbClr val="000000"/>
                     </a:solidFill>
@@ -9168,7 +9163,7 @@
               </a:ln>
               <a:extLst>
                 <a:ext uri="{91240B29-F687-4f45-9708-019B960494DF}">
-                  <a14:hiddenLine xmlns="" xmlns:a14="http://schemas.microsoft.com/office/drawing/2010/main" w="9525">
+                  <a14:hiddenLine xmlns:a14="http://schemas.microsoft.com/office/drawing/2010/main" xmlns="" w="9525">
                     <a:solidFill>
                       <a:srgbClr val="000000"/>
                     </a:solidFill>
@@ -9258,7 +9253,7 @@
               </a:ln>
               <a:extLst>
                 <a:ext uri="{91240B29-F687-4f45-9708-019B960494DF}">
-                  <a14:hiddenLine xmlns="" xmlns:a14="http://schemas.microsoft.com/office/drawing/2010/main" w="9525">
+                  <a14:hiddenLine xmlns:a14="http://schemas.microsoft.com/office/drawing/2010/main" xmlns="" w="9525">
                     <a:solidFill>
                       <a:srgbClr val="000000"/>
                     </a:solidFill>
@@ -9320,7 +9315,7 @@
               </a:ln>
               <a:extLst>
                 <a:ext uri="{91240B29-F687-4f45-9708-019B960494DF}">
-                  <a14:hiddenLine xmlns="" xmlns:a14="http://schemas.microsoft.com/office/drawing/2010/main" w="9525">
+                  <a14:hiddenLine xmlns:a14="http://schemas.microsoft.com/office/drawing/2010/main" xmlns="" w="9525">
                     <a:solidFill>
                       <a:srgbClr val="000000"/>
                     </a:solidFill>
@@ -9410,7 +9405,7 @@
               </a:ln>
               <a:extLst>
                 <a:ext uri="{91240B29-F687-4f45-9708-019B960494DF}">
-                  <a14:hiddenLine xmlns="" xmlns:a14="http://schemas.microsoft.com/office/drawing/2010/main" w="9525">
+                  <a14:hiddenLine xmlns:a14="http://schemas.microsoft.com/office/drawing/2010/main" xmlns="" w="9525">
                     <a:solidFill>
                       <a:srgbClr val="000000"/>
                     </a:solidFill>
@@ -9472,7 +9467,7 @@
               </a:ln>
               <a:extLst>
                 <a:ext uri="{91240B29-F687-4f45-9708-019B960494DF}">
-                  <a14:hiddenLine xmlns="" xmlns:a14="http://schemas.microsoft.com/office/drawing/2010/main" w="9525">
+                  <a14:hiddenLine xmlns:a14="http://schemas.microsoft.com/office/drawing/2010/main" xmlns="" w="9525">
                     <a:solidFill>
                       <a:srgbClr val="000000"/>
                     </a:solidFill>
@@ -9534,7 +9529,7 @@
               </a:ln>
               <a:extLst>
                 <a:ext uri="{91240B29-F687-4f45-9708-019B960494DF}">
-                  <a14:hiddenLine xmlns="" xmlns:a14="http://schemas.microsoft.com/office/drawing/2010/main" w="9525">
+                  <a14:hiddenLine xmlns:a14="http://schemas.microsoft.com/office/drawing/2010/main" xmlns="" w="9525">
                     <a:solidFill>
                       <a:srgbClr val="000000"/>
                     </a:solidFill>
@@ -9624,7 +9619,7 @@
               </a:ln>
               <a:extLst>
                 <a:ext uri="{91240B29-F687-4f45-9708-019B960494DF}">
-                  <a14:hiddenLine xmlns="" xmlns:a14="http://schemas.microsoft.com/office/drawing/2010/main" w="9525">
+                  <a14:hiddenLine xmlns:a14="http://schemas.microsoft.com/office/drawing/2010/main" xmlns="" w="9525">
                     <a:solidFill>
                       <a:srgbClr val="000000"/>
                     </a:solidFill>
@@ -9714,7 +9709,7 @@
               </a:ln>
               <a:extLst>
                 <a:ext uri="{91240B29-F687-4f45-9708-019B960494DF}">
-                  <a14:hiddenLine xmlns="" xmlns:a14="http://schemas.microsoft.com/office/drawing/2010/main" w="9525">
+                  <a14:hiddenLine xmlns:a14="http://schemas.microsoft.com/office/drawing/2010/main" xmlns="" w="9525">
                     <a:solidFill>
                       <a:srgbClr val="000000"/>
                     </a:solidFill>
@@ -9776,7 +9771,7 @@
               </a:ln>
               <a:extLst>
                 <a:ext uri="{91240B29-F687-4f45-9708-019B960494DF}">
-                  <a14:hiddenLine xmlns="" xmlns:a14="http://schemas.microsoft.com/office/drawing/2010/main" w="9525">
+                  <a14:hiddenLine xmlns:a14="http://schemas.microsoft.com/office/drawing/2010/main" xmlns="" w="9525">
                     <a:solidFill>
                       <a:srgbClr val="000000"/>
                     </a:solidFill>
@@ -9886,7 +9881,7 @@
               </a:ln>
               <a:extLst>
                 <a:ext uri="{91240B29-F687-4f45-9708-019B960494DF}">
-                  <a14:hiddenLine xmlns="" xmlns:a14="http://schemas.microsoft.com/office/drawing/2010/main" w="9525">
+                  <a14:hiddenLine xmlns:a14="http://schemas.microsoft.com/office/drawing/2010/main" xmlns="" w="9525">
                     <a:solidFill>
                       <a:srgbClr val="000000"/>
                     </a:solidFill>
@@ -9970,7 +9965,7 @@
               </a:ln>
               <a:extLst>
                 <a:ext uri="{91240B29-F687-4f45-9708-019B960494DF}">
-                  <a14:hiddenLine xmlns="" xmlns:a14="http://schemas.microsoft.com/office/drawing/2010/main" w="9525">
+                  <a14:hiddenLine xmlns:a14="http://schemas.microsoft.com/office/drawing/2010/main" xmlns="" w="9525">
                     <a:solidFill>
                       <a:srgbClr val="000000"/>
                     </a:solidFill>
@@ -10032,7 +10027,7 @@
               </a:ln>
               <a:extLst>
                 <a:ext uri="{91240B29-F687-4f45-9708-019B960494DF}">
-                  <a14:hiddenLine xmlns="" xmlns:a14="http://schemas.microsoft.com/office/drawing/2010/main" w="9525">
+                  <a14:hiddenLine xmlns:a14="http://schemas.microsoft.com/office/drawing/2010/main" xmlns="" w="9525">
                     <a:solidFill>
                       <a:srgbClr val="000000"/>
                     </a:solidFill>
@@ -10094,7 +10089,7 @@
               </a:ln>
               <a:extLst>
                 <a:ext uri="{91240B29-F687-4f45-9708-019B960494DF}">
-                  <a14:hiddenLine xmlns="" xmlns:a14="http://schemas.microsoft.com/office/drawing/2010/main" w="9525">
+                  <a14:hiddenLine xmlns:a14="http://schemas.microsoft.com/office/drawing/2010/main" xmlns="" w="9525">
                     <a:solidFill>
                       <a:srgbClr val="000000"/>
                     </a:solidFill>
@@ -10184,7 +10179,7 @@
               </a:ln>
               <a:extLst>
                 <a:ext uri="{91240B29-F687-4f45-9708-019B960494DF}">
-                  <a14:hiddenLine xmlns="" xmlns:a14="http://schemas.microsoft.com/office/drawing/2010/main" w="9525">
+                  <a14:hiddenLine xmlns:a14="http://schemas.microsoft.com/office/drawing/2010/main" xmlns="" w="9525">
                     <a:solidFill>
                       <a:srgbClr val="000000"/>
                     </a:solidFill>
@@ -10218,7 +10213,7 @@
               </a:ln>
               <a:extLst>
                 <a:ext uri="{91240B29-F687-4f45-9708-019B960494DF}">
-                  <a14:hiddenLine xmlns="" xmlns:a14="http://schemas.microsoft.com/office/drawing/2010/main" w="9525">
+                  <a14:hiddenLine xmlns:a14="http://schemas.microsoft.com/office/drawing/2010/main" xmlns="" w="9525">
                     <a:solidFill>
                       <a:srgbClr val="000000"/>
                     </a:solidFill>
@@ -10283,7 +10278,7 @@
               </a:ln>
               <a:extLst>
                 <a:ext uri="{91240B29-F687-4f45-9708-019B960494DF}">
-                  <a14:hiddenLine xmlns="" xmlns:a14="http://schemas.microsoft.com/office/drawing/2010/main" w="9525">
+                  <a14:hiddenLine xmlns:a14="http://schemas.microsoft.com/office/drawing/2010/main" xmlns="" w="9525">
                     <a:solidFill>
                       <a:srgbClr val="000000"/>
                     </a:solidFill>
@@ -10373,7 +10368,7 @@
               </a:ln>
               <a:extLst>
                 <a:ext uri="{91240B29-F687-4f45-9708-019B960494DF}">
-                  <a14:hiddenLine xmlns="" xmlns:a14="http://schemas.microsoft.com/office/drawing/2010/main" w="9525">
+                  <a14:hiddenLine xmlns:a14="http://schemas.microsoft.com/office/drawing/2010/main" xmlns="" w="9525">
                     <a:solidFill>
                       <a:srgbClr val="000000"/>
                     </a:solidFill>
@@ -10435,7 +10430,7 @@
               </a:ln>
               <a:extLst>
                 <a:ext uri="{91240B29-F687-4f45-9708-019B960494DF}">
-                  <a14:hiddenLine xmlns="" xmlns:a14="http://schemas.microsoft.com/office/drawing/2010/main" w="9525">
+                  <a14:hiddenLine xmlns:a14="http://schemas.microsoft.com/office/drawing/2010/main" xmlns="" w="9525">
                     <a:solidFill>
                       <a:srgbClr val="000000"/>
                     </a:solidFill>
@@ -10525,7 +10520,7 @@
               </a:ln>
               <a:extLst>
                 <a:ext uri="{91240B29-F687-4f45-9708-019B960494DF}">
-                  <a14:hiddenLine xmlns="" xmlns:a14="http://schemas.microsoft.com/office/drawing/2010/main" w="9525">
+                  <a14:hiddenLine xmlns:a14="http://schemas.microsoft.com/office/drawing/2010/main" xmlns="" w="9525">
                     <a:solidFill>
                       <a:srgbClr val="000000"/>
                     </a:solidFill>
@@ -10590,7 +10585,7 @@
               </a:ln>
               <a:extLst>
                 <a:ext uri="{91240B29-F687-4f45-9708-019B960494DF}">
-                  <a14:hiddenLine xmlns="" xmlns:a14="http://schemas.microsoft.com/office/drawing/2010/main" w="9525">
+                  <a14:hiddenLine xmlns:a14="http://schemas.microsoft.com/office/drawing/2010/main" xmlns="" w="9525">
                     <a:solidFill>
                       <a:srgbClr val="000000"/>
                     </a:solidFill>
@@ -10652,7 +10647,7 @@
               </a:ln>
               <a:extLst>
                 <a:ext uri="{91240B29-F687-4f45-9708-019B960494DF}">
-                  <a14:hiddenLine xmlns="" xmlns:a14="http://schemas.microsoft.com/office/drawing/2010/main" w="9525">
+                  <a14:hiddenLine xmlns:a14="http://schemas.microsoft.com/office/drawing/2010/main" xmlns="" w="9525">
                     <a:solidFill>
                       <a:srgbClr val="000000"/>
                     </a:solidFill>
@@ -10742,7 +10737,7 @@
               </a:ln>
               <a:extLst>
                 <a:ext uri="{91240B29-F687-4f45-9708-019B960494DF}">
-                  <a14:hiddenLine xmlns="" xmlns:a14="http://schemas.microsoft.com/office/drawing/2010/main" w="9525">
+                  <a14:hiddenLine xmlns:a14="http://schemas.microsoft.com/office/drawing/2010/main" xmlns="" w="9525">
                     <a:solidFill>
                       <a:srgbClr val="000000"/>
                     </a:solidFill>
@@ -10832,7 +10827,7 @@
               </a:ln>
               <a:extLst>
                 <a:ext uri="{91240B29-F687-4f45-9708-019B960494DF}">
-                  <a14:hiddenLine xmlns="" xmlns:a14="http://schemas.microsoft.com/office/drawing/2010/main" w="9525">
+                  <a14:hiddenLine xmlns:a14="http://schemas.microsoft.com/office/drawing/2010/main" xmlns="" w="9525">
                     <a:solidFill>
                       <a:srgbClr val="000000"/>
                     </a:solidFill>
@@ -10897,7 +10892,7 @@
               </a:ln>
               <a:extLst>
                 <a:ext uri="{91240B29-F687-4f45-9708-019B960494DF}">
-                  <a14:hiddenLine xmlns="" xmlns:a14="http://schemas.microsoft.com/office/drawing/2010/main" w="9525">
+                  <a14:hiddenLine xmlns:a14="http://schemas.microsoft.com/office/drawing/2010/main" xmlns="" w="9525">
                     <a:solidFill>
                       <a:srgbClr val="000000"/>
                     </a:solidFill>
@@ -11017,7 +11012,7 @@
               </a:ln>
               <a:extLst>
                 <a:ext uri="{91240B29-F687-4f45-9708-019B960494DF}">
-                  <a14:hiddenLine xmlns="" xmlns:a14="http://schemas.microsoft.com/office/drawing/2010/main" w="9525">
+                  <a14:hiddenLine xmlns:a14="http://schemas.microsoft.com/office/drawing/2010/main" xmlns="" w="9525">
                     <a:solidFill>
                       <a:srgbClr val="000000"/>
                     </a:solidFill>
@@ -11098,7 +11093,7 @@
               </a:ln>
               <a:extLst>
                 <a:ext uri="{91240B29-F687-4f45-9708-019B960494DF}">
-                  <a14:hiddenLine xmlns="" xmlns:a14="http://schemas.microsoft.com/office/drawing/2010/main" w="9525">
+                  <a14:hiddenLine xmlns:a14="http://schemas.microsoft.com/office/drawing/2010/main" xmlns="" w="9525">
                     <a:solidFill>
                       <a:srgbClr val="000000"/>
                     </a:solidFill>
@@ -11213,7 +11208,7 @@
               </a:ln>
               <a:extLst>
                 <a:ext uri="{91240B29-F687-4f45-9708-019B960494DF}">
-                  <a14:hiddenLine xmlns="" xmlns:a14="http://schemas.microsoft.com/office/drawing/2010/main" w="9525">
+                  <a14:hiddenLine xmlns:a14="http://schemas.microsoft.com/office/drawing/2010/main" xmlns="" w="9525">
                     <a:solidFill>
                       <a:srgbClr val="000000"/>
                     </a:solidFill>
@@ -11303,7 +11298,7 @@
               </a:ln>
               <a:extLst>
                 <a:ext uri="{91240B29-F687-4f45-9708-019B960494DF}">
-                  <a14:hiddenLine xmlns="" xmlns:a14="http://schemas.microsoft.com/office/drawing/2010/main" w="9525">
+                  <a14:hiddenLine xmlns:a14="http://schemas.microsoft.com/office/drawing/2010/main" xmlns="" w="9525">
                     <a:solidFill>
                       <a:srgbClr val="000000"/>
                     </a:solidFill>
@@ -11368,7 +11363,7 @@
               </a:ln>
               <a:extLst>
                 <a:ext uri="{91240B29-F687-4f45-9708-019B960494DF}">
-                  <a14:hiddenLine xmlns="" xmlns:a14="http://schemas.microsoft.com/office/drawing/2010/main" w="9525">
+                  <a14:hiddenLine xmlns:a14="http://schemas.microsoft.com/office/drawing/2010/main" xmlns="" w="9525">
                     <a:solidFill>
                       <a:srgbClr val="000000"/>
                     </a:solidFill>
@@ -11458,7 +11453,7 @@
               </a:ln>
               <a:extLst>
                 <a:ext uri="{91240B29-F687-4f45-9708-019B960494DF}">
-                  <a14:hiddenLine xmlns="" xmlns:a14="http://schemas.microsoft.com/office/drawing/2010/main" w="9525">
+                  <a14:hiddenLine xmlns:a14="http://schemas.microsoft.com/office/drawing/2010/main" xmlns="" w="9525">
                     <a:solidFill>
                       <a:srgbClr val="000000"/>
                     </a:solidFill>
@@ -11526,7 +11521,7 @@
               </a:ln>
               <a:extLst>
                 <a:ext uri="{91240B29-F687-4f45-9708-019B960494DF}">
-                  <a14:hiddenLine xmlns="" xmlns:a14="http://schemas.microsoft.com/office/drawing/2010/main" w="9525">
+                  <a14:hiddenLine xmlns:a14="http://schemas.microsoft.com/office/drawing/2010/main" xmlns="" w="9525">
                     <a:solidFill>
                       <a:srgbClr val="000000"/>
                     </a:solidFill>
@@ -11616,7 +11611,7 @@
               </a:ln>
               <a:extLst>
                 <a:ext uri="{91240B29-F687-4f45-9708-019B960494DF}">
-                  <a14:hiddenLine xmlns="" xmlns:a14="http://schemas.microsoft.com/office/drawing/2010/main" w="9525">
+                  <a14:hiddenLine xmlns:a14="http://schemas.microsoft.com/office/drawing/2010/main" xmlns="" w="9525">
                     <a:solidFill>
                       <a:srgbClr val="000000"/>
                     </a:solidFill>
@@ -11684,7 +11679,7 @@
               </a:ln>
               <a:extLst>
                 <a:ext uri="{91240B29-F687-4f45-9708-019B960494DF}">
-                  <a14:hiddenLine xmlns="" xmlns:a14="http://schemas.microsoft.com/office/drawing/2010/main" w="9525">
+                  <a14:hiddenLine xmlns:a14="http://schemas.microsoft.com/office/drawing/2010/main" xmlns="" w="9525">
                     <a:solidFill>
                       <a:srgbClr val="000000"/>
                     </a:solidFill>
@@ -11774,7 +11769,7 @@
               </a:ln>
               <a:extLst>
                 <a:ext uri="{91240B29-F687-4f45-9708-019B960494DF}">
-                  <a14:hiddenLine xmlns="" xmlns:a14="http://schemas.microsoft.com/office/drawing/2010/main" w="9525">
+                  <a14:hiddenLine xmlns:a14="http://schemas.microsoft.com/office/drawing/2010/main" xmlns="" w="9525">
                     <a:solidFill>
                       <a:srgbClr val="000000"/>
                     </a:solidFill>
@@ -11808,7 +11803,7 @@
               </a:ln>
               <a:extLst>
                 <a:ext uri="{91240B29-F687-4f45-9708-019B960494DF}">
-                  <a14:hiddenLine xmlns="" xmlns:a14="http://schemas.microsoft.com/office/drawing/2010/main" w="9525">
+                  <a14:hiddenLine xmlns:a14="http://schemas.microsoft.com/office/drawing/2010/main" xmlns="" w="9525">
                     <a:solidFill>
                       <a:srgbClr val="000000"/>
                     </a:solidFill>
@@ -11949,7 +11944,7 @@
             <a:fld id="{48A87A34-81AB-432B-8DAE-1953F412C126}" type="datetimeFigureOut">
               <a:rPr lang="en-US" dirty="0"/>
               <a:pPr/>
-              <a:t>11/27/2016</a:t>
+              <a:t>11/28/2016</a:t>
             </a:fld>
             <a:endParaRPr lang="en-US" dirty="0"/>
           </a:p>
@@ -12457,6 +12452,13 @@
   <p:clrMapOvr>
     <a:masterClrMapping/>
   </p:clrMapOvr>
+  <p:timing>
+    <p:tnLst>
+      <p:par>
+        <p:cTn id="1" dur="indefinite" restart="never" nodeType="tmRoot"/>
+      </p:par>
+    </p:tnLst>
+  </p:timing>
 </p:sld>
 </file>
 
@@ -12589,6 +12591,13 @@
   <p:clrMapOvr>
     <a:masterClrMapping/>
   </p:clrMapOvr>
+  <p:timing>
+    <p:tnLst>
+      <p:par>
+        <p:cTn id="1" dur="indefinite" restart="never" nodeType="tmRoot"/>
+      </p:par>
+    </p:tnLst>
+  </p:timing>
 </p:sld>
 </file>
 
@@ -12685,6 +12694,13 @@
   <p:clrMapOvr>
     <a:masterClrMapping/>
   </p:clrMapOvr>
+  <p:timing>
+    <p:tnLst>
+      <p:par>
+        <p:cTn id="1" dur="indefinite" restart="never" nodeType="tmRoot"/>
+      </p:par>
+    </p:tnLst>
+  </p:timing>
 </p:sld>
 </file>
 
@@ -12833,6 +12849,13 @@
   <p:clrMapOvr>
     <a:masterClrMapping/>
   </p:clrMapOvr>
+  <p:timing>
+    <p:tnLst>
+      <p:par>
+        <p:cTn id="1" dur="indefinite" restart="never" nodeType="tmRoot"/>
+      </p:par>
+    </p:tnLst>
+  </p:timing>
 </p:sld>
 </file>
 
@@ -12913,6 +12936,13 @@
   <p:clrMapOvr>
     <a:masterClrMapping/>
   </p:clrMapOvr>
+  <p:timing>
+    <p:tnLst>
+      <p:par>
+        <p:cTn id="1" dur="indefinite" restart="never" nodeType="tmRoot"/>
+      </p:par>
+    </p:tnLst>
+  </p:timing>
 </p:sld>
 </file>
 
@@ -12950,13 +12980,8 @@
           <a:p>
             <a:r>
               <a:rPr lang="en-US" dirty="0"/>
-              <a:t>Component: </a:t>
-            </a:r>
-            <a:r>
-              <a:rPr lang="en-US" dirty="0" err="1"/>
-              <a:t>pubsub</a:t>
-            </a:r>
-            <a:endParaRPr lang="en-US" dirty="0"/>
+              <a:t>Deployment scenarios</a:t>
+            </a:r>
           </a:p>
         </p:txBody>
       </p:sp>
@@ -12970,157 +12995,99 @@
             <p:ph idx="1"/>
           </p:nvPr>
         </p:nvSpPr>
-        <p:spPr/>
+        <p:spPr>
+          <a:xfrm>
+            <a:off x="1141412" y="2249487"/>
+            <a:ext cx="9905999" cy="3874476"/>
+          </a:xfrm>
+        </p:spPr>
         <p:txBody>
-          <a:bodyPr/>
+          <a:bodyPr>
+            <a:normAutofit/>
+          </a:bodyPr>
           <a:lstStyle/>
           <a:p>
             <a:r>
-              <a:rPr lang="en-US" dirty="0">
-                <a:solidFill>
-                  <a:schemeClr val="bg1"/>
-                </a:solidFill>
-              </a:rPr>
-              <a:t>Apache Kafka</a:t>
+              <a:rPr lang="en-US" dirty="0" smtClean="0"/>
+              <a:t>New </a:t>
             </a:r>
             <a:r>
               <a:rPr lang="en-US" dirty="0"/>
-              <a:t>, unmodified</a:t>
-            </a:r>
-          </a:p>
-          <a:p>
+              <a:t>deployments</a:t>
+            </a:r>
+          </a:p>
+          <a:p>
+            <a:pPr lvl="1"/>
             <a:r>
               <a:rPr lang="en-US" dirty="0"/>
-              <a:t>Message router</a:t>
-            </a:r>
-          </a:p>
-          <a:p>
+              <a:t>Metropolitan Intelligent Transportation System</a:t>
+            </a:r>
+          </a:p>
+          <a:p>
+            <a:pPr lvl="1"/>
+            <a:r>
+              <a:rPr lang="en-US" dirty="0" err="1"/>
+              <a:t>CloudRAN</a:t>
+            </a:r>
             <a:r>
               <a:rPr lang="en-US" dirty="0"/>
-              <a:t>Useful for mobile: offsets</a:t>
+              <a:t> Data Center</a:t>
+            </a:r>
+          </a:p>
+          <a:p>
+            <a:r>
+              <a:rPr lang="en-US" dirty="0"/>
+              <a:t>Existing deployments</a:t>
+            </a:r>
+          </a:p>
+          <a:p>
+            <a:pPr lvl="1"/>
+            <a:r>
+              <a:rPr lang="en-US" dirty="0"/>
+              <a:t>Interpose at MTSO (a la SMORE)</a:t>
+            </a:r>
+          </a:p>
+          <a:p>
+            <a:pPr lvl="1"/>
+            <a:r>
+              <a:rPr lang="en-US" dirty="0"/>
+              <a:t>Integrate into </a:t>
+            </a:r>
+            <a:r>
+              <a:rPr lang="en-US" dirty="0" err="1"/>
+              <a:t>eNodeB</a:t>
+            </a:r>
+            <a:r>
+              <a:rPr lang="en-US" dirty="0"/>
+              <a:t>, right at the edge</a:t>
+            </a:r>
+          </a:p>
+          <a:p>
+            <a:pPr lvl="1"/>
+            <a:r>
+              <a:rPr lang="en-US" dirty="0"/>
+              <a:t>North of PGW, dedicated or default bearer</a:t>
             </a:r>
           </a:p>
         </p:txBody>
       </p:sp>
-      <p:pic>
-        <p:nvPicPr>
-          <p:cNvPr id="4" name="Picture 3"/>
-          <p:cNvPicPr>
-            <a:picLocks noChangeAspect="1"/>
-          </p:cNvPicPr>
-          <p:nvPr/>
-        </p:nvPicPr>
-        <p:blipFill>
-          <a:blip r:embed="rId2"/>
-          <a:stretch>
-            <a:fillRect/>
-          </a:stretch>
-        </p:blipFill>
-        <p:spPr>
-          <a:xfrm>
-            <a:off x="5383418" y="1761411"/>
-            <a:ext cx="5663993" cy="4125926"/>
-          </a:xfrm>
-          <a:prstGeom prst="rect">
-            <a:avLst/>
-          </a:prstGeom>
-        </p:spPr>
-      </p:pic>
-      <p:sp>
-        <p:nvSpPr>
-          <p:cNvPr id="5" name="Rectangle: Rounded Corners 4"/>
-          <p:cNvSpPr/>
-          <p:nvPr/>
-        </p:nvSpPr>
-        <p:spPr>
-          <a:xfrm>
-            <a:off x="5553512" y="2885813"/>
-            <a:ext cx="2256638" cy="310393"/>
-          </a:xfrm>
-          <a:prstGeom prst="roundRect">
-            <a:avLst/>
-          </a:prstGeom>
-          <a:noFill/>
-          <a:ln w="28575">
-            <a:solidFill>
-              <a:srgbClr val="92D050"/>
-            </a:solidFill>
-          </a:ln>
-        </p:spPr>
-        <p:style>
-          <a:lnRef idx="2">
-            <a:schemeClr val="accent1">
-              <a:shade val="50000"/>
-            </a:schemeClr>
-          </a:lnRef>
-          <a:fillRef idx="1">
-            <a:schemeClr val="accent1"/>
-          </a:fillRef>
-          <a:effectRef idx="0">
-            <a:schemeClr val="accent1"/>
-          </a:effectRef>
-          <a:fontRef idx="minor">
-            <a:schemeClr val="lt1"/>
-          </a:fontRef>
-        </p:style>
-        <p:txBody>
-          <a:bodyPr rtlCol="0" anchor="ctr"/>
-          <a:lstStyle/>
-          <a:p>
-            <a:pPr algn="ctr"/>
-            <a:endParaRPr lang="en-US"/>
-          </a:p>
-        </p:txBody>
-      </p:sp>
-      <p:cxnSp>
-        <p:nvCxnSpPr>
-          <p:cNvPr id="7" name="Connector: Elbow 6"/>
-          <p:cNvCxnSpPr>
-            <a:cxnSpLocks/>
-            <a:stCxn id="5" idx="1"/>
-          </p:cNvCxnSpPr>
-          <p:nvPr/>
-        </p:nvCxnSpPr>
-        <p:spPr>
-          <a:xfrm rot="10800000">
-            <a:off x="5058562" y="1761412"/>
-            <a:ext cx="494951" cy="1279599"/>
-          </a:xfrm>
-          <a:prstGeom prst="bentConnector2">
-            <a:avLst/>
-          </a:prstGeom>
-          <a:ln w="28575">
-            <a:solidFill>
-              <a:srgbClr val="92D050"/>
-            </a:solidFill>
-            <a:tailEnd type="triangle"/>
-          </a:ln>
-        </p:spPr>
-        <p:style>
-          <a:lnRef idx="1">
-            <a:schemeClr val="accent1"/>
-          </a:lnRef>
-          <a:fillRef idx="0">
-            <a:schemeClr val="accent1"/>
-          </a:fillRef>
-          <a:effectRef idx="0">
-            <a:schemeClr val="accent1"/>
-          </a:effectRef>
-          <a:fontRef idx="minor">
-            <a:schemeClr val="tx1"/>
-          </a:fontRef>
-        </p:style>
-      </p:cxnSp>
     </p:spTree>
     <p:extLst>
       <p:ext uri="{BB962C8B-B14F-4D97-AF65-F5344CB8AC3E}">
-        <p14:creationId xmlns:p14="http://schemas.microsoft.com/office/powerpoint/2010/main" val="1077428074"/>
+        <p14:creationId xmlns:p14="http://schemas.microsoft.com/office/powerpoint/2010/main" val="558600912"/>
       </p:ext>
     </p:extLst>
   </p:cSld>
   <p:clrMapOvr>
     <a:masterClrMapping/>
   </p:clrMapOvr>
+  <p:timing>
+    <p:tnLst>
+      <p:par>
+        <p:cTn id="1" dur="indefinite" restart="never" nodeType="tmRoot"/>
+      </p:par>
+    </p:tnLst>
+  </p:timing>
 </p:sld>
 </file>
 
@@ -13151,54 +13118,20 @@
             <p:ph type="title"/>
           </p:nvPr>
         </p:nvSpPr>
-        <p:spPr/>
+        <p:spPr>
+          <a:xfrm>
+            <a:off x="1141413" y="232624"/>
+            <a:ext cx="9905998" cy="1478570"/>
+          </a:xfrm>
+        </p:spPr>
         <p:txBody>
           <a:bodyPr/>
           <a:lstStyle/>
           <a:p>
+            <a:pPr algn="ctr"/>
             <a:r>
               <a:rPr lang="en-US" dirty="0"/>
-              <a:t>Component: Broker</a:t>
-            </a:r>
-          </a:p>
-        </p:txBody>
-      </p:sp>
-      <p:sp>
-        <p:nvSpPr>
-          <p:cNvPr id="3" name="Content Placeholder 2"/>
-          <p:cNvSpPr>
-            <a:spLocks noGrp="1"/>
-          </p:cNvSpPr>
-          <p:nvPr>
-            <p:ph idx="1"/>
-          </p:nvPr>
-        </p:nvSpPr>
-        <p:spPr/>
-        <p:txBody>
-          <a:bodyPr/>
-          <a:lstStyle/>
-          <a:p>
-            <a:r>
-              <a:rPr lang="en-US" dirty="0"/>
-              <a:t>Central message processing</a:t>
-            </a:r>
-          </a:p>
-          <a:p>
-            <a:r>
-              <a:rPr lang="en-US" dirty="0"/>
-              <a:t>Aggregating functions</a:t>
-            </a:r>
-          </a:p>
-          <a:p>
-            <a:r>
-              <a:rPr lang="en-US" dirty="0"/>
-              <a:t>Data analysis/trending</a:t>
-            </a:r>
-          </a:p>
-          <a:p>
-            <a:r>
-              <a:rPr lang="en-US" dirty="0"/>
-              <a:t>Not mandatory for comm.</a:t>
+              <a:t>Deployment scenarios – Metro ITS</a:t>
             </a:r>
           </a:p>
         </p:txBody>
@@ -13211,117 +13144,38 @@
           </p:cNvPicPr>
           <p:nvPr/>
         </p:nvPicPr>
-        <p:blipFill>
+        <p:blipFill rotWithShape="1">
           <a:blip r:embed="rId2"/>
-          <a:stretch>
-            <a:fillRect/>
-          </a:stretch>
+          <a:srcRect r="67870" b="-22"/>
+          <a:stretch/>
         </p:blipFill>
         <p:spPr>
           <a:xfrm>
-            <a:off x="5383418" y="1761411"/>
-            <a:ext cx="5663993" cy="4125926"/>
+            <a:off x="4335303" y="1546746"/>
+            <a:ext cx="3518218" cy="4698368"/>
           </a:xfrm>
           <a:prstGeom prst="rect">
             <a:avLst/>
           </a:prstGeom>
         </p:spPr>
       </p:pic>
-      <p:sp>
-        <p:nvSpPr>
-          <p:cNvPr id="5" name="Rectangle: Rounded Corners 4"/>
-          <p:cNvSpPr/>
-          <p:nvPr/>
-        </p:nvSpPr>
-        <p:spPr>
-          <a:xfrm>
-            <a:off x="6350466" y="3322039"/>
-            <a:ext cx="687897" cy="520119"/>
-          </a:xfrm>
-          <a:prstGeom prst="roundRect">
-            <a:avLst/>
-          </a:prstGeom>
-          <a:noFill/>
-          <a:ln w="28575">
-            <a:solidFill>
-              <a:srgbClr val="92D050"/>
-            </a:solidFill>
-          </a:ln>
-        </p:spPr>
-        <p:style>
-          <a:lnRef idx="2">
-            <a:schemeClr val="accent1">
-              <a:shade val="50000"/>
-            </a:schemeClr>
-          </a:lnRef>
-          <a:fillRef idx="1">
-            <a:schemeClr val="accent1"/>
-          </a:fillRef>
-          <a:effectRef idx="0">
-            <a:schemeClr val="accent1"/>
-          </a:effectRef>
-          <a:fontRef idx="minor">
-            <a:schemeClr val="lt1"/>
-          </a:fontRef>
-        </p:style>
-        <p:txBody>
-          <a:bodyPr rtlCol="0" anchor="ctr"/>
-          <a:lstStyle/>
-          <a:p>
-            <a:pPr algn="ctr"/>
-            <a:endParaRPr lang="en-US"/>
-          </a:p>
-        </p:txBody>
-      </p:sp>
-      <p:cxnSp>
-        <p:nvCxnSpPr>
-          <p:cNvPr id="7" name="Connector: Elbow 6"/>
-          <p:cNvCxnSpPr>
-            <a:cxnSpLocks/>
-            <a:stCxn id="5" idx="1"/>
-          </p:cNvCxnSpPr>
-          <p:nvPr/>
-        </p:nvCxnSpPr>
-        <p:spPr>
-          <a:xfrm rot="10800000">
-            <a:off x="5075340" y="1761411"/>
-            <a:ext cx="1275127" cy="1820688"/>
-          </a:xfrm>
-          <a:prstGeom prst="bentConnector2">
-            <a:avLst/>
-          </a:prstGeom>
-          <a:ln w="28575">
-            <a:solidFill>
-              <a:srgbClr val="92D050"/>
-            </a:solidFill>
-            <a:tailEnd type="triangle"/>
-          </a:ln>
-        </p:spPr>
-        <p:style>
-          <a:lnRef idx="1">
-            <a:schemeClr val="accent1"/>
-          </a:lnRef>
-          <a:fillRef idx="0">
-            <a:schemeClr val="accent1"/>
-          </a:fillRef>
-          <a:effectRef idx="0">
-            <a:schemeClr val="accent1"/>
-          </a:effectRef>
-          <a:fontRef idx="minor">
-            <a:schemeClr val="tx1"/>
-          </a:fontRef>
-        </p:style>
-      </p:cxnSp>
     </p:spTree>
     <p:extLst>
       <p:ext uri="{BB962C8B-B14F-4D97-AF65-F5344CB8AC3E}">
-        <p14:creationId xmlns:p14="http://schemas.microsoft.com/office/powerpoint/2010/main" val="3250141956"/>
+        <p14:creationId xmlns:p14="http://schemas.microsoft.com/office/powerpoint/2010/main" val="188553244"/>
       </p:ext>
     </p:extLst>
   </p:cSld>
   <p:clrMapOvr>
     <a:masterClrMapping/>
   </p:clrMapOvr>
+  <p:timing>
+    <p:tnLst>
+      <p:par>
+        <p:cTn id="1" dur="indefinite" restart="never" nodeType="tmRoot"/>
+      </p:par>
+    </p:tnLst>
+  </p:timing>
 </p:sld>
 </file>
 
@@ -13352,183 +13206,64 @@
             <p:ph type="title"/>
           </p:nvPr>
         </p:nvSpPr>
-        <p:spPr/>
+        <p:spPr>
+          <a:xfrm>
+            <a:off x="1141413" y="299736"/>
+            <a:ext cx="9905998" cy="1478570"/>
+          </a:xfrm>
+        </p:spPr>
         <p:txBody>
           <a:bodyPr/>
           <a:lstStyle/>
           <a:p>
+            <a:pPr algn="ctr"/>
             <a:r>
               <a:rPr lang="en-US" dirty="0"/>
-              <a:t>Component: Adapter</a:t>
-            </a:r>
-          </a:p>
-        </p:txBody>
-      </p:sp>
-      <p:sp>
-        <p:nvSpPr>
-          <p:cNvPr id="3" name="Content Placeholder 2"/>
-          <p:cNvSpPr>
-            <a:spLocks noGrp="1"/>
-          </p:cNvSpPr>
-          <p:nvPr>
-            <p:ph idx="1"/>
-          </p:nvPr>
-        </p:nvSpPr>
-        <p:spPr/>
-        <p:txBody>
-          <a:bodyPr/>
-          <a:lstStyle/>
-          <a:p>
-            <a:r>
-              <a:rPr lang="en-US" dirty="0"/>
-              <a:t>Interface between worlds</a:t>
-            </a:r>
-          </a:p>
-          <a:p>
-            <a:r>
-              <a:rPr lang="en-US" dirty="0"/>
-              <a:t>Manages client sessions</a:t>
-            </a:r>
-          </a:p>
-          <a:p>
-            <a:r>
-              <a:rPr lang="en-US" dirty="0"/>
-              <a:t>Uses core network transports</a:t>
-            </a:r>
-          </a:p>
-          <a:p>
-            <a:r>
-              <a:rPr lang="en-US" dirty="0"/>
-              <a:t>Change for deployment/tech</a:t>
-            </a:r>
-          </a:p>
-          <a:p>
-            <a:r>
-              <a:rPr lang="en-US" dirty="0"/>
-              <a:t>Enforces Trust</a:t>
+              <a:t>Deployment scenarios - MTSO</a:t>
             </a:r>
           </a:p>
         </p:txBody>
       </p:sp>
       <p:pic>
         <p:nvPicPr>
-          <p:cNvPr id="4" name="Picture 3"/>
+          <p:cNvPr id="3" name="Picture 2"/>
           <p:cNvPicPr>
             <a:picLocks noChangeAspect="1"/>
           </p:cNvPicPr>
           <p:nvPr/>
         </p:nvPicPr>
-        <p:blipFill>
+        <p:blipFill rotWithShape="1">
           <a:blip r:embed="rId2"/>
-          <a:stretch>
-            <a:fillRect/>
-          </a:stretch>
+          <a:srcRect l="33250" r="33250"/>
+          <a:stretch/>
         </p:blipFill>
         <p:spPr>
           <a:xfrm>
-            <a:off x="5383418" y="1761411"/>
-            <a:ext cx="5663993" cy="4125926"/>
+            <a:off x="4237517" y="1565734"/>
+            <a:ext cx="3713789" cy="4755683"/>
           </a:xfrm>
           <a:prstGeom prst="rect">
             <a:avLst/>
           </a:prstGeom>
         </p:spPr>
       </p:pic>
-      <p:sp>
-        <p:nvSpPr>
-          <p:cNvPr id="5" name="Rectangle: Rounded Corners 4"/>
-          <p:cNvSpPr/>
-          <p:nvPr/>
-        </p:nvSpPr>
-        <p:spPr>
-          <a:xfrm>
-            <a:off x="7935987" y="2709644"/>
-            <a:ext cx="838898" cy="721454"/>
-          </a:xfrm>
-          <a:prstGeom prst="roundRect">
-            <a:avLst/>
-          </a:prstGeom>
-          <a:noFill/>
-          <a:ln w="28575">
-            <a:solidFill>
-              <a:srgbClr val="92D050"/>
-            </a:solidFill>
-          </a:ln>
-        </p:spPr>
-        <p:style>
-          <a:lnRef idx="2">
-            <a:schemeClr val="accent1">
-              <a:shade val="50000"/>
-            </a:schemeClr>
-          </a:lnRef>
-          <a:fillRef idx="1">
-            <a:schemeClr val="accent1"/>
-          </a:fillRef>
-          <a:effectRef idx="0">
-            <a:schemeClr val="accent1"/>
-          </a:effectRef>
-          <a:fontRef idx="minor">
-            <a:schemeClr val="lt1"/>
-          </a:fontRef>
-        </p:style>
-        <p:txBody>
-          <a:bodyPr rtlCol="0" anchor="ctr"/>
-          <a:lstStyle/>
-          <a:p>
-            <a:pPr algn="ctr"/>
-            <a:endParaRPr lang="en-US"/>
-          </a:p>
-        </p:txBody>
-      </p:sp>
-      <p:cxnSp>
-        <p:nvCxnSpPr>
-          <p:cNvPr id="7" name="Connector: Elbow 6"/>
-          <p:cNvCxnSpPr>
-            <a:cxnSpLocks/>
-            <a:stCxn id="5" idx="0"/>
-          </p:cNvCxnSpPr>
-          <p:nvPr/>
-        </p:nvCxnSpPr>
-        <p:spPr>
-          <a:xfrm rot="16200000" flipV="1">
-            <a:off x="6509862" y="864069"/>
-            <a:ext cx="1359014" cy="2332135"/>
-          </a:xfrm>
-          <a:prstGeom prst="bentConnector2">
-            <a:avLst/>
-          </a:prstGeom>
-          <a:ln w="28575">
-            <a:solidFill>
-              <a:srgbClr val="92D050"/>
-            </a:solidFill>
-            <a:tailEnd type="triangle"/>
-          </a:ln>
-        </p:spPr>
-        <p:style>
-          <a:lnRef idx="1">
-            <a:schemeClr val="accent1"/>
-          </a:lnRef>
-          <a:fillRef idx="0">
-            <a:schemeClr val="accent1"/>
-          </a:fillRef>
-          <a:effectRef idx="0">
-            <a:schemeClr val="accent1"/>
-          </a:effectRef>
-          <a:fontRef idx="minor">
-            <a:schemeClr val="tx1"/>
-          </a:fontRef>
-        </p:style>
-      </p:cxnSp>
     </p:spTree>
     <p:extLst>
       <p:ext uri="{BB962C8B-B14F-4D97-AF65-F5344CB8AC3E}">
-        <p14:creationId xmlns:p14="http://schemas.microsoft.com/office/powerpoint/2010/main" val="2596559493"/>
+        <p14:creationId xmlns:p14="http://schemas.microsoft.com/office/powerpoint/2010/main" val="597229695"/>
       </p:ext>
     </p:extLst>
   </p:cSld>
   <p:clrMapOvr>
     <a:masterClrMapping/>
   </p:clrMapOvr>
+  <p:timing>
+    <p:tnLst>
+      <p:par>
+        <p:cTn id="1" dur="indefinite" restart="never" nodeType="tmRoot"/>
+      </p:par>
+    </p:tnLst>
+  </p:timing>
 </p:sld>
 </file>
 
@@ -13559,518 +13294,69 @@
             <p:ph type="title"/>
           </p:nvPr>
         </p:nvSpPr>
-        <p:spPr/>
+        <p:spPr>
+          <a:xfrm>
+            <a:off x="1141413" y="308125"/>
+            <a:ext cx="9905998" cy="1478570"/>
+          </a:xfrm>
+        </p:spPr>
         <p:txBody>
           <a:bodyPr/>
           <a:lstStyle/>
           <a:p>
+            <a:pPr algn="ctr"/>
             <a:r>
               <a:rPr lang="en-US" dirty="0"/>
-              <a:t>Component: client endpoint</a:t>
-            </a:r>
-          </a:p>
-        </p:txBody>
-      </p:sp>
-      <p:sp>
-        <p:nvSpPr>
-          <p:cNvPr id="3" name="Content Placeholder 2"/>
-          <p:cNvSpPr>
-            <a:spLocks noGrp="1"/>
-          </p:cNvSpPr>
-          <p:nvPr>
-            <p:ph idx="1"/>
-          </p:nvPr>
-        </p:nvSpPr>
-        <p:spPr/>
-        <p:txBody>
-          <a:bodyPr/>
-          <a:lstStyle/>
-          <a:p>
-            <a:r>
-              <a:rPr lang="en-US" dirty="0"/>
-              <a:t>Client-side interface</a:t>
-            </a:r>
-          </a:p>
-          <a:p>
-            <a:r>
-              <a:rPr lang="en-US" dirty="0"/>
-              <a:t>Connects local apps</a:t>
-            </a:r>
-          </a:p>
-          <a:p>
-            <a:r>
-              <a:rPr lang="en-US" dirty="0"/>
-              <a:t>Reports telemetry</a:t>
-            </a:r>
-          </a:p>
-          <a:p>
-            <a:r>
-              <a:rPr lang="en-US" dirty="0"/>
-              <a:t>Maintains session</a:t>
-            </a:r>
+              <a:t>Deployment scenarios – </a:t>
+            </a:r>
+            <a:r>
+              <a:rPr lang="en-US" dirty="0" err="1"/>
+              <a:t>enodeb</a:t>
+            </a:r>
+            <a:endParaRPr lang="en-US" dirty="0"/>
           </a:p>
         </p:txBody>
       </p:sp>
       <p:pic>
         <p:nvPicPr>
-          <p:cNvPr id="4" name="Picture 3"/>
+          <p:cNvPr id="3" name="Picture 2"/>
           <p:cNvPicPr>
             <a:picLocks noChangeAspect="1"/>
           </p:cNvPicPr>
           <p:nvPr/>
         </p:nvPicPr>
-        <p:blipFill>
+        <p:blipFill rotWithShape="1">
           <a:blip r:embed="rId2"/>
-          <a:stretch>
-            <a:fillRect/>
-          </a:stretch>
+          <a:srcRect l="67747" t="239" r="-59"/>
+          <a:stretch/>
         </p:blipFill>
         <p:spPr>
           <a:xfrm>
-            <a:off x="5383418" y="1761411"/>
-            <a:ext cx="5663993" cy="4125926"/>
+            <a:off x="4303363" y="1627464"/>
+            <a:ext cx="3582098" cy="4744287"/>
           </a:xfrm>
           <a:prstGeom prst="rect">
             <a:avLst/>
           </a:prstGeom>
         </p:spPr>
       </p:pic>
-      <p:sp>
-        <p:nvSpPr>
-          <p:cNvPr id="5" name="Rectangle: Rounded Corners 4"/>
-          <p:cNvSpPr/>
-          <p:nvPr/>
-        </p:nvSpPr>
-        <p:spPr>
-          <a:xfrm>
-            <a:off x="10268125" y="3833770"/>
-            <a:ext cx="779286" cy="545284"/>
-          </a:xfrm>
-          <a:prstGeom prst="roundRect">
-            <a:avLst/>
-          </a:prstGeom>
-          <a:noFill/>
-          <a:ln w="28575">
-            <a:solidFill>
-              <a:srgbClr val="92D050"/>
-            </a:solidFill>
-          </a:ln>
-        </p:spPr>
-        <p:style>
-          <a:lnRef idx="2">
-            <a:schemeClr val="accent1">
-              <a:shade val="50000"/>
-            </a:schemeClr>
-          </a:lnRef>
-          <a:fillRef idx="1">
-            <a:schemeClr val="accent1"/>
-          </a:fillRef>
-          <a:effectRef idx="0">
-            <a:schemeClr val="accent1"/>
-          </a:effectRef>
-          <a:fontRef idx="minor">
-            <a:schemeClr val="lt1"/>
-          </a:fontRef>
-        </p:style>
-        <p:txBody>
-          <a:bodyPr rtlCol="0" anchor="ctr"/>
-          <a:lstStyle/>
-          <a:p>
-            <a:pPr algn="ctr"/>
-            <a:endParaRPr lang="en-US"/>
-          </a:p>
-        </p:txBody>
-      </p:sp>
-      <p:cxnSp>
-        <p:nvCxnSpPr>
-          <p:cNvPr id="7" name="Connector: Elbow 6"/>
-          <p:cNvCxnSpPr>
-            <a:cxnSpLocks/>
-            <a:stCxn id="5" idx="0"/>
-          </p:cNvCxnSpPr>
-          <p:nvPr/>
-        </p:nvCxnSpPr>
-        <p:spPr>
-          <a:xfrm rot="16200000" flipV="1">
-            <a:off x="7883332" y="1059334"/>
-            <a:ext cx="2491531" cy="3057342"/>
-          </a:xfrm>
-          <a:prstGeom prst="bentConnector2">
-            <a:avLst/>
-          </a:prstGeom>
-          <a:ln w="28575">
-            <a:solidFill>
-              <a:srgbClr val="92D050"/>
-            </a:solidFill>
-            <a:tailEnd type="triangle"/>
-          </a:ln>
-        </p:spPr>
-        <p:style>
-          <a:lnRef idx="1">
-            <a:schemeClr val="accent1"/>
-          </a:lnRef>
-          <a:fillRef idx="0">
-            <a:schemeClr val="accent1"/>
-          </a:fillRef>
-          <a:effectRef idx="0">
-            <a:schemeClr val="accent1"/>
-          </a:effectRef>
-          <a:fontRef idx="minor">
-            <a:schemeClr val="tx1"/>
-          </a:fontRef>
-        </p:style>
-      </p:cxnSp>
     </p:spTree>
     <p:extLst>
       <p:ext uri="{BB962C8B-B14F-4D97-AF65-F5344CB8AC3E}">
-        <p14:creationId xmlns:p14="http://schemas.microsoft.com/office/powerpoint/2010/main" val="2538655036"/>
+        <p14:creationId xmlns:p14="http://schemas.microsoft.com/office/powerpoint/2010/main" val="3376742031"/>
       </p:ext>
     </p:extLst>
   </p:cSld>
   <p:clrMapOvr>
     <a:masterClrMapping/>
   </p:clrMapOvr>
-</p:sld>
-</file>
-
-<file path=ppt/slides/slide18.xml><?xml version="1.0" encoding="utf-8"?>
-<p:sld xmlns:a="http://schemas.openxmlformats.org/drawingml/2006/main" xmlns:r="http://schemas.openxmlformats.org/officeDocument/2006/relationships" xmlns:p="http://schemas.openxmlformats.org/presentationml/2006/main">
-  <p:cSld>
-    <p:spTree>
-      <p:nvGrpSpPr>
-        <p:cNvPr id="1" name=""/>
-        <p:cNvGrpSpPr/>
-        <p:nvPr/>
-      </p:nvGrpSpPr>
-      <p:grpSpPr>
-        <a:xfrm>
-          <a:off x="0" y="0"/>
-          <a:ext cx="0" cy="0"/>
-          <a:chOff x="0" y="0"/>
-          <a:chExt cx="0" cy="0"/>
-        </a:xfrm>
-      </p:grpSpPr>
-      <p:sp>
-        <p:nvSpPr>
-          <p:cNvPr id="2" name="Title 1"/>
-          <p:cNvSpPr>
-            <a:spLocks noGrp="1"/>
-          </p:cNvSpPr>
-          <p:nvPr>
-            <p:ph type="title"/>
-          </p:nvPr>
-        </p:nvSpPr>
-        <p:spPr/>
-        <p:txBody>
-          <a:bodyPr/>
-          <a:lstStyle/>
-          <a:p>
-            <a:r>
-              <a:rPr lang="en-US" dirty="0"/>
-              <a:t>Component: Service endpoint</a:t>
-            </a:r>
-          </a:p>
-        </p:txBody>
-      </p:sp>
-      <p:sp>
-        <p:nvSpPr>
-          <p:cNvPr id="3" name="Content Placeholder 2"/>
-          <p:cNvSpPr>
-            <a:spLocks noGrp="1"/>
-          </p:cNvSpPr>
-          <p:nvPr>
-            <p:ph idx="1"/>
-          </p:nvPr>
-        </p:nvSpPr>
-        <p:spPr/>
-        <p:txBody>
-          <a:bodyPr/>
-          <a:lstStyle/>
-          <a:p>
-            <a:r>
-              <a:rPr lang="en-US" dirty="0"/>
-              <a:t>Centralized processing</a:t>
-            </a:r>
-          </a:p>
-          <a:p>
-            <a:r>
-              <a:rPr lang="en-US" dirty="0"/>
-              <a:t>In trusted* position</a:t>
-            </a:r>
-          </a:p>
-          <a:p>
-            <a:r>
-              <a:rPr lang="en-US" dirty="0"/>
-              <a:t>Can use broker</a:t>
-            </a:r>
-          </a:p>
-          <a:p>
-            <a:r>
-              <a:rPr lang="en-US" dirty="0"/>
-              <a:t>Optional</a:t>
-            </a:r>
-          </a:p>
-        </p:txBody>
-      </p:sp>
-      <p:pic>
-        <p:nvPicPr>
-          <p:cNvPr id="4" name="Picture 3"/>
-          <p:cNvPicPr>
-            <a:picLocks noChangeAspect="1"/>
-          </p:cNvPicPr>
-          <p:nvPr/>
-        </p:nvPicPr>
-        <p:blipFill>
-          <a:blip r:embed="rId2"/>
-          <a:stretch>
-            <a:fillRect/>
-          </a:stretch>
-        </p:blipFill>
-        <p:spPr>
-          <a:xfrm>
-            <a:off x="5383418" y="1761411"/>
-            <a:ext cx="5663993" cy="4125926"/>
-          </a:xfrm>
-          <a:prstGeom prst="rect">
-            <a:avLst/>
-          </a:prstGeom>
-        </p:spPr>
-      </p:pic>
-      <p:sp>
-        <p:nvSpPr>
-          <p:cNvPr id="5" name="Rectangle: Rounded Corners 4"/>
-          <p:cNvSpPr/>
-          <p:nvPr/>
-        </p:nvSpPr>
-        <p:spPr>
-          <a:xfrm>
-            <a:off x="5754848" y="2207542"/>
-            <a:ext cx="738231" cy="545284"/>
-          </a:xfrm>
-          <a:prstGeom prst="roundRect">
-            <a:avLst/>
-          </a:prstGeom>
-          <a:noFill/>
-          <a:ln w="28575">
-            <a:solidFill>
-              <a:srgbClr val="92D050"/>
-            </a:solidFill>
-          </a:ln>
-        </p:spPr>
-        <p:style>
-          <a:lnRef idx="2">
-            <a:schemeClr val="accent1">
-              <a:shade val="50000"/>
-            </a:schemeClr>
-          </a:lnRef>
-          <a:fillRef idx="1">
-            <a:schemeClr val="accent1"/>
-          </a:fillRef>
-          <a:effectRef idx="0">
-            <a:schemeClr val="accent1"/>
-          </a:effectRef>
-          <a:fontRef idx="minor">
-            <a:schemeClr val="lt1"/>
-          </a:fontRef>
-        </p:style>
-        <p:txBody>
-          <a:bodyPr rtlCol="0" anchor="ctr"/>
-          <a:lstStyle/>
-          <a:p>
-            <a:pPr algn="ctr"/>
-            <a:endParaRPr lang="en-US"/>
-          </a:p>
-        </p:txBody>
-      </p:sp>
-      <p:cxnSp>
-        <p:nvCxnSpPr>
-          <p:cNvPr id="15" name="Connector: Elbow 14"/>
-          <p:cNvCxnSpPr>
-            <a:cxnSpLocks/>
-            <a:stCxn id="5" idx="1"/>
-          </p:cNvCxnSpPr>
-          <p:nvPr/>
-        </p:nvCxnSpPr>
-        <p:spPr>
-          <a:xfrm rot="10800000">
-            <a:off x="4915958" y="1641294"/>
-            <a:ext cx="838891" cy="838891"/>
-          </a:xfrm>
-          <a:prstGeom prst="bentConnector2">
-            <a:avLst/>
-          </a:prstGeom>
-          <a:ln w="28575">
-            <a:solidFill>
-              <a:srgbClr val="92D050"/>
-            </a:solidFill>
-            <a:tailEnd type="triangle"/>
-          </a:ln>
-        </p:spPr>
-        <p:style>
-          <a:lnRef idx="1">
-            <a:schemeClr val="accent1"/>
-          </a:lnRef>
-          <a:fillRef idx="0">
-            <a:schemeClr val="accent1"/>
-          </a:fillRef>
-          <a:effectRef idx="0">
-            <a:schemeClr val="accent1"/>
-          </a:effectRef>
-          <a:fontRef idx="minor">
-            <a:schemeClr val="tx1"/>
-          </a:fontRef>
-        </p:style>
-      </p:cxnSp>
-    </p:spTree>
-    <p:extLst>
-      <p:ext uri="{BB962C8B-B14F-4D97-AF65-F5344CB8AC3E}">
-        <p14:creationId xmlns:p14="http://schemas.microsoft.com/office/powerpoint/2010/main" val="1163626917"/>
-      </p:ext>
-    </p:extLst>
-  </p:cSld>
-  <p:clrMapOvr>
-    <a:masterClrMapping/>
-  </p:clrMapOvr>
-</p:sld>
-</file>
-
-<file path=ppt/slides/slide19.xml><?xml version="1.0" encoding="utf-8"?>
-<p:sld xmlns:a="http://schemas.openxmlformats.org/drawingml/2006/main" xmlns:r="http://schemas.openxmlformats.org/officeDocument/2006/relationships" xmlns:p="http://schemas.openxmlformats.org/presentationml/2006/main">
-  <p:cSld>
-    <p:spTree>
-      <p:nvGrpSpPr>
-        <p:cNvPr id="1" name=""/>
-        <p:cNvGrpSpPr/>
-        <p:nvPr/>
-      </p:nvGrpSpPr>
-      <p:grpSpPr>
-        <a:xfrm>
-          <a:off x="0" y="0"/>
-          <a:ext cx="0" cy="0"/>
-          <a:chOff x="0" y="0"/>
-          <a:chExt cx="0" cy="0"/>
-        </a:xfrm>
-      </p:grpSpPr>
-      <p:sp>
-        <p:nvSpPr>
-          <p:cNvPr id="2" name="Title 1"/>
-          <p:cNvSpPr>
-            <a:spLocks noGrp="1"/>
-          </p:cNvSpPr>
-          <p:nvPr>
-            <p:ph type="title"/>
-          </p:nvPr>
-        </p:nvSpPr>
-        <p:spPr/>
-        <p:txBody>
-          <a:bodyPr/>
-          <a:lstStyle/>
-          <a:p>
-            <a:r>
-              <a:rPr lang="en-US" dirty="0"/>
-              <a:t>Deployment scenarios</a:t>
-            </a:r>
-          </a:p>
-        </p:txBody>
-      </p:sp>
-      <p:sp>
-        <p:nvSpPr>
-          <p:cNvPr id="3" name="Content Placeholder 2"/>
-          <p:cNvSpPr>
-            <a:spLocks noGrp="1"/>
-          </p:cNvSpPr>
-          <p:nvPr>
-            <p:ph idx="1"/>
-          </p:nvPr>
-        </p:nvSpPr>
-        <p:spPr>
-          <a:xfrm>
-            <a:off x="1141412" y="2249487"/>
-            <a:ext cx="9905999" cy="3874476"/>
-          </a:xfrm>
-        </p:spPr>
-        <p:txBody>
-          <a:bodyPr>
-            <a:normAutofit/>
-          </a:bodyPr>
-          <a:lstStyle/>
-          <a:p>
-            <a:r>
-              <a:rPr lang="en-US" dirty="0"/>
-              <a:t>Major aspect of the “Flexibility” goal</a:t>
-            </a:r>
-          </a:p>
-          <a:p>
-            <a:r>
-              <a:rPr lang="en-US" dirty="0"/>
-              <a:t>New deployments</a:t>
-            </a:r>
-          </a:p>
-          <a:p>
-            <a:pPr lvl="1"/>
-            <a:r>
-              <a:rPr lang="en-US" dirty="0"/>
-              <a:t>Metropolitan Intelligent Transportation System</a:t>
-            </a:r>
-          </a:p>
-          <a:p>
-            <a:pPr lvl="1"/>
-            <a:r>
-              <a:rPr lang="en-US" dirty="0" err="1"/>
-              <a:t>CloudRAN</a:t>
-            </a:r>
-            <a:r>
-              <a:rPr lang="en-US" dirty="0"/>
-              <a:t> Data Center</a:t>
-            </a:r>
-          </a:p>
-          <a:p>
-            <a:r>
-              <a:rPr lang="en-US" dirty="0"/>
-              <a:t>Existing deployments</a:t>
-            </a:r>
-          </a:p>
-          <a:p>
-            <a:pPr lvl="1"/>
-            <a:r>
-              <a:rPr lang="en-US" dirty="0"/>
-              <a:t>Interpose at MTSO (a la SMORE)</a:t>
-            </a:r>
-          </a:p>
-          <a:p>
-            <a:pPr lvl="1"/>
-            <a:r>
-              <a:rPr lang="en-US" dirty="0"/>
-              <a:t>Integrate into </a:t>
-            </a:r>
-            <a:r>
-              <a:rPr lang="en-US" dirty="0" err="1"/>
-              <a:t>eNodeB</a:t>
-            </a:r>
-            <a:r>
-              <a:rPr lang="en-US" dirty="0"/>
-              <a:t>, right at the edge</a:t>
-            </a:r>
-          </a:p>
-          <a:p>
-            <a:pPr lvl="1"/>
-            <a:r>
-              <a:rPr lang="en-US" dirty="0"/>
-              <a:t>North of PGW, dedicated or default bearer</a:t>
-            </a:r>
-          </a:p>
-        </p:txBody>
-      </p:sp>
-    </p:spTree>
-    <p:extLst>
-      <p:ext uri="{BB962C8B-B14F-4D97-AF65-F5344CB8AC3E}">
-        <p14:creationId xmlns:p14="http://schemas.microsoft.com/office/powerpoint/2010/main" val="558600912"/>
-      </p:ext>
-    </p:extLst>
-  </p:cSld>
-  <p:clrMapOvr>
-    <a:masterClrMapping/>
-  </p:clrMapOvr>
+  <p:timing>
+    <p:tnLst>
+      <p:par>
+        <p:cTn id="1" dur="indefinite" restart="never" nodeType="tmRoot"/>
+      </p:par>
+    </p:tnLst>
+  </p:timing>
 </p:sld>
 </file>
 
@@ -14264,254 +13550,13 @@
   <p:clrMapOvr>
     <a:masterClrMapping/>
   </p:clrMapOvr>
-</p:sld>
-</file>
-
-<file path=ppt/slides/slide20.xml><?xml version="1.0" encoding="utf-8"?>
-<p:sld xmlns:a="http://schemas.openxmlformats.org/drawingml/2006/main" xmlns:r="http://schemas.openxmlformats.org/officeDocument/2006/relationships" xmlns:p="http://schemas.openxmlformats.org/presentationml/2006/main">
-  <p:cSld>
-    <p:spTree>
-      <p:nvGrpSpPr>
-        <p:cNvPr id="1" name=""/>
-        <p:cNvGrpSpPr/>
-        <p:nvPr/>
-      </p:nvGrpSpPr>
-      <p:grpSpPr>
-        <a:xfrm>
-          <a:off x="0" y="0"/>
-          <a:ext cx="0" cy="0"/>
-          <a:chOff x="0" y="0"/>
-          <a:chExt cx="0" cy="0"/>
-        </a:xfrm>
-      </p:grpSpPr>
-      <p:sp>
-        <p:nvSpPr>
-          <p:cNvPr id="2" name="Title 1"/>
-          <p:cNvSpPr>
-            <a:spLocks noGrp="1"/>
-          </p:cNvSpPr>
-          <p:nvPr>
-            <p:ph type="title"/>
-          </p:nvPr>
-        </p:nvSpPr>
-        <p:spPr>
-          <a:xfrm>
-            <a:off x="1141413" y="232624"/>
-            <a:ext cx="9905998" cy="1478570"/>
-          </a:xfrm>
-        </p:spPr>
-        <p:txBody>
-          <a:bodyPr/>
-          <a:lstStyle/>
-          <a:p>
-            <a:pPr algn="ctr"/>
-            <a:r>
-              <a:rPr lang="en-US" dirty="0"/>
-              <a:t>Deployment scenarios – Metro ITS</a:t>
-            </a:r>
-          </a:p>
-        </p:txBody>
-      </p:sp>
-      <p:pic>
-        <p:nvPicPr>
-          <p:cNvPr id="4" name="Picture 3"/>
-          <p:cNvPicPr>
-            <a:picLocks noChangeAspect="1"/>
-          </p:cNvPicPr>
-          <p:nvPr/>
-        </p:nvPicPr>
-        <p:blipFill rotWithShape="1">
-          <a:blip r:embed="rId2"/>
-          <a:srcRect r="67870" b="-22"/>
-          <a:stretch/>
-        </p:blipFill>
-        <p:spPr>
-          <a:xfrm>
-            <a:off x="4335303" y="1546746"/>
-            <a:ext cx="3518218" cy="4698368"/>
-          </a:xfrm>
-          <a:prstGeom prst="rect">
-            <a:avLst/>
-          </a:prstGeom>
-        </p:spPr>
-      </p:pic>
-    </p:spTree>
-    <p:extLst>
-      <p:ext uri="{BB962C8B-B14F-4D97-AF65-F5344CB8AC3E}">
-        <p14:creationId xmlns:p14="http://schemas.microsoft.com/office/powerpoint/2010/main" val="188553244"/>
-      </p:ext>
-    </p:extLst>
-  </p:cSld>
-  <p:clrMapOvr>
-    <a:masterClrMapping/>
-  </p:clrMapOvr>
-</p:sld>
-</file>
-
-<file path=ppt/slides/slide21.xml><?xml version="1.0" encoding="utf-8"?>
-<p:sld xmlns:a="http://schemas.openxmlformats.org/drawingml/2006/main" xmlns:r="http://schemas.openxmlformats.org/officeDocument/2006/relationships" xmlns:p="http://schemas.openxmlformats.org/presentationml/2006/main">
-  <p:cSld>
-    <p:spTree>
-      <p:nvGrpSpPr>
-        <p:cNvPr id="1" name=""/>
-        <p:cNvGrpSpPr/>
-        <p:nvPr/>
-      </p:nvGrpSpPr>
-      <p:grpSpPr>
-        <a:xfrm>
-          <a:off x="0" y="0"/>
-          <a:ext cx="0" cy="0"/>
-          <a:chOff x="0" y="0"/>
-          <a:chExt cx="0" cy="0"/>
-        </a:xfrm>
-      </p:grpSpPr>
-      <p:sp>
-        <p:nvSpPr>
-          <p:cNvPr id="2" name="Title 1"/>
-          <p:cNvSpPr>
-            <a:spLocks noGrp="1"/>
-          </p:cNvSpPr>
-          <p:nvPr>
-            <p:ph type="title"/>
-          </p:nvPr>
-        </p:nvSpPr>
-        <p:spPr>
-          <a:xfrm>
-            <a:off x="1141413" y="299736"/>
-            <a:ext cx="9905998" cy="1478570"/>
-          </a:xfrm>
-        </p:spPr>
-        <p:txBody>
-          <a:bodyPr/>
-          <a:lstStyle/>
-          <a:p>
-            <a:pPr algn="ctr"/>
-            <a:r>
-              <a:rPr lang="en-US" dirty="0"/>
-              <a:t>Deployment scenarios - MTSO</a:t>
-            </a:r>
-          </a:p>
-        </p:txBody>
-      </p:sp>
-      <p:pic>
-        <p:nvPicPr>
-          <p:cNvPr id="3" name="Picture 2"/>
-          <p:cNvPicPr>
-            <a:picLocks noChangeAspect="1"/>
-          </p:cNvPicPr>
-          <p:nvPr/>
-        </p:nvPicPr>
-        <p:blipFill rotWithShape="1">
-          <a:blip r:embed="rId2"/>
-          <a:srcRect l="33250" r="33250"/>
-          <a:stretch/>
-        </p:blipFill>
-        <p:spPr>
-          <a:xfrm>
-            <a:off x="4237517" y="1565734"/>
-            <a:ext cx="3713789" cy="4755683"/>
-          </a:xfrm>
-          <a:prstGeom prst="rect">
-            <a:avLst/>
-          </a:prstGeom>
-        </p:spPr>
-      </p:pic>
-    </p:spTree>
-    <p:extLst>
-      <p:ext uri="{BB962C8B-B14F-4D97-AF65-F5344CB8AC3E}">
-        <p14:creationId xmlns:p14="http://schemas.microsoft.com/office/powerpoint/2010/main" val="597229695"/>
-      </p:ext>
-    </p:extLst>
-  </p:cSld>
-  <p:clrMapOvr>
-    <a:masterClrMapping/>
-  </p:clrMapOvr>
-</p:sld>
-</file>
-
-<file path=ppt/slides/slide22.xml><?xml version="1.0" encoding="utf-8"?>
-<p:sld xmlns:a="http://schemas.openxmlformats.org/drawingml/2006/main" xmlns:r="http://schemas.openxmlformats.org/officeDocument/2006/relationships" xmlns:p="http://schemas.openxmlformats.org/presentationml/2006/main">
-  <p:cSld>
-    <p:spTree>
-      <p:nvGrpSpPr>
-        <p:cNvPr id="1" name=""/>
-        <p:cNvGrpSpPr/>
-        <p:nvPr/>
-      </p:nvGrpSpPr>
-      <p:grpSpPr>
-        <a:xfrm>
-          <a:off x="0" y="0"/>
-          <a:ext cx="0" cy="0"/>
-          <a:chOff x="0" y="0"/>
-          <a:chExt cx="0" cy="0"/>
-        </a:xfrm>
-      </p:grpSpPr>
-      <p:sp>
-        <p:nvSpPr>
-          <p:cNvPr id="2" name="Title 1"/>
-          <p:cNvSpPr>
-            <a:spLocks noGrp="1"/>
-          </p:cNvSpPr>
-          <p:nvPr>
-            <p:ph type="title"/>
-          </p:nvPr>
-        </p:nvSpPr>
-        <p:spPr>
-          <a:xfrm>
-            <a:off x="1141413" y="308125"/>
-            <a:ext cx="9905998" cy="1478570"/>
-          </a:xfrm>
-        </p:spPr>
-        <p:txBody>
-          <a:bodyPr/>
-          <a:lstStyle/>
-          <a:p>
-            <a:pPr algn="ctr"/>
-            <a:r>
-              <a:rPr lang="en-US" dirty="0"/>
-              <a:t>Deployment scenarios – </a:t>
-            </a:r>
-            <a:r>
-              <a:rPr lang="en-US" dirty="0" err="1"/>
-              <a:t>enodeb</a:t>
-            </a:r>
-            <a:endParaRPr lang="en-US" dirty="0"/>
-          </a:p>
-        </p:txBody>
-      </p:sp>
-      <p:pic>
-        <p:nvPicPr>
-          <p:cNvPr id="3" name="Picture 2"/>
-          <p:cNvPicPr>
-            <a:picLocks noChangeAspect="1"/>
-          </p:cNvPicPr>
-          <p:nvPr/>
-        </p:nvPicPr>
-        <p:blipFill rotWithShape="1">
-          <a:blip r:embed="rId2"/>
-          <a:srcRect l="67747" t="239" r="-59"/>
-          <a:stretch/>
-        </p:blipFill>
-        <p:spPr>
-          <a:xfrm>
-            <a:off x="4303363" y="1627464"/>
-            <a:ext cx="3582098" cy="4744287"/>
-          </a:xfrm>
-          <a:prstGeom prst="rect">
-            <a:avLst/>
-          </a:prstGeom>
-        </p:spPr>
-      </p:pic>
-    </p:spTree>
-    <p:extLst>
-      <p:ext uri="{BB962C8B-B14F-4D97-AF65-F5344CB8AC3E}">
-        <p14:creationId xmlns:p14="http://schemas.microsoft.com/office/powerpoint/2010/main" val="3376742031"/>
-      </p:ext>
-    </p:extLst>
-  </p:cSld>
-  <p:clrMapOvr>
-    <a:masterClrMapping/>
-  </p:clrMapOvr>
+  <p:timing>
+    <p:tnLst>
+      <p:par>
+        <p:cTn id="1" dur="indefinite" restart="never" nodeType="tmRoot"/>
+      </p:par>
+    </p:tnLst>
+  </p:timing>
 </p:sld>
 </file>
 
@@ -14687,6 +13732,13 @@
   <p:clrMapOvr>
     <a:masterClrMapping/>
   </p:clrMapOvr>
+  <p:timing>
+    <p:tnLst>
+      <p:par>
+        <p:cTn id="1" dur="indefinite" restart="never" nodeType="tmRoot"/>
+      </p:par>
+    </p:tnLst>
+  </p:timing>
 </p:sld>
 </file>
 
@@ -14817,6 +13869,13 @@
   <p:clrMapOvr>
     <a:masterClrMapping/>
   </p:clrMapOvr>
+  <p:timing>
+    <p:tnLst>
+      <p:par>
+        <p:cTn id="1" dur="indefinite" restart="never" nodeType="tmRoot"/>
+      </p:par>
+    </p:tnLst>
+  </p:timing>
 </p:sld>
 </file>
 
@@ -14892,6 +13951,13 @@
   <p:clrMapOvr>
     <a:masterClrMapping/>
   </p:clrMapOvr>
+  <p:timing>
+    <p:tnLst>
+      <p:par>
+        <p:cTn id="1" dur="indefinite" restart="never" nodeType="tmRoot"/>
+      </p:par>
+    </p:tnLst>
+  </p:timing>
 </p:sld>
 </file>
 
@@ -15050,6 +14116,13 @@
   <p:clrMapOvr>
     <a:masterClrMapping/>
   </p:clrMapOvr>
+  <p:timing>
+    <p:tnLst>
+      <p:par>
+        <p:cTn id="1" dur="indefinite" restart="never" nodeType="tmRoot"/>
+      </p:par>
+    </p:tnLst>
+  </p:timing>
 </p:sld>
 </file>
 
@@ -15138,6 +14211,13 @@
   <p:clrMapOvr>
     <a:masterClrMapping/>
   </p:clrMapOvr>
+  <p:timing>
+    <p:tnLst>
+      <p:par>
+        <p:cTn id="1" dur="indefinite" restart="never" nodeType="tmRoot"/>
+      </p:par>
+    </p:tnLst>
+  </p:timing>
 </p:sld>
 </file>
 
@@ -15269,6 +14349,13 @@
   <p:clrMapOvr>
     <a:masterClrMapping/>
   </p:clrMapOvr>
+  <p:timing>
+    <p:tnLst>
+      <p:par>
+        <p:cTn id="1" dur="indefinite" restart="never" nodeType="tmRoot"/>
+      </p:par>
+    </p:tnLst>
+  </p:timing>
 </p:sld>
 </file>
 
@@ -15432,6 +14519,13 @@
   <p:clrMapOvr>
     <a:masterClrMapping/>
   </p:clrMapOvr>
+  <p:timing>
+    <p:tnLst>
+      <p:par>
+        <p:cTn id="1" dur="indefinite" restart="never" nodeType="tmRoot"/>
+      </p:par>
+    </p:tnLst>
+  </p:timing>
 </p:sld>
 </file>
 

</xml_diff>

<commit_message>
Replace architecture diagram with simplified component diagram.
</commit_message>
<xml_diff>
--- a/presentation/Mercury-Part1.pptx
+++ b/presentation/Mercury-Part1.pptx
@@ -17,7 +17,7 @@
     <p:sldId id="265" r:id="rId11"/>
     <p:sldId id="266" r:id="rId12"/>
     <p:sldId id="267" r:id="rId13"/>
-    <p:sldId id="268" r:id="rId14"/>
+    <p:sldId id="278" r:id="rId14"/>
     <p:sldId id="274" r:id="rId15"/>
     <p:sldId id="275" r:id="rId16"/>
     <p:sldId id="276" r:id="rId17"/>
@@ -185,7 +185,7 @@
           <a:noFill/>
           <a:extLst>
             <a:ext uri="{909E8E84-426E-40dd-AFC4-6F175D3DCCD1}">
-              <a14:hiddenFill xmlns:a14="http://schemas.microsoft.com/office/drawing/2010/main" xmlns="">
+              <a14:hiddenFill xmlns="" xmlns:a14="http://schemas.microsoft.com/office/drawing/2010/main">
                 <a:solidFill>
                   <a:srgbClr val="FFFFFF"/>
                 </a:solidFill>
@@ -244,7 +244,7 @@
             </a:ln>
             <a:extLst>
               <a:ext uri="{91240B29-F687-4f45-9708-019B960494DF}">
-                <a14:hiddenLine xmlns:a14="http://schemas.microsoft.com/office/drawing/2010/main" xmlns="" w="9525">
+                <a14:hiddenLine xmlns="" xmlns:a14="http://schemas.microsoft.com/office/drawing/2010/main" w="9525">
                   <a:solidFill>
                     <a:srgbClr val="000000"/>
                   </a:solidFill>
@@ -334,7 +334,7 @@
             </a:ln>
             <a:extLst>
               <a:ext uri="{91240B29-F687-4f45-9708-019B960494DF}">
-                <a14:hiddenLine xmlns:a14="http://schemas.microsoft.com/office/drawing/2010/main" xmlns="" w="9525">
+                <a14:hiddenLine xmlns="" xmlns:a14="http://schemas.microsoft.com/office/drawing/2010/main" w="9525">
                   <a:solidFill>
                     <a:srgbClr val="000000"/>
                   </a:solidFill>
@@ -424,7 +424,7 @@
             </a:ln>
             <a:extLst>
               <a:ext uri="{91240B29-F687-4f45-9708-019B960494DF}">
-                <a14:hiddenLine xmlns:a14="http://schemas.microsoft.com/office/drawing/2010/main" xmlns="" w="9525">
+                <a14:hiddenLine xmlns="" xmlns:a14="http://schemas.microsoft.com/office/drawing/2010/main" w="9525">
                   <a:solidFill>
                     <a:srgbClr val="000000"/>
                   </a:solidFill>
@@ -458,7 +458,7 @@
             </a:ln>
             <a:extLst>
               <a:ext uri="{91240B29-F687-4f45-9708-019B960494DF}">
-                <a14:hiddenLine xmlns:a14="http://schemas.microsoft.com/office/drawing/2010/main" xmlns="" w="9525">
+                <a14:hiddenLine xmlns="" xmlns:a14="http://schemas.microsoft.com/office/drawing/2010/main" w="9525">
                   <a:solidFill>
                     <a:srgbClr val="000000"/>
                   </a:solidFill>
@@ -548,7 +548,7 @@
             </a:ln>
             <a:extLst>
               <a:ext uri="{91240B29-F687-4f45-9708-019B960494DF}">
-                <a14:hiddenLine xmlns:a14="http://schemas.microsoft.com/office/drawing/2010/main" xmlns="" w="9525">
+                <a14:hiddenLine xmlns="" xmlns:a14="http://schemas.microsoft.com/office/drawing/2010/main" w="9525">
                   <a:solidFill>
                     <a:srgbClr val="000000"/>
                   </a:solidFill>
@@ -610,7 +610,7 @@
             </a:ln>
             <a:extLst>
               <a:ext uri="{91240B29-F687-4f45-9708-019B960494DF}">
-                <a14:hiddenLine xmlns:a14="http://schemas.microsoft.com/office/drawing/2010/main" xmlns="" w="9525">
+                <a14:hiddenLine xmlns="" xmlns:a14="http://schemas.microsoft.com/office/drawing/2010/main" w="9525">
                   <a:solidFill>
                     <a:srgbClr val="000000"/>
                   </a:solidFill>
@@ -672,7 +672,7 @@
             </a:ln>
             <a:extLst>
               <a:ext uri="{91240B29-F687-4f45-9708-019B960494DF}">
-                <a14:hiddenLine xmlns:a14="http://schemas.microsoft.com/office/drawing/2010/main" xmlns="" w="9525">
+                <a14:hiddenLine xmlns="" xmlns:a14="http://schemas.microsoft.com/office/drawing/2010/main" w="9525">
                   <a:solidFill>
                     <a:srgbClr val="000000"/>
                   </a:solidFill>
@@ -762,7 +762,7 @@
             </a:ln>
             <a:extLst>
               <a:ext uri="{91240B29-F687-4f45-9708-019B960494DF}">
-                <a14:hiddenLine xmlns:a14="http://schemas.microsoft.com/office/drawing/2010/main" xmlns="" w="9525">
+                <a14:hiddenLine xmlns="" xmlns:a14="http://schemas.microsoft.com/office/drawing/2010/main" w="9525">
                   <a:solidFill>
                     <a:srgbClr val="000000"/>
                   </a:solidFill>
@@ -824,7 +824,7 @@
             </a:ln>
             <a:extLst>
               <a:ext uri="{91240B29-F687-4f45-9708-019B960494DF}">
-                <a14:hiddenLine xmlns:a14="http://schemas.microsoft.com/office/drawing/2010/main" xmlns="" w="9525">
+                <a14:hiddenLine xmlns="" xmlns:a14="http://schemas.microsoft.com/office/drawing/2010/main" w="9525">
                   <a:solidFill>
                     <a:srgbClr val="000000"/>
                   </a:solidFill>
@@ -886,7 +886,7 @@
             </a:ln>
             <a:extLst>
               <a:ext uri="{91240B29-F687-4f45-9708-019B960494DF}">
-                <a14:hiddenLine xmlns:a14="http://schemas.microsoft.com/office/drawing/2010/main" xmlns="" w="9525">
+                <a14:hiddenLine xmlns="" xmlns:a14="http://schemas.microsoft.com/office/drawing/2010/main" w="9525">
                   <a:solidFill>
                     <a:srgbClr val="000000"/>
                   </a:solidFill>
@@ -976,7 +976,7 @@
             </a:ln>
             <a:extLst>
               <a:ext uri="{91240B29-F687-4f45-9708-019B960494DF}">
-                <a14:hiddenLine xmlns:a14="http://schemas.microsoft.com/office/drawing/2010/main" xmlns="" w="9525">
+                <a14:hiddenLine xmlns="" xmlns:a14="http://schemas.microsoft.com/office/drawing/2010/main" w="9525">
                   <a:solidFill>
                     <a:srgbClr val="000000"/>
                   </a:solidFill>
@@ -1066,7 +1066,7 @@
             </a:ln>
             <a:extLst>
               <a:ext uri="{91240B29-F687-4f45-9708-019B960494DF}">
-                <a14:hiddenLine xmlns:a14="http://schemas.microsoft.com/office/drawing/2010/main" xmlns="" w="9525">
+                <a14:hiddenLine xmlns="" xmlns:a14="http://schemas.microsoft.com/office/drawing/2010/main" w="9525">
                   <a:solidFill>
                     <a:srgbClr val="000000"/>
                   </a:solidFill>
@@ -1128,7 +1128,7 @@
             </a:ln>
             <a:extLst>
               <a:ext uri="{91240B29-F687-4f45-9708-019B960494DF}">
-                <a14:hiddenLine xmlns:a14="http://schemas.microsoft.com/office/drawing/2010/main" xmlns="" w="9525">
+                <a14:hiddenLine xmlns="" xmlns:a14="http://schemas.microsoft.com/office/drawing/2010/main" w="9525">
                   <a:solidFill>
                     <a:srgbClr val="000000"/>
                   </a:solidFill>
@@ -1238,7 +1238,7 @@
             </a:ln>
             <a:extLst>
               <a:ext uri="{91240B29-F687-4f45-9708-019B960494DF}">
-                <a14:hiddenLine xmlns:a14="http://schemas.microsoft.com/office/drawing/2010/main" xmlns="" w="9525">
+                <a14:hiddenLine xmlns="" xmlns:a14="http://schemas.microsoft.com/office/drawing/2010/main" w="9525">
                   <a:solidFill>
                     <a:srgbClr val="000000"/>
                   </a:solidFill>
@@ -1300,7 +1300,7 @@
             </a:ln>
             <a:extLst>
               <a:ext uri="{91240B29-F687-4f45-9708-019B960494DF}">
-                <a14:hiddenLine xmlns:a14="http://schemas.microsoft.com/office/drawing/2010/main" xmlns="" w="9525">
+                <a14:hiddenLine xmlns="" xmlns:a14="http://schemas.microsoft.com/office/drawing/2010/main" w="9525">
                   <a:solidFill>
                     <a:srgbClr val="000000"/>
                   </a:solidFill>
@@ -1390,7 +1390,7 @@
             </a:ln>
             <a:extLst>
               <a:ext uri="{91240B29-F687-4f45-9708-019B960494DF}">
-                <a14:hiddenLine xmlns:a14="http://schemas.microsoft.com/office/drawing/2010/main" xmlns="" w="9525">
+                <a14:hiddenLine xmlns="" xmlns:a14="http://schemas.microsoft.com/office/drawing/2010/main" w="9525">
                   <a:solidFill>
                     <a:srgbClr val="000000"/>
                   </a:solidFill>
@@ -1480,7 +1480,7 @@
             </a:ln>
             <a:extLst>
               <a:ext uri="{91240B29-F687-4f45-9708-019B960494DF}">
-                <a14:hiddenLine xmlns:a14="http://schemas.microsoft.com/office/drawing/2010/main" xmlns="" w="9525">
+                <a14:hiddenLine xmlns="" xmlns:a14="http://schemas.microsoft.com/office/drawing/2010/main" w="9525">
                   <a:solidFill>
                     <a:srgbClr val="000000"/>
                   </a:solidFill>
@@ -1542,7 +1542,7 @@
             </a:ln>
             <a:extLst>
               <a:ext uri="{91240B29-F687-4f45-9708-019B960494DF}">
-                <a14:hiddenLine xmlns:a14="http://schemas.microsoft.com/office/drawing/2010/main" xmlns="" w="9525">
+                <a14:hiddenLine xmlns="" xmlns:a14="http://schemas.microsoft.com/office/drawing/2010/main" w="9525">
                   <a:solidFill>
                     <a:srgbClr val="000000"/>
                   </a:solidFill>
@@ -1632,7 +1632,7 @@
             </a:ln>
             <a:extLst>
               <a:ext uri="{91240B29-F687-4f45-9708-019B960494DF}">
-                <a14:hiddenLine xmlns:a14="http://schemas.microsoft.com/office/drawing/2010/main" xmlns="" w="9525">
+                <a14:hiddenLine xmlns="" xmlns:a14="http://schemas.microsoft.com/office/drawing/2010/main" w="9525">
                   <a:solidFill>
                     <a:srgbClr val="000000"/>
                   </a:solidFill>
@@ -1722,7 +1722,7 @@
             </a:ln>
             <a:extLst>
               <a:ext uri="{91240B29-F687-4f45-9708-019B960494DF}">
-                <a14:hiddenLine xmlns:a14="http://schemas.microsoft.com/office/drawing/2010/main" xmlns="" w="9525">
+                <a14:hiddenLine xmlns="" xmlns:a14="http://schemas.microsoft.com/office/drawing/2010/main" w="9525">
                   <a:solidFill>
                     <a:srgbClr val="000000"/>
                   </a:solidFill>
@@ -1778,7 +1778,7 @@
             </a:ln>
             <a:extLst>
               <a:ext uri="{91240B29-F687-4f45-9708-019B960494DF}">
-                <a14:hiddenLine xmlns:a14="http://schemas.microsoft.com/office/drawing/2010/main" xmlns="" w="9525">
+                <a14:hiddenLine xmlns="" xmlns:a14="http://schemas.microsoft.com/office/drawing/2010/main" w="9525">
                   <a:solidFill>
                     <a:srgbClr val="000000"/>
                   </a:solidFill>
@@ -1868,7 +1868,7 @@
             </a:ln>
             <a:extLst>
               <a:ext uri="{91240B29-F687-4f45-9708-019B960494DF}">
-                <a14:hiddenLine xmlns:a14="http://schemas.microsoft.com/office/drawing/2010/main" xmlns="" w="9525">
+                <a14:hiddenLine xmlns="" xmlns:a14="http://schemas.microsoft.com/office/drawing/2010/main" w="9525">
                   <a:solidFill>
                     <a:srgbClr val="000000"/>
                   </a:solidFill>
@@ -1924,7 +1924,7 @@
             </a:ln>
             <a:extLst>
               <a:ext uri="{91240B29-F687-4f45-9708-019B960494DF}">
-                <a14:hiddenLine xmlns:a14="http://schemas.microsoft.com/office/drawing/2010/main" xmlns="" w="9525">
+                <a14:hiddenLine xmlns="" xmlns:a14="http://schemas.microsoft.com/office/drawing/2010/main" w="9525">
                   <a:solidFill>
                     <a:srgbClr val="000000"/>
                   </a:solidFill>
@@ -2014,7 +2014,7 @@
             </a:ln>
             <a:extLst>
               <a:ext uri="{91240B29-F687-4f45-9708-019B960494DF}">
-                <a14:hiddenLine xmlns:a14="http://schemas.microsoft.com/office/drawing/2010/main" xmlns="" w="9525">
+                <a14:hiddenLine xmlns="" xmlns:a14="http://schemas.microsoft.com/office/drawing/2010/main" w="9525">
                   <a:solidFill>
                     <a:srgbClr val="000000"/>
                   </a:solidFill>
@@ -2082,7 +2082,7 @@
             </a:ln>
             <a:extLst>
               <a:ext uri="{91240B29-F687-4f45-9708-019B960494DF}">
-                <a14:hiddenLine xmlns:a14="http://schemas.microsoft.com/office/drawing/2010/main" xmlns="" w="9525">
+                <a14:hiddenLine xmlns="" xmlns:a14="http://schemas.microsoft.com/office/drawing/2010/main" w="9525">
                   <a:solidFill>
                     <a:srgbClr val="000000"/>
                   </a:solidFill>
@@ -2172,7 +2172,7 @@
             </a:ln>
             <a:extLst>
               <a:ext uri="{91240B29-F687-4f45-9708-019B960494DF}">
-                <a14:hiddenLine xmlns:a14="http://schemas.microsoft.com/office/drawing/2010/main" xmlns="" w="9525">
+                <a14:hiddenLine xmlns="" xmlns:a14="http://schemas.microsoft.com/office/drawing/2010/main" w="9525">
                   <a:solidFill>
                     <a:srgbClr val="000000"/>
                   </a:solidFill>
@@ -2240,7 +2240,7 @@
             </a:ln>
             <a:extLst>
               <a:ext uri="{91240B29-F687-4f45-9708-019B960494DF}">
-                <a14:hiddenLine xmlns:a14="http://schemas.microsoft.com/office/drawing/2010/main" xmlns="" w="9525">
+                <a14:hiddenLine xmlns="" xmlns:a14="http://schemas.microsoft.com/office/drawing/2010/main" w="9525">
                   <a:solidFill>
                     <a:srgbClr val="000000"/>
                   </a:solidFill>
@@ -2330,7 +2330,7 @@
             </a:ln>
             <a:extLst>
               <a:ext uri="{91240B29-F687-4f45-9708-019B960494DF}">
-                <a14:hiddenLine xmlns:a14="http://schemas.microsoft.com/office/drawing/2010/main" xmlns="" w="9525">
+                <a14:hiddenLine xmlns="" xmlns:a14="http://schemas.microsoft.com/office/drawing/2010/main" w="9525">
                   <a:solidFill>
                     <a:srgbClr val="000000"/>
                   </a:solidFill>
@@ -2364,7 +2364,7 @@
             </a:ln>
             <a:extLst>
               <a:ext uri="{91240B29-F687-4f45-9708-019B960494DF}">
-                <a14:hiddenLine xmlns:a14="http://schemas.microsoft.com/office/drawing/2010/main" xmlns="" w="9525">
+                <a14:hiddenLine xmlns="" xmlns:a14="http://schemas.microsoft.com/office/drawing/2010/main" w="9525">
                   <a:solidFill>
                     <a:srgbClr val="000000"/>
                   </a:solidFill>
@@ -2454,7 +2454,7 @@
             </a:ln>
             <a:extLst>
               <a:ext uri="{91240B29-F687-4f45-9708-019B960494DF}">
-                <a14:hiddenLine xmlns:a14="http://schemas.microsoft.com/office/drawing/2010/main" xmlns="" w="9525">
+                <a14:hiddenLine xmlns="" xmlns:a14="http://schemas.microsoft.com/office/drawing/2010/main" w="9525">
                   <a:solidFill>
                     <a:srgbClr val="000000"/>
                   </a:solidFill>
@@ -2516,7 +2516,7 @@
             </a:ln>
             <a:extLst>
               <a:ext uri="{91240B29-F687-4f45-9708-019B960494DF}">
-                <a14:hiddenLine xmlns:a14="http://schemas.microsoft.com/office/drawing/2010/main" xmlns="" w="9525">
+                <a14:hiddenLine xmlns="" xmlns:a14="http://schemas.microsoft.com/office/drawing/2010/main" w="9525">
                   <a:solidFill>
                     <a:srgbClr val="000000"/>
                   </a:solidFill>
@@ -2578,7 +2578,7 @@
             </a:ln>
             <a:extLst>
               <a:ext uri="{91240B29-F687-4f45-9708-019B960494DF}">
-                <a14:hiddenLine xmlns:a14="http://schemas.microsoft.com/office/drawing/2010/main" xmlns="" w="9525">
+                <a14:hiddenLine xmlns="" xmlns:a14="http://schemas.microsoft.com/office/drawing/2010/main" w="9525">
                   <a:solidFill>
                     <a:srgbClr val="000000"/>
                   </a:solidFill>
@@ -2668,7 +2668,7 @@
             </a:ln>
             <a:extLst>
               <a:ext uri="{91240B29-F687-4f45-9708-019B960494DF}">
-                <a14:hiddenLine xmlns:a14="http://schemas.microsoft.com/office/drawing/2010/main" xmlns="" w="9525">
+                <a14:hiddenLine xmlns="" xmlns:a14="http://schemas.microsoft.com/office/drawing/2010/main" w="9525">
                   <a:solidFill>
                     <a:srgbClr val="000000"/>
                   </a:solidFill>
@@ -2736,7 +2736,7 @@
             </a:ln>
             <a:extLst>
               <a:ext uri="{91240B29-F687-4f45-9708-019B960494DF}">
-                <a14:hiddenLine xmlns:a14="http://schemas.microsoft.com/office/drawing/2010/main" xmlns="" w="9525">
+                <a14:hiddenLine xmlns="" xmlns:a14="http://schemas.microsoft.com/office/drawing/2010/main" w="9525">
                   <a:solidFill>
                     <a:srgbClr val="000000"/>
                   </a:solidFill>
@@ -2798,7 +2798,7 @@
             </a:ln>
             <a:extLst>
               <a:ext uri="{91240B29-F687-4f45-9708-019B960494DF}">
-                <a14:hiddenLine xmlns:a14="http://schemas.microsoft.com/office/drawing/2010/main" xmlns="" w="9525">
+                <a14:hiddenLine xmlns="" xmlns:a14="http://schemas.microsoft.com/office/drawing/2010/main" w="9525">
                   <a:solidFill>
                     <a:srgbClr val="000000"/>
                   </a:solidFill>
@@ -2888,7 +2888,7 @@
             </a:ln>
             <a:extLst>
               <a:ext uri="{91240B29-F687-4f45-9708-019B960494DF}">
-                <a14:hiddenLine xmlns:a14="http://schemas.microsoft.com/office/drawing/2010/main" xmlns="" w="9525">
+                <a14:hiddenLine xmlns="" xmlns:a14="http://schemas.microsoft.com/office/drawing/2010/main" w="9525">
                   <a:solidFill>
                     <a:srgbClr val="000000"/>
                   </a:solidFill>
@@ -2950,7 +2950,7 @@
             </a:ln>
             <a:extLst>
               <a:ext uri="{91240B29-F687-4f45-9708-019B960494DF}">
-                <a14:hiddenLine xmlns:a14="http://schemas.microsoft.com/office/drawing/2010/main" xmlns="" w="9525">
+                <a14:hiddenLine xmlns="" xmlns:a14="http://schemas.microsoft.com/office/drawing/2010/main" w="9525">
                   <a:solidFill>
                     <a:srgbClr val="000000"/>
                   </a:solidFill>
@@ -3040,7 +3040,7 @@
             </a:ln>
             <a:extLst>
               <a:ext uri="{91240B29-F687-4f45-9708-019B960494DF}">
-                <a14:hiddenLine xmlns:a14="http://schemas.microsoft.com/office/drawing/2010/main" xmlns="" w="9525">
+                <a14:hiddenLine xmlns="" xmlns:a14="http://schemas.microsoft.com/office/drawing/2010/main" w="9525">
                   <a:solidFill>
                     <a:srgbClr val="000000"/>
                   </a:solidFill>
@@ -3102,7 +3102,7 @@
             </a:ln>
             <a:extLst>
               <a:ext uri="{91240B29-F687-4f45-9708-019B960494DF}">
-                <a14:hiddenLine xmlns:a14="http://schemas.microsoft.com/office/drawing/2010/main" xmlns="" w="9525">
+                <a14:hiddenLine xmlns="" xmlns:a14="http://schemas.microsoft.com/office/drawing/2010/main" w="9525">
                   <a:solidFill>
                     <a:srgbClr val="000000"/>
                   </a:solidFill>
@@ -3192,7 +3192,7 @@
             </a:ln>
             <a:extLst>
               <a:ext uri="{91240B29-F687-4f45-9708-019B960494DF}">
-                <a14:hiddenLine xmlns:a14="http://schemas.microsoft.com/office/drawing/2010/main" xmlns="" w="9525">
+                <a14:hiddenLine xmlns="" xmlns:a14="http://schemas.microsoft.com/office/drawing/2010/main" w="9525">
                   <a:solidFill>
                     <a:srgbClr val="000000"/>
                   </a:solidFill>
@@ -3226,7 +3226,7 @@
             </a:ln>
             <a:extLst>
               <a:ext uri="{91240B29-F687-4f45-9708-019B960494DF}">
-                <a14:hiddenLine xmlns:a14="http://schemas.microsoft.com/office/drawing/2010/main" xmlns="" w="9525">
+                <a14:hiddenLine xmlns="" xmlns:a14="http://schemas.microsoft.com/office/drawing/2010/main" w="9525">
                   <a:solidFill>
                     <a:srgbClr val="000000"/>
                   </a:solidFill>
@@ -3291,7 +3291,7 @@
             </a:ln>
             <a:extLst>
               <a:ext uri="{91240B29-F687-4f45-9708-019B960494DF}">
-                <a14:hiddenLine xmlns:a14="http://schemas.microsoft.com/office/drawing/2010/main" xmlns="" w="9525">
+                <a14:hiddenLine xmlns="" xmlns:a14="http://schemas.microsoft.com/office/drawing/2010/main" w="9525">
                   <a:solidFill>
                     <a:srgbClr val="000000"/>
                   </a:solidFill>
@@ -3381,7 +3381,7 @@
             </a:ln>
             <a:extLst>
               <a:ext uri="{91240B29-F687-4f45-9708-019B960494DF}">
-                <a14:hiddenLine xmlns:a14="http://schemas.microsoft.com/office/drawing/2010/main" xmlns="" w="9525">
+                <a14:hiddenLine xmlns="" xmlns:a14="http://schemas.microsoft.com/office/drawing/2010/main" w="9525">
                   <a:solidFill>
                     <a:srgbClr val="000000"/>
                   </a:solidFill>
@@ -3443,7 +3443,7 @@
             </a:ln>
             <a:extLst>
               <a:ext uri="{91240B29-F687-4f45-9708-019B960494DF}">
-                <a14:hiddenLine xmlns:a14="http://schemas.microsoft.com/office/drawing/2010/main" xmlns="" w="9525">
+                <a14:hiddenLine xmlns="" xmlns:a14="http://schemas.microsoft.com/office/drawing/2010/main" w="9525">
                   <a:solidFill>
                     <a:srgbClr val="000000"/>
                   </a:solidFill>
@@ -3533,7 +3533,7 @@
             </a:ln>
             <a:extLst>
               <a:ext uri="{91240B29-F687-4f45-9708-019B960494DF}">
-                <a14:hiddenLine xmlns:a14="http://schemas.microsoft.com/office/drawing/2010/main" xmlns="" w="9525">
+                <a14:hiddenLine xmlns="" xmlns:a14="http://schemas.microsoft.com/office/drawing/2010/main" w="9525">
                   <a:solidFill>
                     <a:srgbClr val="000000"/>
                   </a:solidFill>
@@ -3623,7 +3623,7 @@
             </a:ln>
             <a:extLst>
               <a:ext uri="{91240B29-F687-4f45-9708-019B960494DF}">
-                <a14:hiddenLine xmlns:a14="http://schemas.microsoft.com/office/drawing/2010/main" xmlns="" w="9525">
+                <a14:hiddenLine xmlns="" xmlns:a14="http://schemas.microsoft.com/office/drawing/2010/main" w="9525">
                   <a:solidFill>
                     <a:srgbClr val="000000"/>
                   </a:solidFill>
@@ -3688,7 +3688,7 @@
             </a:ln>
             <a:extLst>
               <a:ext uri="{91240B29-F687-4f45-9708-019B960494DF}">
-                <a14:hiddenLine xmlns:a14="http://schemas.microsoft.com/office/drawing/2010/main" xmlns="" w="9525">
+                <a14:hiddenLine xmlns="" xmlns:a14="http://schemas.microsoft.com/office/drawing/2010/main" w="9525">
                   <a:solidFill>
                     <a:srgbClr val="000000"/>
                   </a:solidFill>
@@ -3750,7 +3750,7 @@
             </a:ln>
             <a:extLst>
               <a:ext uri="{91240B29-F687-4f45-9708-019B960494DF}">
-                <a14:hiddenLine xmlns:a14="http://schemas.microsoft.com/office/drawing/2010/main" xmlns="" w="9525">
+                <a14:hiddenLine xmlns="" xmlns:a14="http://schemas.microsoft.com/office/drawing/2010/main" w="9525">
                   <a:solidFill>
                     <a:srgbClr val="000000"/>
                   </a:solidFill>
@@ -3840,7 +3840,7 @@
             </a:ln>
             <a:extLst>
               <a:ext uri="{91240B29-F687-4f45-9708-019B960494DF}">
-                <a14:hiddenLine xmlns:a14="http://schemas.microsoft.com/office/drawing/2010/main" xmlns="" w="9525">
+                <a14:hiddenLine xmlns="" xmlns:a14="http://schemas.microsoft.com/office/drawing/2010/main" w="9525">
                   <a:solidFill>
                     <a:srgbClr val="000000"/>
                   </a:solidFill>
@@ -3930,7 +3930,7 @@
             </a:ln>
             <a:extLst>
               <a:ext uri="{91240B29-F687-4f45-9708-019B960494DF}">
-                <a14:hiddenLine xmlns:a14="http://schemas.microsoft.com/office/drawing/2010/main" xmlns="" w="9525">
+                <a14:hiddenLine xmlns="" xmlns:a14="http://schemas.microsoft.com/office/drawing/2010/main" w="9525">
                   <a:solidFill>
                     <a:srgbClr val="000000"/>
                   </a:solidFill>
@@ -3992,7 +3992,7 @@
             </a:ln>
             <a:extLst>
               <a:ext uri="{91240B29-F687-4f45-9708-019B960494DF}">
-                <a14:hiddenLine xmlns:a14="http://schemas.microsoft.com/office/drawing/2010/main" xmlns="" w="9525">
+                <a14:hiddenLine xmlns="" xmlns:a14="http://schemas.microsoft.com/office/drawing/2010/main" w="9525">
                   <a:solidFill>
                     <a:srgbClr val="000000"/>
                   </a:solidFill>
@@ -4112,7 +4112,7 @@
             </a:ln>
             <a:extLst>
               <a:ext uri="{91240B29-F687-4f45-9708-019B960494DF}">
-                <a14:hiddenLine xmlns:a14="http://schemas.microsoft.com/office/drawing/2010/main" xmlns="" w="9525">
+                <a14:hiddenLine xmlns="" xmlns:a14="http://schemas.microsoft.com/office/drawing/2010/main" w="9525">
                   <a:solidFill>
                     <a:srgbClr val="000000"/>
                   </a:solidFill>
@@ -4180,7 +4180,7 @@
             </a:ln>
             <a:extLst>
               <a:ext uri="{91240B29-F687-4f45-9708-019B960494DF}">
-                <a14:hiddenLine xmlns:a14="http://schemas.microsoft.com/office/drawing/2010/main" xmlns="" w="9525">
+                <a14:hiddenLine xmlns="" xmlns:a14="http://schemas.microsoft.com/office/drawing/2010/main" w="9525">
                   <a:solidFill>
                     <a:srgbClr val="000000"/>
                   </a:solidFill>
@@ -4270,7 +4270,7 @@
             </a:ln>
             <a:extLst>
               <a:ext uri="{91240B29-F687-4f45-9708-019B960494DF}">
-                <a14:hiddenLine xmlns:a14="http://schemas.microsoft.com/office/drawing/2010/main" xmlns="" w="9525">
+                <a14:hiddenLine xmlns="" xmlns:a14="http://schemas.microsoft.com/office/drawing/2010/main" w="9525">
                   <a:solidFill>
                     <a:srgbClr val="000000"/>
                   </a:solidFill>
@@ -4410,7 +4410,7 @@
           <a:p>
             <a:fld id="{48A87A34-81AB-432B-8DAE-1953F412C126}" type="datetimeFigureOut">
               <a:rPr lang="en-US" dirty="0"/>
-              <a:t>11/28/2016</a:t>
+              <a:t>11/29/2016</a:t>
             </a:fld>
             <a:endParaRPr lang="en-US" dirty="0"/>
           </a:p>
@@ -4672,7 +4672,7 @@
           <a:p>
             <a:fld id="{48A87A34-81AB-432B-8DAE-1953F412C126}" type="datetimeFigureOut">
               <a:rPr lang="en-US" dirty="0"/>
-              <a:t>11/28/2016</a:t>
+              <a:t>11/29/2016</a:t>
             </a:fld>
             <a:endParaRPr lang="en-US" dirty="0"/>
           </a:p>
@@ -4863,7 +4863,7 @@
           <a:p>
             <a:fld id="{48A87A34-81AB-432B-8DAE-1953F412C126}" type="datetimeFigureOut">
               <a:rPr lang="en-US" dirty="0"/>
-              <a:t>11/28/2016</a:t>
+              <a:t>11/29/2016</a:t>
             </a:fld>
             <a:endParaRPr lang="en-US" dirty="0"/>
           </a:p>
@@ -5121,7 +5121,7 @@
           <a:p>
             <a:fld id="{48A87A34-81AB-432B-8DAE-1953F412C126}" type="datetimeFigureOut">
               <a:rPr lang="en-US" dirty="0"/>
-              <a:t>11/28/2016</a:t>
+              <a:t>11/29/2016</a:t>
             </a:fld>
             <a:endParaRPr lang="en-US" dirty="0"/>
           </a:p>
@@ -5550,7 +5550,7 @@
           <a:p>
             <a:fld id="{48A87A34-81AB-432B-8DAE-1953F412C126}" type="datetimeFigureOut">
               <a:rPr lang="en-US" dirty="0"/>
-              <a:t>11/28/2016</a:t>
+              <a:t>11/29/2016</a:t>
             </a:fld>
             <a:endParaRPr lang="en-US" dirty="0"/>
           </a:p>
@@ -6091,7 +6091,7 @@
           <a:p>
             <a:fld id="{48A87A34-81AB-432B-8DAE-1953F412C126}" type="datetimeFigureOut">
               <a:rPr lang="en-US" dirty="0"/>
-              <a:t>11/28/2016</a:t>
+              <a:t>11/29/2016</a:t>
             </a:fld>
             <a:endParaRPr lang="en-US" dirty="0"/>
           </a:p>
@@ -6806,7 +6806,7 @@
           <a:p>
             <a:fld id="{48A87A34-81AB-432B-8DAE-1953F412C126}" type="datetimeFigureOut">
               <a:rPr lang="en-US" dirty="0"/>
-              <a:t>11/28/2016</a:t>
+              <a:t>11/29/2016</a:t>
             </a:fld>
             <a:endParaRPr lang="en-US" dirty="0"/>
           </a:p>
@@ -6971,7 +6971,7 @@
           <a:p>
             <a:fld id="{48A87A34-81AB-432B-8DAE-1953F412C126}" type="datetimeFigureOut">
               <a:rPr lang="en-US" dirty="0"/>
-              <a:t>11/28/2016</a:t>
+              <a:t>11/29/2016</a:t>
             </a:fld>
             <a:endParaRPr lang="en-US" dirty="0"/>
           </a:p>
@@ -7146,7 +7146,7 @@
           <a:p>
             <a:fld id="{48A87A34-81AB-432B-8DAE-1953F412C126}" type="datetimeFigureOut">
               <a:rPr lang="en-US" dirty="0"/>
-              <a:t>11/28/2016</a:t>
+              <a:t>11/29/2016</a:t>
             </a:fld>
             <a:endParaRPr lang="en-US" dirty="0"/>
           </a:p>
@@ -7311,7 +7311,7 @@
           <a:p>
             <a:fld id="{48A87A34-81AB-432B-8DAE-1953F412C126}" type="datetimeFigureOut">
               <a:rPr lang="en-US" dirty="0"/>
-              <a:t>11/28/2016</a:t>
+              <a:t>11/29/2016</a:t>
             </a:fld>
             <a:endParaRPr lang="en-US" dirty="0"/>
           </a:p>
@@ -7556,7 +7556,7 @@
           <a:p>
             <a:fld id="{48A87A34-81AB-432B-8DAE-1953F412C126}" type="datetimeFigureOut">
               <a:rPr lang="en-US" dirty="0"/>
-              <a:t>11/28/2016</a:t>
+              <a:t>11/29/2016</a:t>
             </a:fld>
             <a:endParaRPr lang="en-US" dirty="0"/>
           </a:p>
@@ -7783,7 +7783,7 @@
           <a:p>
             <a:fld id="{48A87A34-81AB-432B-8DAE-1953F412C126}" type="datetimeFigureOut">
               <a:rPr lang="en-US" dirty="0"/>
-              <a:t>11/28/2016</a:t>
+              <a:t>11/29/2016</a:t>
             </a:fld>
             <a:endParaRPr lang="en-US" dirty="0"/>
           </a:p>
@@ -8159,7 +8159,7 @@
           <a:p>
             <a:fld id="{48A87A34-81AB-432B-8DAE-1953F412C126}" type="datetimeFigureOut">
               <a:rPr lang="en-US" dirty="0"/>
-              <a:t>11/28/2016</a:t>
+              <a:t>11/29/2016</a:t>
             </a:fld>
             <a:endParaRPr lang="en-US" dirty="0"/>
           </a:p>
@@ -8272,7 +8272,7 @@
           <a:p>
             <a:fld id="{48A87A34-81AB-432B-8DAE-1953F412C126}" type="datetimeFigureOut">
               <a:rPr lang="en-US" dirty="0"/>
-              <a:t>11/28/2016</a:t>
+              <a:t>11/29/2016</a:t>
             </a:fld>
             <a:endParaRPr lang="en-US" dirty="0"/>
           </a:p>
@@ -8362,7 +8362,7 @@
           <a:p>
             <a:fld id="{48A87A34-81AB-432B-8DAE-1953F412C126}" type="datetimeFigureOut">
               <a:rPr lang="en-US" dirty="0"/>
-              <a:t>11/28/2016</a:t>
+              <a:t>11/29/2016</a:t>
             </a:fld>
             <a:endParaRPr lang="en-US" dirty="0"/>
           </a:p>
@@ -8606,7 +8606,7 @@
           <a:p>
             <a:fld id="{48A87A34-81AB-432B-8DAE-1953F412C126}" type="datetimeFigureOut">
               <a:rPr lang="en-US" dirty="0"/>
-              <a:t>11/28/2016</a:t>
+              <a:t>11/29/2016</a:t>
             </a:fld>
             <a:endParaRPr lang="en-US" dirty="0"/>
           </a:p>
@@ -8881,7 +8881,7 @@
           <a:p>
             <a:fld id="{48A87A34-81AB-432B-8DAE-1953F412C126}" type="datetimeFigureOut">
               <a:rPr lang="en-US" dirty="0"/>
-              <a:t>11/28/2016</a:t>
+              <a:t>11/29/2016</a:t>
             </a:fld>
             <a:endParaRPr lang="en-US" dirty="0"/>
           </a:p>
@@ -8999,7 +8999,7 @@
           <a:noFill/>
           <a:extLst>
             <a:ext uri="{909E8E84-426E-40dd-AFC4-6F175D3DCCD1}">
-              <a14:hiddenFill xmlns:a14="http://schemas.microsoft.com/office/drawing/2010/main" xmlns="">
+              <a14:hiddenFill xmlns="" xmlns:a14="http://schemas.microsoft.com/office/drawing/2010/main">
                 <a:solidFill>
                   <a:srgbClr val="FFFFFF"/>
                 </a:solidFill>
@@ -9073,7 +9073,7 @@
               </a:ln>
               <a:extLst>
                 <a:ext uri="{91240B29-F687-4f45-9708-019B960494DF}">
-                  <a14:hiddenLine xmlns:a14="http://schemas.microsoft.com/office/drawing/2010/main" xmlns="" w="9525">
+                  <a14:hiddenLine xmlns="" xmlns:a14="http://schemas.microsoft.com/office/drawing/2010/main" w="9525">
                     <a:solidFill>
                       <a:srgbClr val="000000"/>
                     </a:solidFill>
@@ -9163,7 +9163,7 @@
               </a:ln>
               <a:extLst>
                 <a:ext uri="{91240B29-F687-4f45-9708-019B960494DF}">
-                  <a14:hiddenLine xmlns:a14="http://schemas.microsoft.com/office/drawing/2010/main" xmlns="" w="9525">
+                  <a14:hiddenLine xmlns="" xmlns:a14="http://schemas.microsoft.com/office/drawing/2010/main" w="9525">
                     <a:solidFill>
                       <a:srgbClr val="000000"/>
                     </a:solidFill>
@@ -9253,7 +9253,7 @@
               </a:ln>
               <a:extLst>
                 <a:ext uri="{91240B29-F687-4f45-9708-019B960494DF}">
-                  <a14:hiddenLine xmlns:a14="http://schemas.microsoft.com/office/drawing/2010/main" xmlns="" w="9525">
+                  <a14:hiddenLine xmlns="" xmlns:a14="http://schemas.microsoft.com/office/drawing/2010/main" w="9525">
                     <a:solidFill>
                       <a:srgbClr val="000000"/>
                     </a:solidFill>
@@ -9315,7 +9315,7 @@
               </a:ln>
               <a:extLst>
                 <a:ext uri="{91240B29-F687-4f45-9708-019B960494DF}">
-                  <a14:hiddenLine xmlns:a14="http://schemas.microsoft.com/office/drawing/2010/main" xmlns="" w="9525">
+                  <a14:hiddenLine xmlns="" xmlns:a14="http://schemas.microsoft.com/office/drawing/2010/main" w="9525">
                     <a:solidFill>
                       <a:srgbClr val="000000"/>
                     </a:solidFill>
@@ -9405,7 +9405,7 @@
               </a:ln>
               <a:extLst>
                 <a:ext uri="{91240B29-F687-4f45-9708-019B960494DF}">
-                  <a14:hiddenLine xmlns:a14="http://schemas.microsoft.com/office/drawing/2010/main" xmlns="" w="9525">
+                  <a14:hiddenLine xmlns="" xmlns:a14="http://schemas.microsoft.com/office/drawing/2010/main" w="9525">
                     <a:solidFill>
                       <a:srgbClr val="000000"/>
                     </a:solidFill>
@@ -9467,7 +9467,7 @@
               </a:ln>
               <a:extLst>
                 <a:ext uri="{91240B29-F687-4f45-9708-019B960494DF}">
-                  <a14:hiddenLine xmlns:a14="http://schemas.microsoft.com/office/drawing/2010/main" xmlns="" w="9525">
+                  <a14:hiddenLine xmlns="" xmlns:a14="http://schemas.microsoft.com/office/drawing/2010/main" w="9525">
                     <a:solidFill>
                       <a:srgbClr val="000000"/>
                     </a:solidFill>
@@ -9529,7 +9529,7 @@
               </a:ln>
               <a:extLst>
                 <a:ext uri="{91240B29-F687-4f45-9708-019B960494DF}">
-                  <a14:hiddenLine xmlns:a14="http://schemas.microsoft.com/office/drawing/2010/main" xmlns="" w="9525">
+                  <a14:hiddenLine xmlns="" xmlns:a14="http://schemas.microsoft.com/office/drawing/2010/main" w="9525">
                     <a:solidFill>
                       <a:srgbClr val="000000"/>
                     </a:solidFill>
@@ -9619,7 +9619,7 @@
               </a:ln>
               <a:extLst>
                 <a:ext uri="{91240B29-F687-4f45-9708-019B960494DF}">
-                  <a14:hiddenLine xmlns:a14="http://schemas.microsoft.com/office/drawing/2010/main" xmlns="" w="9525">
+                  <a14:hiddenLine xmlns="" xmlns:a14="http://schemas.microsoft.com/office/drawing/2010/main" w="9525">
                     <a:solidFill>
                       <a:srgbClr val="000000"/>
                     </a:solidFill>
@@ -9709,7 +9709,7 @@
               </a:ln>
               <a:extLst>
                 <a:ext uri="{91240B29-F687-4f45-9708-019B960494DF}">
-                  <a14:hiddenLine xmlns:a14="http://schemas.microsoft.com/office/drawing/2010/main" xmlns="" w="9525">
+                  <a14:hiddenLine xmlns="" xmlns:a14="http://schemas.microsoft.com/office/drawing/2010/main" w="9525">
                     <a:solidFill>
                       <a:srgbClr val="000000"/>
                     </a:solidFill>
@@ -9771,7 +9771,7 @@
               </a:ln>
               <a:extLst>
                 <a:ext uri="{91240B29-F687-4f45-9708-019B960494DF}">
-                  <a14:hiddenLine xmlns:a14="http://schemas.microsoft.com/office/drawing/2010/main" xmlns="" w="9525">
+                  <a14:hiddenLine xmlns="" xmlns:a14="http://schemas.microsoft.com/office/drawing/2010/main" w="9525">
                     <a:solidFill>
                       <a:srgbClr val="000000"/>
                     </a:solidFill>
@@ -9881,7 +9881,7 @@
               </a:ln>
               <a:extLst>
                 <a:ext uri="{91240B29-F687-4f45-9708-019B960494DF}">
-                  <a14:hiddenLine xmlns:a14="http://schemas.microsoft.com/office/drawing/2010/main" xmlns="" w="9525">
+                  <a14:hiddenLine xmlns="" xmlns:a14="http://schemas.microsoft.com/office/drawing/2010/main" w="9525">
                     <a:solidFill>
                       <a:srgbClr val="000000"/>
                     </a:solidFill>
@@ -9965,7 +9965,7 @@
               </a:ln>
               <a:extLst>
                 <a:ext uri="{91240B29-F687-4f45-9708-019B960494DF}">
-                  <a14:hiddenLine xmlns:a14="http://schemas.microsoft.com/office/drawing/2010/main" xmlns="" w="9525">
+                  <a14:hiddenLine xmlns="" xmlns:a14="http://schemas.microsoft.com/office/drawing/2010/main" w="9525">
                     <a:solidFill>
                       <a:srgbClr val="000000"/>
                     </a:solidFill>
@@ -10027,7 +10027,7 @@
               </a:ln>
               <a:extLst>
                 <a:ext uri="{91240B29-F687-4f45-9708-019B960494DF}">
-                  <a14:hiddenLine xmlns:a14="http://schemas.microsoft.com/office/drawing/2010/main" xmlns="" w="9525">
+                  <a14:hiddenLine xmlns="" xmlns:a14="http://schemas.microsoft.com/office/drawing/2010/main" w="9525">
                     <a:solidFill>
                       <a:srgbClr val="000000"/>
                     </a:solidFill>
@@ -10089,7 +10089,7 @@
               </a:ln>
               <a:extLst>
                 <a:ext uri="{91240B29-F687-4f45-9708-019B960494DF}">
-                  <a14:hiddenLine xmlns:a14="http://schemas.microsoft.com/office/drawing/2010/main" xmlns="" w="9525">
+                  <a14:hiddenLine xmlns="" xmlns:a14="http://schemas.microsoft.com/office/drawing/2010/main" w="9525">
                     <a:solidFill>
                       <a:srgbClr val="000000"/>
                     </a:solidFill>
@@ -10179,7 +10179,7 @@
               </a:ln>
               <a:extLst>
                 <a:ext uri="{91240B29-F687-4f45-9708-019B960494DF}">
-                  <a14:hiddenLine xmlns:a14="http://schemas.microsoft.com/office/drawing/2010/main" xmlns="" w="9525">
+                  <a14:hiddenLine xmlns="" xmlns:a14="http://schemas.microsoft.com/office/drawing/2010/main" w="9525">
                     <a:solidFill>
                       <a:srgbClr val="000000"/>
                     </a:solidFill>
@@ -10213,7 +10213,7 @@
               </a:ln>
               <a:extLst>
                 <a:ext uri="{91240B29-F687-4f45-9708-019B960494DF}">
-                  <a14:hiddenLine xmlns:a14="http://schemas.microsoft.com/office/drawing/2010/main" xmlns="" w="9525">
+                  <a14:hiddenLine xmlns="" xmlns:a14="http://schemas.microsoft.com/office/drawing/2010/main" w="9525">
                     <a:solidFill>
                       <a:srgbClr val="000000"/>
                     </a:solidFill>
@@ -10278,7 +10278,7 @@
               </a:ln>
               <a:extLst>
                 <a:ext uri="{91240B29-F687-4f45-9708-019B960494DF}">
-                  <a14:hiddenLine xmlns:a14="http://schemas.microsoft.com/office/drawing/2010/main" xmlns="" w="9525">
+                  <a14:hiddenLine xmlns="" xmlns:a14="http://schemas.microsoft.com/office/drawing/2010/main" w="9525">
                     <a:solidFill>
                       <a:srgbClr val="000000"/>
                     </a:solidFill>
@@ -10368,7 +10368,7 @@
               </a:ln>
               <a:extLst>
                 <a:ext uri="{91240B29-F687-4f45-9708-019B960494DF}">
-                  <a14:hiddenLine xmlns:a14="http://schemas.microsoft.com/office/drawing/2010/main" xmlns="" w="9525">
+                  <a14:hiddenLine xmlns="" xmlns:a14="http://schemas.microsoft.com/office/drawing/2010/main" w="9525">
                     <a:solidFill>
                       <a:srgbClr val="000000"/>
                     </a:solidFill>
@@ -10430,7 +10430,7 @@
               </a:ln>
               <a:extLst>
                 <a:ext uri="{91240B29-F687-4f45-9708-019B960494DF}">
-                  <a14:hiddenLine xmlns:a14="http://schemas.microsoft.com/office/drawing/2010/main" xmlns="" w="9525">
+                  <a14:hiddenLine xmlns="" xmlns:a14="http://schemas.microsoft.com/office/drawing/2010/main" w="9525">
                     <a:solidFill>
                       <a:srgbClr val="000000"/>
                     </a:solidFill>
@@ -10520,7 +10520,7 @@
               </a:ln>
               <a:extLst>
                 <a:ext uri="{91240B29-F687-4f45-9708-019B960494DF}">
-                  <a14:hiddenLine xmlns:a14="http://schemas.microsoft.com/office/drawing/2010/main" xmlns="" w="9525">
+                  <a14:hiddenLine xmlns="" xmlns:a14="http://schemas.microsoft.com/office/drawing/2010/main" w="9525">
                     <a:solidFill>
                       <a:srgbClr val="000000"/>
                     </a:solidFill>
@@ -10585,7 +10585,7 @@
               </a:ln>
               <a:extLst>
                 <a:ext uri="{91240B29-F687-4f45-9708-019B960494DF}">
-                  <a14:hiddenLine xmlns:a14="http://schemas.microsoft.com/office/drawing/2010/main" xmlns="" w="9525">
+                  <a14:hiddenLine xmlns="" xmlns:a14="http://schemas.microsoft.com/office/drawing/2010/main" w="9525">
                     <a:solidFill>
                       <a:srgbClr val="000000"/>
                     </a:solidFill>
@@ -10647,7 +10647,7 @@
               </a:ln>
               <a:extLst>
                 <a:ext uri="{91240B29-F687-4f45-9708-019B960494DF}">
-                  <a14:hiddenLine xmlns:a14="http://schemas.microsoft.com/office/drawing/2010/main" xmlns="" w="9525">
+                  <a14:hiddenLine xmlns="" xmlns:a14="http://schemas.microsoft.com/office/drawing/2010/main" w="9525">
                     <a:solidFill>
                       <a:srgbClr val="000000"/>
                     </a:solidFill>
@@ -10737,7 +10737,7 @@
               </a:ln>
               <a:extLst>
                 <a:ext uri="{91240B29-F687-4f45-9708-019B960494DF}">
-                  <a14:hiddenLine xmlns:a14="http://schemas.microsoft.com/office/drawing/2010/main" xmlns="" w="9525">
+                  <a14:hiddenLine xmlns="" xmlns:a14="http://schemas.microsoft.com/office/drawing/2010/main" w="9525">
                     <a:solidFill>
                       <a:srgbClr val="000000"/>
                     </a:solidFill>
@@ -10827,7 +10827,7 @@
               </a:ln>
               <a:extLst>
                 <a:ext uri="{91240B29-F687-4f45-9708-019B960494DF}">
-                  <a14:hiddenLine xmlns:a14="http://schemas.microsoft.com/office/drawing/2010/main" xmlns="" w="9525">
+                  <a14:hiddenLine xmlns="" xmlns:a14="http://schemas.microsoft.com/office/drawing/2010/main" w="9525">
                     <a:solidFill>
                       <a:srgbClr val="000000"/>
                     </a:solidFill>
@@ -10892,7 +10892,7 @@
               </a:ln>
               <a:extLst>
                 <a:ext uri="{91240B29-F687-4f45-9708-019B960494DF}">
-                  <a14:hiddenLine xmlns:a14="http://schemas.microsoft.com/office/drawing/2010/main" xmlns="" w="9525">
+                  <a14:hiddenLine xmlns="" xmlns:a14="http://schemas.microsoft.com/office/drawing/2010/main" w="9525">
                     <a:solidFill>
                       <a:srgbClr val="000000"/>
                     </a:solidFill>
@@ -11012,7 +11012,7 @@
               </a:ln>
               <a:extLst>
                 <a:ext uri="{91240B29-F687-4f45-9708-019B960494DF}">
-                  <a14:hiddenLine xmlns:a14="http://schemas.microsoft.com/office/drawing/2010/main" xmlns="" w="9525">
+                  <a14:hiddenLine xmlns="" xmlns:a14="http://schemas.microsoft.com/office/drawing/2010/main" w="9525">
                     <a:solidFill>
                       <a:srgbClr val="000000"/>
                     </a:solidFill>
@@ -11093,7 +11093,7 @@
               </a:ln>
               <a:extLst>
                 <a:ext uri="{91240B29-F687-4f45-9708-019B960494DF}">
-                  <a14:hiddenLine xmlns:a14="http://schemas.microsoft.com/office/drawing/2010/main" xmlns="" w="9525">
+                  <a14:hiddenLine xmlns="" xmlns:a14="http://schemas.microsoft.com/office/drawing/2010/main" w="9525">
                     <a:solidFill>
                       <a:srgbClr val="000000"/>
                     </a:solidFill>
@@ -11208,7 +11208,7 @@
               </a:ln>
               <a:extLst>
                 <a:ext uri="{91240B29-F687-4f45-9708-019B960494DF}">
-                  <a14:hiddenLine xmlns:a14="http://schemas.microsoft.com/office/drawing/2010/main" xmlns="" w="9525">
+                  <a14:hiddenLine xmlns="" xmlns:a14="http://schemas.microsoft.com/office/drawing/2010/main" w="9525">
                     <a:solidFill>
                       <a:srgbClr val="000000"/>
                     </a:solidFill>
@@ -11298,7 +11298,7 @@
               </a:ln>
               <a:extLst>
                 <a:ext uri="{91240B29-F687-4f45-9708-019B960494DF}">
-                  <a14:hiddenLine xmlns:a14="http://schemas.microsoft.com/office/drawing/2010/main" xmlns="" w="9525">
+                  <a14:hiddenLine xmlns="" xmlns:a14="http://schemas.microsoft.com/office/drawing/2010/main" w="9525">
                     <a:solidFill>
                       <a:srgbClr val="000000"/>
                     </a:solidFill>
@@ -11363,7 +11363,7 @@
               </a:ln>
               <a:extLst>
                 <a:ext uri="{91240B29-F687-4f45-9708-019B960494DF}">
-                  <a14:hiddenLine xmlns:a14="http://schemas.microsoft.com/office/drawing/2010/main" xmlns="" w="9525">
+                  <a14:hiddenLine xmlns="" xmlns:a14="http://schemas.microsoft.com/office/drawing/2010/main" w="9525">
                     <a:solidFill>
                       <a:srgbClr val="000000"/>
                     </a:solidFill>
@@ -11453,7 +11453,7 @@
               </a:ln>
               <a:extLst>
                 <a:ext uri="{91240B29-F687-4f45-9708-019B960494DF}">
-                  <a14:hiddenLine xmlns:a14="http://schemas.microsoft.com/office/drawing/2010/main" xmlns="" w="9525">
+                  <a14:hiddenLine xmlns="" xmlns:a14="http://schemas.microsoft.com/office/drawing/2010/main" w="9525">
                     <a:solidFill>
                       <a:srgbClr val="000000"/>
                     </a:solidFill>
@@ -11521,7 +11521,7 @@
               </a:ln>
               <a:extLst>
                 <a:ext uri="{91240B29-F687-4f45-9708-019B960494DF}">
-                  <a14:hiddenLine xmlns:a14="http://schemas.microsoft.com/office/drawing/2010/main" xmlns="" w="9525">
+                  <a14:hiddenLine xmlns="" xmlns:a14="http://schemas.microsoft.com/office/drawing/2010/main" w="9525">
                     <a:solidFill>
                       <a:srgbClr val="000000"/>
                     </a:solidFill>
@@ -11611,7 +11611,7 @@
               </a:ln>
               <a:extLst>
                 <a:ext uri="{91240B29-F687-4f45-9708-019B960494DF}">
-                  <a14:hiddenLine xmlns:a14="http://schemas.microsoft.com/office/drawing/2010/main" xmlns="" w="9525">
+                  <a14:hiddenLine xmlns="" xmlns:a14="http://schemas.microsoft.com/office/drawing/2010/main" w="9525">
                     <a:solidFill>
                       <a:srgbClr val="000000"/>
                     </a:solidFill>
@@ -11679,7 +11679,7 @@
               </a:ln>
               <a:extLst>
                 <a:ext uri="{91240B29-F687-4f45-9708-019B960494DF}">
-                  <a14:hiddenLine xmlns:a14="http://schemas.microsoft.com/office/drawing/2010/main" xmlns="" w="9525">
+                  <a14:hiddenLine xmlns="" xmlns:a14="http://schemas.microsoft.com/office/drawing/2010/main" w="9525">
                     <a:solidFill>
                       <a:srgbClr val="000000"/>
                     </a:solidFill>
@@ -11769,7 +11769,7 @@
               </a:ln>
               <a:extLst>
                 <a:ext uri="{91240B29-F687-4f45-9708-019B960494DF}">
-                  <a14:hiddenLine xmlns:a14="http://schemas.microsoft.com/office/drawing/2010/main" xmlns="" w="9525">
+                  <a14:hiddenLine xmlns="" xmlns:a14="http://schemas.microsoft.com/office/drawing/2010/main" w="9525">
                     <a:solidFill>
                       <a:srgbClr val="000000"/>
                     </a:solidFill>
@@ -11803,7 +11803,7 @@
               </a:ln>
               <a:extLst>
                 <a:ext uri="{91240B29-F687-4f45-9708-019B960494DF}">
-                  <a14:hiddenLine xmlns:a14="http://schemas.microsoft.com/office/drawing/2010/main" xmlns="" w="9525">
+                  <a14:hiddenLine xmlns="" xmlns:a14="http://schemas.microsoft.com/office/drawing/2010/main" w="9525">
                     <a:solidFill>
                       <a:srgbClr val="000000"/>
                     </a:solidFill>
@@ -11944,7 +11944,7 @@
             <a:fld id="{48A87A34-81AB-432B-8DAE-1953F412C126}" type="datetimeFigureOut">
               <a:rPr lang="en-US" dirty="0"/>
               <a:pPr/>
-              <a:t>11/28/2016</a:t>
+              <a:t>11/29/2016</a:t>
             </a:fld>
             <a:endParaRPr lang="en-US" dirty="0"/>
           </a:p>
@@ -12452,13 +12452,6 @@
   <p:clrMapOvr>
     <a:masterClrMapping/>
   </p:clrMapOvr>
-  <p:timing>
-    <p:tnLst>
-      <p:par>
-        <p:cTn id="1" dur="indefinite" restart="never" nodeType="tmRoot"/>
-      </p:par>
-    </p:tnLst>
-  </p:timing>
 </p:sld>
 </file>
 
@@ -12591,13 +12584,6 @@
   <p:clrMapOvr>
     <a:masterClrMapping/>
   </p:clrMapOvr>
-  <p:timing>
-    <p:tnLst>
-      <p:par>
-        <p:cTn id="1" dur="indefinite" restart="never" nodeType="tmRoot"/>
-      </p:par>
-    </p:tnLst>
-  </p:timing>
 </p:sld>
 </file>
 
@@ -12694,13 +12680,6 @@
   <p:clrMapOvr>
     <a:masterClrMapping/>
   </p:clrMapOvr>
-  <p:timing>
-    <p:tnLst>
-      <p:par>
-        <p:cTn id="1" dur="indefinite" restart="never" nodeType="tmRoot"/>
-      </p:par>
-    </p:tnLst>
-  </p:timing>
 </p:sld>
 </file>
 
@@ -12849,13 +12828,6 @@
   <p:clrMapOvr>
     <a:masterClrMapping/>
   </p:clrMapOvr>
-  <p:timing>
-    <p:tnLst>
-      <p:par>
-        <p:cTn id="1" dur="indefinite" restart="never" nodeType="tmRoot"/>
-      </p:par>
-    </p:tnLst>
-  </p:timing>
 </p:sld>
 </file>
 
@@ -12886,32 +12858,406 @@
             <p:ph type="title"/>
           </p:nvPr>
         </p:nvSpPr>
-        <p:spPr>
-          <a:xfrm>
-            <a:off x="3788384" y="52459"/>
-            <a:ext cx="4979469" cy="1478570"/>
-          </a:xfrm>
-        </p:spPr>
+        <p:spPr/>
         <p:txBody>
           <a:bodyPr/>
           <a:lstStyle/>
           <a:p>
+            <a:pPr algn="ctr"/>
             <a:r>
               <a:rPr lang="en-US" dirty="0"/>
-              <a:t>Mercury architecture</a:t>
+              <a:t>Mercury components</a:t>
             </a:r>
           </a:p>
         </p:txBody>
       </p:sp>
+      <p:sp>
+        <p:nvSpPr>
+          <p:cNvPr id="4" name="Rectangle: Diagonal Corners Rounded 3"/>
+          <p:cNvSpPr/>
+          <p:nvPr/>
+        </p:nvSpPr>
+        <p:spPr>
+          <a:xfrm>
+            <a:off x="2952732" y="1824446"/>
+            <a:ext cx="1535185" cy="914400"/>
+          </a:xfrm>
+          <a:prstGeom prst="round2DiagRect">
+            <a:avLst/>
+          </a:prstGeom>
+        </p:spPr>
+        <p:style>
+          <a:lnRef idx="2">
+            <a:schemeClr val="accent1">
+              <a:shade val="50000"/>
+            </a:schemeClr>
+          </a:lnRef>
+          <a:fillRef idx="1">
+            <a:schemeClr val="accent1"/>
+          </a:fillRef>
+          <a:effectRef idx="0">
+            <a:schemeClr val="accent1"/>
+          </a:effectRef>
+          <a:fontRef idx="minor">
+            <a:schemeClr val="lt1"/>
+          </a:fontRef>
+        </p:style>
+        <p:txBody>
+          <a:bodyPr rtlCol="0" anchor="ctr"/>
+          <a:lstStyle/>
+          <a:p>
+            <a:pPr algn="ctr"/>
+            <a:r>
+              <a:rPr lang="en-US" dirty="0"/>
+              <a:t>Broker</a:t>
+            </a:r>
+          </a:p>
+        </p:txBody>
+      </p:sp>
+      <p:sp>
+        <p:nvSpPr>
+          <p:cNvPr id="5" name="Cylinder 4"/>
+          <p:cNvSpPr/>
+          <p:nvPr/>
+        </p:nvSpPr>
+        <p:spPr>
+          <a:xfrm rot="5400000">
+            <a:off x="5909851" y="1260287"/>
+            <a:ext cx="369115" cy="2042718"/>
+          </a:xfrm>
+          <a:prstGeom prst="can">
+            <a:avLst/>
+          </a:prstGeom>
+        </p:spPr>
+        <p:style>
+          <a:lnRef idx="2">
+            <a:schemeClr val="accent2">
+              <a:shade val="50000"/>
+            </a:schemeClr>
+          </a:lnRef>
+          <a:fillRef idx="1">
+            <a:schemeClr val="accent2"/>
+          </a:fillRef>
+          <a:effectRef idx="0">
+            <a:schemeClr val="accent2"/>
+          </a:effectRef>
+          <a:fontRef idx="minor">
+            <a:schemeClr val="lt1"/>
+          </a:fontRef>
+        </p:style>
+        <p:txBody>
+          <a:bodyPr vert="vert270" rtlCol="0" anchor="ctr"/>
+          <a:lstStyle/>
+          <a:p>
+            <a:pPr algn="ctr"/>
+            <a:r>
+              <a:rPr lang="en-US" dirty="0" err="1"/>
+              <a:t>PubSub</a:t>
+            </a:r>
+            <a:endParaRPr lang="en-US" dirty="0"/>
+          </a:p>
+        </p:txBody>
+      </p:sp>
+      <p:sp>
+        <p:nvSpPr>
+          <p:cNvPr id="6" name="Rectangle: Rounded Corners 5"/>
+          <p:cNvSpPr/>
+          <p:nvPr/>
+        </p:nvSpPr>
+        <p:spPr>
+          <a:xfrm>
+            <a:off x="5326815" y="3013596"/>
+            <a:ext cx="1535185" cy="931178"/>
+          </a:xfrm>
+          <a:prstGeom prst="roundRect">
+            <a:avLst/>
+          </a:prstGeom>
+        </p:spPr>
+        <p:style>
+          <a:lnRef idx="2">
+            <a:schemeClr val="accent3">
+              <a:shade val="50000"/>
+            </a:schemeClr>
+          </a:lnRef>
+          <a:fillRef idx="1">
+            <a:schemeClr val="accent3"/>
+          </a:fillRef>
+          <a:effectRef idx="0">
+            <a:schemeClr val="accent3"/>
+          </a:effectRef>
+          <a:fontRef idx="minor">
+            <a:schemeClr val="lt1"/>
+          </a:fontRef>
+        </p:style>
+        <p:txBody>
+          <a:bodyPr rtlCol="0" anchor="ctr"/>
+          <a:lstStyle/>
+          <a:p>
+            <a:pPr algn="ctr"/>
+            <a:r>
+              <a:rPr lang="en-US" dirty="0"/>
+              <a:t>Adapter</a:t>
+            </a:r>
+          </a:p>
+        </p:txBody>
+      </p:sp>
+      <p:cxnSp>
+        <p:nvCxnSpPr>
+          <p:cNvPr id="10" name="Connector: Elbow 9"/>
+          <p:cNvCxnSpPr>
+            <a:stCxn id="5" idx="3"/>
+            <a:endCxn id="4" idx="0"/>
+          </p:cNvCxnSpPr>
+          <p:nvPr/>
+        </p:nvCxnSpPr>
+        <p:spPr>
+          <a:xfrm rot="10800000">
+            <a:off x="4487918" y="2281647"/>
+            <a:ext cx="585133" cy="1"/>
+          </a:xfrm>
+          <a:prstGeom prst="bentConnector3">
+            <a:avLst/>
+          </a:prstGeom>
+          <a:ln>
+            <a:solidFill>
+              <a:schemeClr val="tx1"/>
+            </a:solidFill>
+            <a:headEnd type="triangle"/>
+            <a:tailEnd type="triangle"/>
+          </a:ln>
+        </p:spPr>
+        <p:style>
+          <a:lnRef idx="1">
+            <a:schemeClr val="accent1"/>
+          </a:lnRef>
+          <a:fillRef idx="0">
+            <a:schemeClr val="accent1"/>
+          </a:fillRef>
+          <a:effectRef idx="0">
+            <a:schemeClr val="accent1"/>
+          </a:effectRef>
+          <a:fontRef idx="minor">
+            <a:schemeClr val="tx1"/>
+          </a:fontRef>
+        </p:style>
+      </p:cxnSp>
+      <p:cxnSp>
+        <p:nvCxnSpPr>
+          <p:cNvPr id="20" name="Straight Arrow Connector 19"/>
+          <p:cNvCxnSpPr>
+            <a:stCxn id="5" idx="4"/>
+            <a:endCxn id="6" idx="0"/>
+          </p:cNvCxnSpPr>
+          <p:nvPr/>
+        </p:nvCxnSpPr>
+        <p:spPr>
+          <a:xfrm flipH="1">
+            <a:off x="6094408" y="2466204"/>
+            <a:ext cx="1" cy="547392"/>
+          </a:xfrm>
+          <a:prstGeom prst="straightConnector1">
+            <a:avLst/>
+          </a:prstGeom>
+          <a:ln>
+            <a:solidFill>
+              <a:schemeClr val="tx1"/>
+            </a:solidFill>
+            <a:headEnd type="triangle"/>
+            <a:tailEnd type="triangle"/>
+          </a:ln>
+        </p:spPr>
+        <p:style>
+          <a:lnRef idx="1">
+            <a:schemeClr val="accent1"/>
+          </a:lnRef>
+          <a:fillRef idx="0">
+            <a:schemeClr val="accent1"/>
+          </a:fillRef>
+          <a:effectRef idx="0">
+            <a:schemeClr val="accent1"/>
+          </a:effectRef>
+          <a:fontRef idx="minor">
+            <a:schemeClr val="tx1"/>
+          </a:fontRef>
+        </p:style>
+      </p:cxnSp>
+      <p:sp>
+        <p:nvSpPr>
+          <p:cNvPr id="21" name="Rectangle 20"/>
+          <p:cNvSpPr/>
+          <p:nvPr/>
+        </p:nvSpPr>
+        <p:spPr>
+          <a:xfrm>
+            <a:off x="7700899" y="1824446"/>
+            <a:ext cx="1535185" cy="914400"/>
+          </a:xfrm>
+          <a:prstGeom prst="rect">
+            <a:avLst/>
+          </a:prstGeom>
+          <a:solidFill>
+            <a:schemeClr val="tx2">
+              <a:lumMod val="60000"/>
+              <a:lumOff val="40000"/>
+            </a:schemeClr>
+          </a:solidFill>
+        </p:spPr>
+        <p:style>
+          <a:lnRef idx="2">
+            <a:schemeClr val="accent1">
+              <a:shade val="50000"/>
+            </a:schemeClr>
+          </a:lnRef>
+          <a:fillRef idx="1">
+            <a:schemeClr val="accent1"/>
+          </a:fillRef>
+          <a:effectRef idx="0">
+            <a:schemeClr val="accent1"/>
+          </a:effectRef>
+          <a:fontRef idx="minor">
+            <a:schemeClr val="lt1"/>
+          </a:fontRef>
+        </p:style>
+        <p:txBody>
+          <a:bodyPr rtlCol="0" anchor="ctr"/>
+          <a:lstStyle/>
+          <a:p>
+            <a:pPr algn="ctr"/>
+            <a:r>
+              <a:rPr lang="en-US" dirty="0"/>
+              <a:t>Service Endpoint</a:t>
+            </a:r>
+          </a:p>
+        </p:txBody>
+      </p:sp>
+      <p:cxnSp>
+        <p:nvCxnSpPr>
+          <p:cNvPr id="23" name="Straight Arrow Connector 22"/>
+          <p:cNvCxnSpPr>
+            <a:stCxn id="5" idx="1"/>
+            <a:endCxn id="21" idx="1"/>
+          </p:cNvCxnSpPr>
+          <p:nvPr/>
+        </p:nvCxnSpPr>
+        <p:spPr>
+          <a:xfrm flipV="1">
+            <a:off x="7115768" y="2281646"/>
+            <a:ext cx="585131" cy="1"/>
+          </a:xfrm>
+          <a:prstGeom prst="straightConnector1">
+            <a:avLst/>
+          </a:prstGeom>
+          <a:ln>
+            <a:solidFill>
+              <a:schemeClr val="tx1"/>
+            </a:solidFill>
+            <a:headEnd type="triangle"/>
+            <a:tailEnd type="triangle"/>
+          </a:ln>
+        </p:spPr>
+        <p:style>
+          <a:lnRef idx="1">
+            <a:schemeClr val="accent1"/>
+          </a:lnRef>
+          <a:fillRef idx="0">
+            <a:schemeClr val="accent1"/>
+          </a:fillRef>
+          <a:effectRef idx="0">
+            <a:schemeClr val="accent1"/>
+          </a:effectRef>
+          <a:fontRef idx="minor">
+            <a:schemeClr val="tx1"/>
+          </a:fontRef>
+        </p:style>
+      </p:cxnSp>
+      <p:sp>
+        <p:nvSpPr>
+          <p:cNvPr id="24" name="Cloud 23"/>
+          <p:cNvSpPr/>
+          <p:nvPr/>
+        </p:nvSpPr>
+        <p:spPr>
+          <a:xfrm>
+            <a:off x="5053648" y="4370664"/>
+            <a:ext cx="2081518" cy="1191237"/>
+          </a:xfrm>
+          <a:prstGeom prst="cloud">
+            <a:avLst/>
+          </a:prstGeom>
+        </p:spPr>
+        <p:style>
+          <a:lnRef idx="2">
+            <a:schemeClr val="dk1"/>
+          </a:lnRef>
+          <a:fillRef idx="1">
+            <a:schemeClr val="lt1"/>
+          </a:fillRef>
+          <a:effectRef idx="0">
+            <a:schemeClr val="dk1"/>
+          </a:effectRef>
+          <a:fontRef idx="minor">
+            <a:schemeClr val="dk1"/>
+          </a:fontRef>
+        </p:style>
+        <p:txBody>
+          <a:bodyPr rtlCol="0" anchor="ctr"/>
+          <a:lstStyle/>
+          <a:p>
+            <a:pPr algn="ctr"/>
+            <a:r>
+              <a:rPr lang="en-US" dirty="0"/>
+              <a:t>Mobile Core</a:t>
+            </a:r>
+          </a:p>
+        </p:txBody>
+      </p:sp>
+      <p:cxnSp>
+        <p:nvCxnSpPr>
+          <p:cNvPr id="26" name="Straight Arrow Connector 25"/>
+          <p:cNvCxnSpPr>
+            <a:stCxn id="6" idx="2"/>
+            <a:endCxn id="24" idx="3"/>
+          </p:cNvCxnSpPr>
+          <p:nvPr/>
+        </p:nvCxnSpPr>
+        <p:spPr>
+          <a:xfrm flipH="1">
+            <a:off x="6094407" y="3944774"/>
+            <a:ext cx="1" cy="494000"/>
+          </a:xfrm>
+          <a:prstGeom prst="straightConnector1">
+            <a:avLst/>
+          </a:prstGeom>
+          <a:ln>
+            <a:solidFill>
+              <a:schemeClr val="tx1"/>
+            </a:solidFill>
+            <a:headEnd type="triangle"/>
+            <a:tailEnd type="triangle"/>
+          </a:ln>
+        </p:spPr>
+        <p:style>
+          <a:lnRef idx="1">
+            <a:schemeClr val="accent1"/>
+          </a:lnRef>
+          <a:fillRef idx="0">
+            <a:schemeClr val="accent1"/>
+          </a:fillRef>
+          <a:effectRef idx="0">
+            <a:schemeClr val="accent1"/>
+          </a:effectRef>
+          <a:fontRef idx="minor">
+            <a:schemeClr val="tx1"/>
+          </a:fontRef>
+        </p:style>
+      </p:cxnSp>
       <p:pic>
         <p:nvPicPr>
-          <p:cNvPr id="4" name="Content Placeholder 3"/>
+          <p:cNvPr id="31" name="Picture 30" descr="Cell-Tower.png"/>
           <p:cNvPicPr>
-            <a:picLocks noGrp="1" noChangeAspect="1"/>
+            <a:picLocks noChangeAspect="1"/>
           </p:cNvPicPr>
-          <p:nvPr>
-            <p:ph idx="1"/>
-          </p:nvPr>
+          <p:nvPr/>
         </p:nvPicPr>
         <p:blipFill>
           <a:blip r:embed="rId2"/>
@@ -12921,28 +13267,914 @@
         </p:blipFill>
         <p:spPr>
           <a:xfrm>
-            <a:off x="2743201" y="1381739"/>
-            <a:ext cx="7069834" cy="5150009"/>
+            <a:off x="7700899" y="4191774"/>
+            <a:ext cx="914402" cy="1368555"/>
           </a:xfrm>
+          <a:prstGeom prst="rect">
+            <a:avLst/>
+          </a:prstGeom>
         </p:spPr>
       </p:pic>
+      <p:pic>
+        <p:nvPicPr>
+          <p:cNvPr id="33" name="Picture 32" descr="Cell-Tower.png"/>
+          <p:cNvPicPr>
+            <a:picLocks noChangeAspect="1"/>
+          </p:cNvPicPr>
+          <p:nvPr/>
+        </p:nvPicPr>
+        <p:blipFill>
+          <a:blip r:embed="rId2"/>
+          <a:stretch>
+            <a:fillRect/>
+          </a:stretch>
+        </p:blipFill>
+        <p:spPr>
+          <a:xfrm>
+            <a:off x="3573513" y="4191774"/>
+            <a:ext cx="914402" cy="1368555"/>
+          </a:xfrm>
+          <a:prstGeom prst="rect">
+            <a:avLst/>
+          </a:prstGeom>
+        </p:spPr>
+      </p:pic>
+      <p:cxnSp>
+        <p:nvCxnSpPr>
+          <p:cNvPr id="35" name="Straight Arrow Connector 34"/>
+          <p:cNvCxnSpPr>
+            <a:stCxn id="24" idx="0"/>
+          </p:cNvCxnSpPr>
+          <p:nvPr/>
+        </p:nvCxnSpPr>
+        <p:spPr>
+          <a:xfrm>
+            <a:off x="7133431" y="4966283"/>
+            <a:ext cx="634775" cy="511728"/>
+          </a:xfrm>
+          <a:prstGeom prst="straightConnector1">
+            <a:avLst/>
+          </a:prstGeom>
+          <a:ln>
+            <a:solidFill>
+              <a:schemeClr val="tx1"/>
+            </a:solidFill>
+            <a:headEnd type="triangle"/>
+            <a:tailEnd type="triangle"/>
+          </a:ln>
+        </p:spPr>
+        <p:style>
+          <a:lnRef idx="1">
+            <a:schemeClr val="accent1"/>
+          </a:lnRef>
+          <a:fillRef idx="0">
+            <a:schemeClr val="accent1"/>
+          </a:fillRef>
+          <a:effectRef idx="0">
+            <a:schemeClr val="accent1"/>
+          </a:effectRef>
+          <a:fontRef idx="minor">
+            <a:schemeClr val="tx1"/>
+          </a:fontRef>
+        </p:style>
+      </p:cxnSp>
+      <p:cxnSp>
+        <p:nvCxnSpPr>
+          <p:cNvPr id="37" name="Straight Arrow Connector 36"/>
+          <p:cNvCxnSpPr>
+            <a:stCxn id="24" idx="2"/>
+          </p:cNvCxnSpPr>
+          <p:nvPr/>
+        </p:nvCxnSpPr>
+        <p:spPr>
+          <a:xfrm flipH="1">
+            <a:off x="4412609" y="4966283"/>
+            <a:ext cx="647496" cy="511728"/>
+          </a:xfrm>
+          <a:prstGeom prst="straightConnector1">
+            <a:avLst/>
+          </a:prstGeom>
+          <a:ln>
+            <a:solidFill>
+              <a:schemeClr val="tx1"/>
+            </a:solidFill>
+            <a:headEnd type="triangle"/>
+            <a:tailEnd type="triangle"/>
+          </a:ln>
+        </p:spPr>
+        <p:style>
+          <a:lnRef idx="1">
+            <a:schemeClr val="accent1"/>
+          </a:lnRef>
+          <a:fillRef idx="0">
+            <a:schemeClr val="accent1"/>
+          </a:fillRef>
+          <a:effectRef idx="0">
+            <a:schemeClr val="accent1"/>
+          </a:effectRef>
+          <a:fontRef idx="minor">
+            <a:schemeClr val="tx1"/>
+          </a:fontRef>
+        </p:style>
+      </p:cxnSp>
+      <p:sp>
+        <p:nvSpPr>
+          <p:cNvPr id="38" name="TextBox 37"/>
+          <p:cNvSpPr txBox="1"/>
+          <p:nvPr/>
+        </p:nvSpPr>
+        <p:spPr>
+          <a:xfrm>
+            <a:off x="3396694" y="5560329"/>
+            <a:ext cx="1268039" cy="369332"/>
+          </a:xfrm>
+          <a:prstGeom prst="rect">
+            <a:avLst/>
+          </a:prstGeom>
+          <a:noFill/>
+        </p:spPr>
+        <p:txBody>
+          <a:bodyPr wrap="none" rtlCol="0">
+            <a:spAutoFit/>
+          </a:bodyPr>
+          <a:lstStyle/>
+          <a:p>
+            <a:r>
+              <a:rPr lang="en-US" dirty="0"/>
+              <a:t>Access Point</a:t>
+            </a:r>
+          </a:p>
+        </p:txBody>
+      </p:sp>
+      <p:sp>
+        <p:nvSpPr>
+          <p:cNvPr id="39" name="TextBox 38"/>
+          <p:cNvSpPr txBox="1"/>
+          <p:nvPr/>
+        </p:nvSpPr>
+        <p:spPr>
+          <a:xfrm>
+            <a:off x="7524080" y="5560329"/>
+            <a:ext cx="1268039" cy="369332"/>
+          </a:xfrm>
+          <a:prstGeom prst="rect">
+            <a:avLst/>
+          </a:prstGeom>
+          <a:noFill/>
+        </p:spPr>
+        <p:txBody>
+          <a:bodyPr wrap="none" rtlCol="0">
+            <a:spAutoFit/>
+          </a:bodyPr>
+          <a:lstStyle/>
+          <a:p>
+            <a:r>
+              <a:rPr lang="en-US" dirty="0"/>
+              <a:t>Access Point</a:t>
+            </a:r>
+          </a:p>
+        </p:txBody>
+      </p:sp>
+      <p:pic>
+        <p:nvPicPr>
+          <p:cNvPr id="40" name="Picture 39" descr="Simple Cellphone Clipart by anubisza on DeviantArt"/>
+          <p:cNvPicPr>
+            <a:picLocks noChangeAspect="1"/>
+          </p:cNvPicPr>
+          <p:nvPr/>
+        </p:nvPicPr>
+        <p:blipFill>
+          <a:blip r:embed="rId3"/>
+          <a:stretch>
+            <a:fillRect/>
+          </a:stretch>
+        </p:blipFill>
+        <p:spPr>
+          <a:xfrm>
+            <a:off x="9369466" y="4191774"/>
+            <a:ext cx="554200" cy="650191"/>
+          </a:xfrm>
+          <a:prstGeom prst="rect">
+            <a:avLst/>
+          </a:prstGeom>
+        </p:spPr>
+      </p:pic>
+      <p:pic>
+        <p:nvPicPr>
+          <p:cNvPr id="41" name="Picture 40" descr="Simple Cellphone Clipart by anubisza on DeviantArt"/>
+          <p:cNvPicPr>
+            <a:picLocks noChangeAspect="1"/>
+          </p:cNvPicPr>
+          <p:nvPr/>
+        </p:nvPicPr>
+        <p:blipFill>
+          <a:blip r:embed="rId3"/>
+          <a:stretch>
+            <a:fillRect/>
+          </a:stretch>
+        </p:blipFill>
+        <p:spPr>
+          <a:xfrm>
+            <a:off x="9369466" y="4910138"/>
+            <a:ext cx="554200" cy="650191"/>
+          </a:xfrm>
+          <a:prstGeom prst="rect">
+            <a:avLst/>
+          </a:prstGeom>
+        </p:spPr>
+      </p:pic>
+      <p:pic>
+        <p:nvPicPr>
+          <p:cNvPr id="42" name="Picture 41" descr="Simple Cellphone Clipart by anubisza on DeviantArt"/>
+          <p:cNvPicPr>
+            <a:picLocks noChangeAspect="1"/>
+          </p:cNvPicPr>
+          <p:nvPr/>
+        </p:nvPicPr>
+        <p:blipFill>
+          <a:blip r:embed="rId3"/>
+          <a:stretch>
+            <a:fillRect/>
+          </a:stretch>
+        </p:blipFill>
+        <p:spPr>
+          <a:xfrm flipH="1">
+            <a:off x="2398532" y="4191774"/>
+            <a:ext cx="554200" cy="650191"/>
+          </a:xfrm>
+          <a:prstGeom prst="rect">
+            <a:avLst/>
+          </a:prstGeom>
+        </p:spPr>
+      </p:pic>
+      <p:pic>
+        <p:nvPicPr>
+          <p:cNvPr id="43" name="Picture 42" descr="Simple Cellphone Clipart by anubisza on DeviantArt"/>
+          <p:cNvPicPr>
+            <a:picLocks noChangeAspect="1"/>
+          </p:cNvPicPr>
+          <p:nvPr/>
+        </p:nvPicPr>
+        <p:blipFill>
+          <a:blip r:embed="rId3"/>
+          <a:stretch>
+            <a:fillRect/>
+          </a:stretch>
+        </p:blipFill>
+        <p:spPr>
+          <a:xfrm flipH="1">
+            <a:off x="2398532" y="4914333"/>
+            <a:ext cx="554200" cy="650191"/>
+          </a:xfrm>
+          <a:prstGeom prst="rect">
+            <a:avLst/>
+          </a:prstGeom>
+        </p:spPr>
+      </p:pic>
+      <p:grpSp>
+        <p:nvGrpSpPr>
+          <p:cNvPr id="48" name="Group 47"/>
+          <p:cNvGrpSpPr/>
+          <p:nvPr/>
+        </p:nvGrpSpPr>
+        <p:grpSpPr>
+          <a:xfrm rot="2277131">
+            <a:off x="2316490" y="3897446"/>
+            <a:ext cx="887924" cy="1023458"/>
+            <a:chOff x="2508770" y="3598877"/>
+            <a:chExt cx="887924" cy="1023458"/>
+          </a:xfrm>
+        </p:grpSpPr>
+        <p:sp>
+          <p:nvSpPr>
+            <p:cNvPr id="44" name="Arc 43"/>
+            <p:cNvSpPr/>
+            <p:nvPr/>
+          </p:nvSpPr>
+          <p:spPr>
+            <a:xfrm>
+              <a:off x="2508770" y="3598877"/>
+              <a:ext cx="887924" cy="1023458"/>
+            </a:xfrm>
+            <a:prstGeom prst="arc">
+              <a:avLst/>
+            </a:prstGeom>
+            <a:ln>
+              <a:solidFill>
+                <a:schemeClr val="tx1"/>
+              </a:solidFill>
+            </a:ln>
+          </p:spPr>
+          <p:style>
+            <a:lnRef idx="1">
+              <a:schemeClr val="accent1"/>
+            </a:lnRef>
+            <a:fillRef idx="0">
+              <a:schemeClr val="accent1"/>
+            </a:fillRef>
+            <a:effectRef idx="0">
+              <a:schemeClr val="accent1"/>
+            </a:effectRef>
+            <a:fontRef idx="minor">
+              <a:schemeClr val="tx1"/>
+            </a:fontRef>
+          </p:style>
+          <p:txBody>
+            <a:bodyPr rtlCol="0" anchor="ctr"/>
+            <a:lstStyle/>
+            <a:p>
+              <a:pPr algn="ctr"/>
+              <a:endParaRPr lang="en-US"/>
+            </a:p>
+          </p:txBody>
+        </p:sp>
+        <p:sp>
+          <p:nvSpPr>
+            <p:cNvPr id="46" name="Arc 45"/>
+            <p:cNvSpPr/>
+            <p:nvPr/>
+          </p:nvSpPr>
+          <p:spPr>
+            <a:xfrm>
+              <a:off x="2650921" y="3708692"/>
+              <a:ext cx="643206" cy="730082"/>
+            </a:xfrm>
+            <a:prstGeom prst="arc">
+              <a:avLst/>
+            </a:prstGeom>
+            <a:ln>
+              <a:solidFill>
+                <a:schemeClr val="tx1"/>
+              </a:solidFill>
+            </a:ln>
+          </p:spPr>
+          <p:style>
+            <a:lnRef idx="1">
+              <a:schemeClr val="accent1"/>
+            </a:lnRef>
+            <a:fillRef idx="0">
+              <a:schemeClr val="accent1"/>
+            </a:fillRef>
+            <a:effectRef idx="0">
+              <a:schemeClr val="accent1"/>
+            </a:effectRef>
+            <a:fontRef idx="minor">
+              <a:schemeClr val="tx1"/>
+            </a:fontRef>
+          </p:style>
+          <p:txBody>
+            <a:bodyPr rtlCol="0" anchor="ctr"/>
+            <a:lstStyle/>
+            <a:p>
+              <a:pPr algn="ctr"/>
+              <a:endParaRPr lang="en-US"/>
+            </a:p>
+          </p:txBody>
+        </p:sp>
+        <p:sp>
+          <p:nvSpPr>
+            <p:cNvPr id="47" name="Arc 46"/>
+            <p:cNvSpPr/>
+            <p:nvPr/>
+          </p:nvSpPr>
+          <p:spPr>
+            <a:xfrm>
+              <a:off x="2819347" y="3812648"/>
+              <a:ext cx="377393" cy="427987"/>
+            </a:xfrm>
+            <a:prstGeom prst="arc">
+              <a:avLst/>
+            </a:prstGeom>
+            <a:ln>
+              <a:solidFill>
+                <a:schemeClr val="tx1"/>
+              </a:solidFill>
+            </a:ln>
+          </p:spPr>
+          <p:style>
+            <a:lnRef idx="1">
+              <a:schemeClr val="accent1"/>
+            </a:lnRef>
+            <a:fillRef idx="0">
+              <a:schemeClr val="accent1"/>
+            </a:fillRef>
+            <a:effectRef idx="0">
+              <a:schemeClr val="accent1"/>
+            </a:effectRef>
+            <a:fontRef idx="minor">
+              <a:schemeClr val="tx1"/>
+            </a:fontRef>
+          </p:style>
+          <p:txBody>
+            <a:bodyPr rtlCol="0" anchor="ctr"/>
+            <a:lstStyle/>
+            <a:p>
+              <a:pPr algn="ctr"/>
+              <a:endParaRPr lang="en-US"/>
+            </a:p>
+          </p:txBody>
+        </p:sp>
+      </p:grpSp>
+      <p:grpSp>
+        <p:nvGrpSpPr>
+          <p:cNvPr id="49" name="Group 48"/>
+          <p:cNvGrpSpPr/>
+          <p:nvPr/>
+        </p:nvGrpSpPr>
+        <p:grpSpPr>
+          <a:xfrm rot="12782066">
+            <a:off x="9038771" y="3730721"/>
+            <a:ext cx="887924" cy="1023458"/>
+            <a:chOff x="2508770" y="3598877"/>
+            <a:chExt cx="887924" cy="1023458"/>
+          </a:xfrm>
+        </p:grpSpPr>
+        <p:sp>
+          <p:nvSpPr>
+            <p:cNvPr id="50" name="Arc 49"/>
+            <p:cNvSpPr/>
+            <p:nvPr/>
+          </p:nvSpPr>
+          <p:spPr>
+            <a:xfrm>
+              <a:off x="2508770" y="3598877"/>
+              <a:ext cx="887924" cy="1023458"/>
+            </a:xfrm>
+            <a:prstGeom prst="arc">
+              <a:avLst/>
+            </a:prstGeom>
+            <a:ln>
+              <a:solidFill>
+                <a:schemeClr val="tx1"/>
+              </a:solidFill>
+            </a:ln>
+          </p:spPr>
+          <p:style>
+            <a:lnRef idx="1">
+              <a:schemeClr val="accent1"/>
+            </a:lnRef>
+            <a:fillRef idx="0">
+              <a:schemeClr val="accent1"/>
+            </a:fillRef>
+            <a:effectRef idx="0">
+              <a:schemeClr val="accent1"/>
+            </a:effectRef>
+            <a:fontRef idx="minor">
+              <a:schemeClr val="tx1"/>
+            </a:fontRef>
+          </p:style>
+          <p:txBody>
+            <a:bodyPr rtlCol="0" anchor="ctr"/>
+            <a:lstStyle/>
+            <a:p>
+              <a:pPr algn="ctr"/>
+              <a:endParaRPr lang="en-US"/>
+            </a:p>
+          </p:txBody>
+        </p:sp>
+        <p:sp>
+          <p:nvSpPr>
+            <p:cNvPr id="51" name="Arc 50"/>
+            <p:cNvSpPr/>
+            <p:nvPr/>
+          </p:nvSpPr>
+          <p:spPr>
+            <a:xfrm>
+              <a:off x="2650921" y="3708692"/>
+              <a:ext cx="643206" cy="730082"/>
+            </a:xfrm>
+            <a:prstGeom prst="arc">
+              <a:avLst/>
+            </a:prstGeom>
+            <a:ln>
+              <a:solidFill>
+                <a:schemeClr val="tx1"/>
+              </a:solidFill>
+            </a:ln>
+          </p:spPr>
+          <p:style>
+            <a:lnRef idx="1">
+              <a:schemeClr val="accent1"/>
+            </a:lnRef>
+            <a:fillRef idx="0">
+              <a:schemeClr val="accent1"/>
+            </a:fillRef>
+            <a:effectRef idx="0">
+              <a:schemeClr val="accent1"/>
+            </a:effectRef>
+            <a:fontRef idx="minor">
+              <a:schemeClr val="tx1"/>
+            </a:fontRef>
+          </p:style>
+          <p:txBody>
+            <a:bodyPr rtlCol="0" anchor="ctr"/>
+            <a:lstStyle/>
+            <a:p>
+              <a:pPr algn="ctr"/>
+              <a:endParaRPr lang="en-US"/>
+            </a:p>
+          </p:txBody>
+        </p:sp>
+        <p:sp>
+          <p:nvSpPr>
+            <p:cNvPr id="52" name="Arc 51"/>
+            <p:cNvSpPr/>
+            <p:nvPr/>
+          </p:nvSpPr>
+          <p:spPr>
+            <a:xfrm>
+              <a:off x="2819347" y="3812648"/>
+              <a:ext cx="377393" cy="427987"/>
+            </a:xfrm>
+            <a:prstGeom prst="arc">
+              <a:avLst/>
+            </a:prstGeom>
+            <a:ln>
+              <a:solidFill>
+                <a:schemeClr val="tx1"/>
+              </a:solidFill>
+            </a:ln>
+          </p:spPr>
+          <p:style>
+            <a:lnRef idx="1">
+              <a:schemeClr val="accent1"/>
+            </a:lnRef>
+            <a:fillRef idx="0">
+              <a:schemeClr val="accent1"/>
+            </a:fillRef>
+            <a:effectRef idx="0">
+              <a:schemeClr val="accent1"/>
+            </a:effectRef>
+            <a:fontRef idx="minor">
+              <a:schemeClr val="tx1"/>
+            </a:fontRef>
+          </p:style>
+          <p:txBody>
+            <a:bodyPr rtlCol="0" anchor="ctr"/>
+            <a:lstStyle/>
+            <a:p>
+              <a:pPr algn="ctr"/>
+              <a:endParaRPr lang="en-US"/>
+            </a:p>
+          </p:txBody>
+        </p:sp>
+      </p:grpSp>
+      <p:grpSp>
+        <p:nvGrpSpPr>
+          <p:cNvPr id="53" name="Group 52"/>
+          <p:cNvGrpSpPr/>
+          <p:nvPr/>
+        </p:nvGrpSpPr>
+        <p:grpSpPr>
+          <a:xfrm rot="2174497">
+            <a:off x="2379049" y="4896211"/>
+            <a:ext cx="887924" cy="1023458"/>
+            <a:chOff x="2508770" y="3598877"/>
+            <a:chExt cx="887924" cy="1023458"/>
+          </a:xfrm>
+        </p:grpSpPr>
+        <p:sp>
+          <p:nvSpPr>
+            <p:cNvPr id="54" name="Arc 53"/>
+            <p:cNvSpPr/>
+            <p:nvPr/>
+          </p:nvSpPr>
+          <p:spPr>
+            <a:xfrm>
+              <a:off x="2508770" y="3598877"/>
+              <a:ext cx="887924" cy="1023458"/>
+            </a:xfrm>
+            <a:prstGeom prst="arc">
+              <a:avLst/>
+            </a:prstGeom>
+            <a:ln>
+              <a:solidFill>
+                <a:schemeClr val="tx1"/>
+              </a:solidFill>
+            </a:ln>
+          </p:spPr>
+          <p:style>
+            <a:lnRef idx="1">
+              <a:schemeClr val="accent1"/>
+            </a:lnRef>
+            <a:fillRef idx="0">
+              <a:schemeClr val="accent1"/>
+            </a:fillRef>
+            <a:effectRef idx="0">
+              <a:schemeClr val="accent1"/>
+            </a:effectRef>
+            <a:fontRef idx="minor">
+              <a:schemeClr val="tx1"/>
+            </a:fontRef>
+          </p:style>
+          <p:txBody>
+            <a:bodyPr rtlCol="0" anchor="ctr"/>
+            <a:lstStyle/>
+            <a:p>
+              <a:pPr algn="ctr"/>
+              <a:endParaRPr lang="en-US"/>
+            </a:p>
+          </p:txBody>
+        </p:sp>
+        <p:sp>
+          <p:nvSpPr>
+            <p:cNvPr id="55" name="Arc 54"/>
+            <p:cNvSpPr/>
+            <p:nvPr/>
+          </p:nvSpPr>
+          <p:spPr>
+            <a:xfrm>
+              <a:off x="2650921" y="3708692"/>
+              <a:ext cx="643206" cy="730082"/>
+            </a:xfrm>
+            <a:prstGeom prst="arc">
+              <a:avLst/>
+            </a:prstGeom>
+            <a:ln>
+              <a:solidFill>
+                <a:schemeClr val="tx1"/>
+              </a:solidFill>
+            </a:ln>
+          </p:spPr>
+          <p:style>
+            <a:lnRef idx="1">
+              <a:schemeClr val="accent1"/>
+            </a:lnRef>
+            <a:fillRef idx="0">
+              <a:schemeClr val="accent1"/>
+            </a:fillRef>
+            <a:effectRef idx="0">
+              <a:schemeClr val="accent1"/>
+            </a:effectRef>
+            <a:fontRef idx="minor">
+              <a:schemeClr val="tx1"/>
+            </a:fontRef>
+          </p:style>
+          <p:txBody>
+            <a:bodyPr rtlCol="0" anchor="ctr"/>
+            <a:lstStyle/>
+            <a:p>
+              <a:pPr algn="ctr"/>
+              <a:endParaRPr lang="en-US" dirty="0"/>
+            </a:p>
+          </p:txBody>
+        </p:sp>
+        <p:sp>
+          <p:nvSpPr>
+            <p:cNvPr id="56" name="Arc 55"/>
+            <p:cNvSpPr/>
+            <p:nvPr/>
+          </p:nvSpPr>
+          <p:spPr>
+            <a:xfrm>
+              <a:off x="2819347" y="3812648"/>
+              <a:ext cx="377393" cy="427987"/>
+            </a:xfrm>
+            <a:prstGeom prst="arc">
+              <a:avLst/>
+            </a:prstGeom>
+            <a:ln>
+              <a:solidFill>
+                <a:schemeClr val="tx1"/>
+              </a:solidFill>
+            </a:ln>
+          </p:spPr>
+          <p:style>
+            <a:lnRef idx="1">
+              <a:schemeClr val="accent1"/>
+            </a:lnRef>
+            <a:fillRef idx="0">
+              <a:schemeClr val="accent1"/>
+            </a:fillRef>
+            <a:effectRef idx="0">
+              <a:schemeClr val="accent1"/>
+            </a:effectRef>
+            <a:fontRef idx="minor">
+              <a:schemeClr val="tx1"/>
+            </a:fontRef>
+          </p:style>
+          <p:txBody>
+            <a:bodyPr rtlCol="0" anchor="ctr"/>
+            <a:lstStyle/>
+            <a:p>
+              <a:pPr algn="ctr"/>
+              <a:endParaRPr lang="en-US"/>
+            </a:p>
+          </p:txBody>
+        </p:sp>
+      </p:grpSp>
+      <p:grpSp>
+        <p:nvGrpSpPr>
+          <p:cNvPr id="57" name="Group 56"/>
+          <p:cNvGrpSpPr/>
+          <p:nvPr/>
+        </p:nvGrpSpPr>
+        <p:grpSpPr>
+          <a:xfrm rot="12968342">
+            <a:off x="9071959" y="4598372"/>
+            <a:ext cx="887924" cy="1023458"/>
+            <a:chOff x="2508770" y="3598877"/>
+            <a:chExt cx="887924" cy="1023458"/>
+          </a:xfrm>
+        </p:grpSpPr>
+        <p:sp>
+          <p:nvSpPr>
+            <p:cNvPr id="58" name="Arc 57"/>
+            <p:cNvSpPr/>
+            <p:nvPr/>
+          </p:nvSpPr>
+          <p:spPr>
+            <a:xfrm>
+              <a:off x="2508770" y="3598877"/>
+              <a:ext cx="887924" cy="1023458"/>
+            </a:xfrm>
+            <a:prstGeom prst="arc">
+              <a:avLst/>
+            </a:prstGeom>
+            <a:ln>
+              <a:solidFill>
+                <a:schemeClr val="tx1"/>
+              </a:solidFill>
+            </a:ln>
+          </p:spPr>
+          <p:style>
+            <a:lnRef idx="1">
+              <a:schemeClr val="accent1"/>
+            </a:lnRef>
+            <a:fillRef idx="0">
+              <a:schemeClr val="accent1"/>
+            </a:fillRef>
+            <a:effectRef idx="0">
+              <a:schemeClr val="accent1"/>
+            </a:effectRef>
+            <a:fontRef idx="minor">
+              <a:schemeClr val="tx1"/>
+            </a:fontRef>
+          </p:style>
+          <p:txBody>
+            <a:bodyPr rtlCol="0" anchor="ctr"/>
+            <a:lstStyle/>
+            <a:p>
+              <a:pPr algn="ctr"/>
+              <a:endParaRPr lang="en-US"/>
+            </a:p>
+          </p:txBody>
+        </p:sp>
+        <p:sp>
+          <p:nvSpPr>
+            <p:cNvPr id="59" name="Arc 58"/>
+            <p:cNvSpPr/>
+            <p:nvPr/>
+          </p:nvSpPr>
+          <p:spPr>
+            <a:xfrm>
+              <a:off x="2650921" y="3708692"/>
+              <a:ext cx="643206" cy="730082"/>
+            </a:xfrm>
+            <a:prstGeom prst="arc">
+              <a:avLst/>
+            </a:prstGeom>
+            <a:ln>
+              <a:solidFill>
+                <a:schemeClr val="tx1"/>
+              </a:solidFill>
+            </a:ln>
+          </p:spPr>
+          <p:style>
+            <a:lnRef idx="1">
+              <a:schemeClr val="accent1"/>
+            </a:lnRef>
+            <a:fillRef idx="0">
+              <a:schemeClr val="accent1"/>
+            </a:fillRef>
+            <a:effectRef idx="0">
+              <a:schemeClr val="accent1"/>
+            </a:effectRef>
+            <a:fontRef idx="minor">
+              <a:schemeClr val="tx1"/>
+            </a:fontRef>
+          </p:style>
+          <p:txBody>
+            <a:bodyPr rtlCol="0" anchor="ctr"/>
+            <a:lstStyle/>
+            <a:p>
+              <a:pPr algn="ctr"/>
+              <a:endParaRPr lang="en-US"/>
+            </a:p>
+          </p:txBody>
+        </p:sp>
+        <p:sp>
+          <p:nvSpPr>
+            <p:cNvPr id="60" name="Arc 59"/>
+            <p:cNvSpPr/>
+            <p:nvPr/>
+          </p:nvSpPr>
+          <p:spPr>
+            <a:xfrm>
+              <a:off x="2819347" y="3812648"/>
+              <a:ext cx="377393" cy="427987"/>
+            </a:xfrm>
+            <a:prstGeom prst="arc">
+              <a:avLst/>
+            </a:prstGeom>
+            <a:ln>
+              <a:solidFill>
+                <a:schemeClr val="tx1"/>
+              </a:solidFill>
+            </a:ln>
+          </p:spPr>
+          <p:style>
+            <a:lnRef idx="1">
+              <a:schemeClr val="accent1"/>
+            </a:lnRef>
+            <a:fillRef idx="0">
+              <a:schemeClr val="accent1"/>
+            </a:fillRef>
+            <a:effectRef idx="0">
+              <a:schemeClr val="accent1"/>
+            </a:effectRef>
+            <a:fontRef idx="minor">
+              <a:schemeClr val="tx1"/>
+            </a:fontRef>
+          </p:style>
+          <p:txBody>
+            <a:bodyPr rtlCol="0" anchor="ctr"/>
+            <a:lstStyle/>
+            <a:p>
+              <a:pPr algn="ctr"/>
+              <a:endParaRPr lang="en-US"/>
+            </a:p>
+          </p:txBody>
+        </p:sp>
+      </p:grpSp>
+      <p:sp>
+        <p:nvSpPr>
+          <p:cNvPr id="61" name="Callout: Line 60"/>
+          <p:cNvSpPr/>
+          <p:nvPr/>
+        </p:nvSpPr>
+        <p:spPr>
+          <a:xfrm>
+            <a:off x="10097665" y="3356993"/>
+            <a:ext cx="1222774" cy="763265"/>
+          </a:xfrm>
+          <a:prstGeom prst="borderCallout1">
+            <a:avLst>
+              <a:gd name="adj1" fmla="val 18750"/>
+              <a:gd name="adj2" fmla="val -8333"/>
+              <a:gd name="adj3" fmla="val 101509"/>
+              <a:gd name="adj4" fmla="val -32158"/>
+            </a:avLst>
+          </a:prstGeom>
+          <a:solidFill>
+            <a:schemeClr val="lt1">
+              <a:alpha val="71000"/>
+            </a:schemeClr>
+          </a:solidFill>
+        </p:spPr>
+        <p:style>
+          <a:lnRef idx="2">
+            <a:schemeClr val="accent5"/>
+          </a:lnRef>
+          <a:fillRef idx="1">
+            <a:schemeClr val="lt1"/>
+          </a:fillRef>
+          <a:effectRef idx="0">
+            <a:schemeClr val="accent5"/>
+          </a:effectRef>
+          <a:fontRef idx="minor">
+            <a:schemeClr val="dk1"/>
+          </a:fontRef>
+        </p:style>
+        <p:txBody>
+          <a:bodyPr rtlCol="0" anchor="ctr"/>
+          <a:lstStyle/>
+          <a:p>
+            <a:pPr algn="ctr"/>
+            <a:r>
+              <a:rPr lang="en-US" dirty="0"/>
+              <a:t>Client</a:t>
+            </a:r>
+          </a:p>
+          <a:p>
+            <a:pPr algn="ctr"/>
+            <a:r>
+              <a:rPr lang="en-US" dirty="0"/>
+              <a:t>Endpoint</a:t>
+            </a:r>
+          </a:p>
+        </p:txBody>
+      </p:sp>
     </p:spTree>
     <p:extLst>
       <p:ext uri="{BB962C8B-B14F-4D97-AF65-F5344CB8AC3E}">
-        <p14:creationId xmlns:p14="http://schemas.microsoft.com/office/powerpoint/2010/main" val="2158873328"/>
+        <p14:creationId xmlns:p14="http://schemas.microsoft.com/office/powerpoint/2010/main" val="4012295823"/>
       </p:ext>
     </p:extLst>
   </p:cSld>
   <p:clrMapOvr>
     <a:masterClrMapping/>
   </p:clrMapOvr>
-  <p:timing>
-    <p:tnLst>
-      <p:par>
-        <p:cTn id="1" dur="indefinite" restart="never" nodeType="tmRoot"/>
-      </p:par>
-    </p:tnLst>
-  </p:timing>
 </p:sld>
 </file>
 
@@ -13008,12 +14240,8 @@
           <a:lstStyle/>
           <a:p>
             <a:r>
-              <a:rPr lang="en-US" dirty="0" smtClean="0"/>
-              <a:t>New </a:t>
-            </a:r>
-            <a:r>
               <a:rPr lang="en-US" dirty="0"/>
-              <a:t>deployments</a:t>
+              <a:t>New deployments</a:t>
             </a:r>
           </a:p>
           <a:p>
@@ -13081,13 +14309,6 @@
   <p:clrMapOvr>
     <a:masterClrMapping/>
   </p:clrMapOvr>
-  <p:timing>
-    <p:tnLst>
-      <p:par>
-        <p:cTn id="1" dur="indefinite" restart="never" nodeType="tmRoot"/>
-      </p:par>
-    </p:tnLst>
-  </p:timing>
 </p:sld>
 </file>
 
@@ -13169,13 +14390,6 @@
   <p:clrMapOvr>
     <a:masterClrMapping/>
   </p:clrMapOvr>
-  <p:timing>
-    <p:tnLst>
-      <p:par>
-        <p:cTn id="1" dur="indefinite" restart="never" nodeType="tmRoot"/>
-      </p:par>
-    </p:tnLst>
-  </p:timing>
 </p:sld>
 </file>
 
@@ -13257,13 +14471,6 @@
   <p:clrMapOvr>
     <a:masterClrMapping/>
   </p:clrMapOvr>
-  <p:timing>
-    <p:tnLst>
-      <p:par>
-        <p:cTn id="1" dur="indefinite" restart="never" nodeType="tmRoot"/>
-      </p:par>
-    </p:tnLst>
-  </p:timing>
 </p:sld>
 </file>
 
@@ -13350,13 +14557,6 @@
   <p:clrMapOvr>
     <a:masterClrMapping/>
   </p:clrMapOvr>
-  <p:timing>
-    <p:tnLst>
-      <p:par>
-        <p:cTn id="1" dur="indefinite" restart="never" nodeType="tmRoot"/>
-      </p:par>
-    </p:tnLst>
-  </p:timing>
 </p:sld>
 </file>
 
@@ -13550,13 +14750,6 @@
   <p:clrMapOvr>
     <a:masterClrMapping/>
   </p:clrMapOvr>
-  <p:timing>
-    <p:tnLst>
-      <p:par>
-        <p:cTn id="1" dur="indefinite" restart="never" nodeType="tmRoot"/>
-      </p:par>
-    </p:tnLst>
-  </p:timing>
 </p:sld>
 </file>
 
@@ -13732,13 +14925,6 @@
   <p:clrMapOvr>
     <a:masterClrMapping/>
   </p:clrMapOvr>
-  <p:timing>
-    <p:tnLst>
-      <p:par>
-        <p:cTn id="1" dur="indefinite" restart="never" nodeType="tmRoot"/>
-      </p:par>
-    </p:tnLst>
-  </p:timing>
 </p:sld>
 </file>
 
@@ -13869,13 +15055,6 @@
   <p:clrMapOvr>
     <a:masterClrMapping/>
   </p:clrMapOvr>
-  <p:timing>
-    <p:tnLst>
-      <p:par>
-        <p:cTn id="1" dur="indefinite" restart="never" nodeType="tmRoot"/>
-      </p:par>
-    </p:tnLst>
-  </p:timing>
 </p:sld>
 </file>
 
@@ -13951,13 +15130,6 @@
   <p:clrMapOvr>
     <a:masterClrMapping/>
   </p:clrMapOvr>
-  <p:timing>
-    <p:tnLst>
-      <p:par>
-        <p:cTn id="1" dur="indefinite" restart="never" nodeType="tmRoot"/>
-      </p:par>
-    </p:tnLst>
-  </p:timing>
 </p:sld>
 </file>
 
@@ -14116,13 +15288,6 @@
   <p:clrMapOvr>
     <a:masterClrMapping/>
   </p:clrMapOvr>
-  <p:timing>
-    <p:tnLst>
-      <p:par>
-        <p:cTn id="1" dur="indefinite" restart="never" nodeType="tmRoot"/>
-      </p:par>
-    </p:tnLst>
-  </p:timing>
 </p:sld>
 </file>
 
@@ -14211,13 +15376,6 @@
   <p:clrMapOvr>
     <a:masterClrMapping/>
   </p:clrMapOvr>
-  <p:timing>
-    <p:tnLst>
-      <p:par>
-        <p:cTn id="1" dur="indefinite" restart="never" nodeType="tmRoot"/>
-      </p:par>
-    </p:tnLst>
-  </p:timing>
 </p:sld>
 </file>
 
@@ -14349,13 +15507,6 @@
   <p:clrMapOvr>
     <a:masterClrMapping/>
   </p:clrMapOvr>
-  <p:timing>
-    <p:tnLst>
-      <p:par>
-        <p:cTn id="1" dur="indefinite" restart="never" nodeType="tmRoot"/>
-      </p:par>
-    </p:tnLst>
-  </p:timing>
 </p:sld>
 </file>
 
@@ -14519,13 +15670,6 @@
   <p:clrMapOvr>
     <a:masterClrMapping/>
   </p:clrMapOvr>
-  <p:timing>
-    <p:tnLst>
-      <p:par>
-        <p:cTn id="1" dur="indefinite" restart="never" nodeType="tmRoot"/>
-      </p:par>
-    </p:tnLst>
-  </p:timing>
 </p:sld>
 </file>
 

</xml_diff>